<commit_message>
minor change to scaffolding, adds material for clean code
</commit_message>
<xml_diff>
--- a/lesson09/Clean Code/Writing Clean Code.pptx
+++ b/lesson09/Clean Code/Writing Clean Code.pptx
@@ -5,7 +5,7 @@
     <p:sldMasterId id="2147483648" r:id="rId1"/>
   </p:sldMasterIdLst>
   <p:notesMasterIdLst>
-    <p:notesMasterId r:id="rId18"/>
+    <p:notesMasterId r:id="rId19"/>
   </p:notesMasterIdLst>
   <p:sldIdLst>
     <p:sldId id="256" r:id="rId2"/>
@@ -15,15 +15,16 @@
     <p:sldId id="263" r:id="rId6"/>
     <p:sldId id="270" r:id="rId7"/>
     <p:sldId id="271" r:id="rId8"/>
-    <p:sldId id="257" r:id="rId9"/>
-    <p:sldId id="258" r:id="rId10"/>
+    <p:sldId id="258" r:id="rId9"/>
+    <p:sldId id="257" r:id="rId10"/>
     <p:sldId id="259" r:id="rId11"/>
-    <p:sldId id="265" r:id="rId12"/>
-    <p:sldId id="264" r:id="rId13"/>
-    <p:sldId id="266" r:id="rId14"/>
-    <p:sldId id="267" r:id="rId15"/>
-    <p:sldId id="268" r:id="rId16"/>
-    <p:sldId id="269" r:id="rId17"/>
+    <p:sldId id="266" r:id="rId12"/>
+    <p:sldId id="267" r:id="rId13"/>
+    <p:sldId id="272" r:id="rId14"/>
+    <p:sldId id="264" r:id="rId15"/>
+    <p:sldId id="265" r:id="rId16"/>
+    <p:sldId id="268" r:id="rId17"/>
+    <p:sldId id="269" r:id="rId18"/>
   </p:sldIdLst>
   <p:sldSz cx="12192000" cy="6858000"/>
   <p:notesSz cx="6858000" cy="9144000"/>
@@ -122,6 +123,11 @@
       </a:defRPr>
     </a:lvl9pPr>
   </p:defaultTextStyle>
+  <p:extLst>
+    <p:ext uri="{EFAFB233-063F-42B5-8137-9DF3F51BA10A}">
+      <p15:sldGuideLst xmlns:p15="http://schemas.microsoft.com/office/powerpoint/2012/main"/>
+    </p:ext>
+  </p:extLst>
 </p:presentation>
 </file>
 
@@ -207,7 +213,7 @@
           <a:p>
             <a:fld id="{ABAB54D4-40B1-4F4F-A71E-587F6353CB71}" type="datetimeFigureOut">
               <a:rPr lang="en-US" smtClean="0"/>
-              <a:t>7/21/2025</a:t>
+              <a:t>29-Jul-25</a:t>
             </a:fld>
             <a:endParaRPr lang="en-US"/>
           </a:p>
@@ -616,7 +622,7 @@
           <a:p>
             <a:r>
               <a:rPr lang="en-US" dirty="0"/>
-              <a:t>We’ll look at select examples moving forward</a:t>
+              <a:t>https://docs.python-guide.org/writing/structure/#modules</a:t>
             </a:r>
           </a:p>
         </p:txBody>
@@ -647,7 +653,7 @@
     </p:spTree>
     <p:extLst>
       <p:ext uri="{BB962C8B-B14F-4D97-AF65-F5344CB8AC3E}">
-        <p14:creationId xmlns:p14="http://schemas.microsoft.com/office/powerpoint/2010/main" val="329043299"/>
+        <p14:creationId xmlns:p14="http://schemas.microsoft.com/office/powerpoint/2010/main" val="1818730371"/>
       </p:ext>
     </p:extLst>
   </p:cSld>
@@ -701,9 +707,12 @@
           <a:bodyPr/>
           <a:lstStyle/>
           <a:p>
-            <a:r>
-              <a:rPr lang="en-US" dirty="0"/>
-              <a:t>https://github.com/analysis-tools-dev/dynamic-analysis?tab=readme-ov-file#python</a:t>
+            <a:endParaRPr lang="en-US" dirty="0"/>
+          </a:p>
+          <a:p>
+            <a:r>
+              <a:rPr lang="en-US" dirty="0"/>
+              <a:t>https://dev.to/romansery/why-you-should-favor-composition-over-inheritance-57m6</a:t>
             </a:r>
           </a:p>
         </p:txBody>
@@ -725,7 +734,181 @@
           <a:p>
             <a:fld id="{09279270-E9D6-4AB0-B8D4-A4702B609EB2}" type="slidenum">
               <a:rPr lang="en-US" smtClean="0"/>
-              <a:t>16</a:t>
+              <a:t>14</a:t>
+            </a:fld>
+            <a:endParaRPr lang="en-US"/>
+          </a:p>
+        </p:txBody>
+      </p:sp>
+    </p:spTree>
+    <p:extLst>
+      <p:ext uri="{BB962C8B-B14F-4D97-AF65-F5344CB8AC3E}">
+        <p14:creationId xmlns:p14="http://schemas.microsoft.com/office/powerpoint/2010/main" val="3642034805"/>
+      </p:ext>
+    </p:extLst>
+  </p:cSld>
+  <p:clrMapOvr>
+    <a:masterClrMapping/>
+  </p:clrMapOvr>
+</p:notes>
+</file>
+
+<file path=ppt/notesSlides/notesSlide4.xml><?xml version="1.0" encoding="utf-8"?>
+<p:notes xmlns:a="http://schemas.openxmlformats.org/drawingml/2006/main" xmlns:r="http://schemas.openxmlformats.org/officeDocument/2006/relationships" xmlns:p="http://schemas.openxmlformats.org/presentationml/2006/main">
+  <p:cSld>
+    <p:spTree>
+      <p:nvGrpSpPr>
+        <p:cNvPr id="1" name=""/>
+        <p:cNvGrpSpPr/>
+        <p:nvPr/>
+      </p:nvGrpSpPr>
+      <p:grpSpPr>
+        <a:xfrm>
+          <a:off x="0" y="0"/>
+          <a:ext cx="0" cy="0"/>
+          <a:chOff x="0" y="0"/>
+          <a:chExt cx="0" cy="0"/>
+        </a:xfrm>
+      </p:grpSpPr>
+      <p:sp>
+        <p:nvSpPr>
+          <p:cNvPr id="2" name="Slide Image Placeholder 1"/>
+          <p:cNvSpPr>
+            <a:spLocks noGrp="1" noRot="1" noChangeAspect="1"/>
+          </p:cNvSpPr>
+          <p:nvPr>
+            <p:ph type="sldImg"/>
+          </p:nvPr>
+        </p:nvSpPr>
+        <p:spPr/>
+      </p:sp>
+      <p:sp>
+        <p:nvSpPr>
+          <p:cNvPr id="3" name="Notes Placeholder 2"/>
+          <p:cNvSpPr>
+            <a:spLocks noGrp="1"/>
+          </p:cNvSpPr>
+          <p:nvPr>
+            <p:ph type="body" idx="1"/>
+          </p:nvPr>
+        </p:nvSpPr>
+        <p:spPr/>
+        <p:txBody>
+          <a:bodyPr/>
+          <a:lstStyle/>
+          <a:p>
+            <a:r>
+              <a:rPr lang="en-US" dirty="0"/>
+              <a:t>We’ll look at select examples moving forward</a:t>
+            </a:r>
+          </a:p>
+        </p:txBody>
+      </p:sp>
+      <p:sp>
+        <p:nvSpPr>
+          <p:cNvPr id="4" name="Slide Number Placeholder 3"/>
+          <p:cNvSpPr>
+            <a:spLocks noGrp="1"/>
+          </p:cNvSpPr>
+          <p:nvPr>
+            <p:ph type="sldNum" sz="quarter" idx="5"/>
+          </p:nvPr>
+        </p:nvSpPr>
+        <p:spPr/>
+        <p:txBody>
+          <a:bodyPr/>
+          <a:lstStyle/>
+          <a:p>
+            <a:fld id="{09279270-E9D6-4AB0-B8D4-A4702B609EB2}" type="slidenum">
+              <a:rPr lang="en-US" smtClean="0"/>
+              <a:t>15</a:t>
+            </a:fld>
+            <a:endParaRPr lang="en-US"/>
+          </a:p>
+        </p:txBody>
+      </p:sp>
+    </p:spTree>
+    <p:extLst>
+      <p:ext uri="{BB962C8B-B14F-4D97-AF65-F5344CB8AC3E}">
+        <p14:creationId xmlns:p14="http://schemas.microsoft.com/office/powerpoint/2010/main" val="329043299"/>
+      </p:ext>
+    </p:extLst>
+  </p:cSld>
+  <p:clrMapOvr>
+    <a:masterClrMapping/>
+  </p:clrMapOvr>
+</p:notes>
+</file>
+
+<file path=ppt/notesSlides/notesSlide5.xml><?xml version="1.0" encoding="utf-8"?>
+<p:notes xmlns:a="http://schemas.openxmlformats.org/drawingml/2006/main" xmlns:r="http://schemas.openxmlformats.org/officeDocument/2006/relationships" xmlns:p="http://schemas.openxmlformats.org/presentationml/2006/main">
+  <p:cSld>
+    <p:spTree>
+      <p:nvGrpSpPr>
+        <p:cNvPr id="1" name=""/>
+        <p:cNvGrpSpPr/>
+        <p:nvPr/>
+      </p:nvGrpSpPr>
+      <p:grpSpPr>
+        <a:xfrm>
+          <a:off x="0" y="0"/>
+          <a:ext cx="0" cy="0"/>
+          <a:chOff x="0" y="0"/>
+          <a:chExt cx="0" cy="0"/>
+        </a:xfrm>
+      </p:grpSpPr>
+      <p:sp>
+        <p:nvSpPr>
+          <p:cNvPr id="2" name="Slide Image Placeholder 1"/>
+          <p:cNvSpPr>
+            <a:spLocks noGrp="1" noRot="1" noChangeAspect="1"/>
+          </p:cNvSpPr>
+          <p:nvPr>
+            <p:ph type="sldImg"/>
+          </p:nvPr>
+        </p:nvSpPr>
+        <p:spPr/>
+      </p:sp>
+      <p:sp>
+        <p:nvSpPr>
+          <p:cNvPr id="3" name="Notes Placeholder 2"/>
+          <p:cNvSpPr>
+            <a:spLocks noGrp="1"/>
+          </p:cNvSpPr>
+          <p:nvPr>
+            <p:ph type="body" idx="1"/>
+          </p:nvPr>
+        </p:nvSpPr>
+        <p:spPr/>
+        <p:txBody>
+          <a:bodyPr/>
+          <a:lstStyle/>
+          <a:p>
+            <a:r>
+              <a:rPr lang="en-US" dirty="0"/>
+              <a:t>https://github.com/analysis-tools-dev/dynamic-analysis?tab=readme-ov-file#python</a:t>
+            </a:r>
+          </a:p>
+        </p:txBody>
+      </p:sp>
+      <p:sp>
+        <p:nvSpPr>
+          <p:cNvPr id="4" name="Slide Number Placeholder 3"/>
+          <p:cNvSpPr>
+            <a:spLocks noGrp="1"/>
+          </p:cNvSpPr>
+          <p:nvPr>
+            <p:ph type="sldNum" sz="quarter" idx="5"/>
+          </p:nvPr>
+        </p:nvSpPr>
+        <p:spPr/>
+        <p:txBody>
+          <a:bodyPr/>
+          <a:lstStyle/>
+          <a:p>
+            <a:fld id="{09279270-E9D6-4AB0-B8D4-A4702B609EB2}" type="slidenum">
+              <a:rPr lang="en-US" smtClean="0"/>
+              <a:t>17</a:t>
             </a:fld>
             <a:endParaRPr lang="en-US"/>
           </a:p>
@@ -891,7 +1074,7 @@
           <a:p>
             <a:fld id="{40BEADEB-7507-46CB-9ABE-86F6B40F8C4B}" type="datetimeFigureOut">
               <a:rPr lang="en-US" smtClean="0"/>
-              <a:t>7/21/2025</a:t>
+              <a:t>29-Jul-25</a:t>
             </a:fld>
             <a:endParaRPr lang="en-US"/>
           </a:p>
@@ -1089,7 +1272,7 @@
           <a:p>
             <a:fld id="{40BEADEB-7507-46CB-9ABE-86F6B40F8C4B}" type="datetimeFigureOut">
               <a:rPr lang="en-US" smtClean="0"/>
-              <a:t>7/21/2025</a:t>
+              <a:t>29-Jul-25</a:t>
             </a:fld>
             <a:endParaRPr lang="en-US"/>
           </a:p>
@@ -1297,7 +1480,7 @@
           <a:p>
             <a:fld id="{40BEADEB-7507-46CB-9ABE-86F6B40F8C4B}" type="datetimeFigureOut">
               <a:rPr lang="en-US" smtClean="0"/>
-              <a:t>7/21/2025</a:t>
+              <a:t>29-Jul-25</a:t>
             </a:fld>
             <a:endParaRPr lang="en-US"/>
           </a:p>
@@ -1495,7 +1678,7 @@
           <a:p>
             <a:fld id="{40BEADEB-7507-46CB-9ABE-86F6B40F8C4B}" type="datetimeFigureOut">
               <a:rPr lang="en-US" smtClean="0"/>
-              <a:t>7/21/2025</a:t>
+              <a:t>29-Jul-25</a:t>
             </a:fld>
             <a:endParaRPr lang="en-US"/>
           </a:p>
@@ -1770,7 +1953,7 @@
           <a:p>
             <a:fld id="{40BEADEB-7507-46CB-9ABE-86F6B40F8C4B}" type="datetimeFigureOut">
               <a:rPr lang="en-US" smtClean="0"/>
-              <a:t>7/21/2025</a:t>
+              <a:t>29-Jul-25</a:t>
             </a:fld>
             <a:endParaRPr lang="en-US"/>
           </a:p>
@@ -2035,7 +2218,7 @@
           <a:p>
             <a:fld id="{40BEADEB-7507-46CB-9ABE-86F6B40F8C4B}" type="datetimeFigureOut">
               <a:rPr lang="en-US" smtClean="0"/>
-              <a:t>7/21/2025</a:t>
+              <a:t>29-Jul-25</a:t>
             </a:fld>
             <a:endParaRPr lang="en-US"/>
           </a:p>
@@ -2447,7 +2630,7 @@
           <a:p>
             <a:fld id="{40BEADEB-7507-46CB-9ABE-86F6B40F8C4B}" type="datetimeFigureOut">
               <a:rPr lang="en-US" smtClean="0"/>
-              <a:t>7/21/2025</a:t>
+              <a:t>29-Jul-25</a:t>
             </a:fld>
             <a:endParaRPr lang="en-US"/>
           </a:p>
@@ -2588,7 +2771,7 @@
           <a:p>
             <a:fld id="{40BEADEB-7507-46CB-9ABE-86F6B40F8C4B}" type="datetimeFigureOut">
               <a:rPr lang="en-US" smtClean="0"/>
-              <a:t>7/21/2025</a:t>
+              <a:t>29-Jul-25</a:t>
             </a:fld>
             <a:endParaRPr lang="en-US"/>
           </a:p>
@@ -2701,7 +2884,7 @@
           <a:p>
             <a:fld id="{40BEADEB-7507-46CB-9ABE-86F6B40F8C4B}" type="datetimeFigureOut">
               <a:rPr lang="en-US" smtClean="0"/>
-              <a:t>7/21/2025</a:t>
+              <a:t>29-Jul-25</a:t>
             </a:fld>
             <a:endParaRPr lang="en-US"/>
           </a:p>
@@ -3012,7 +3195,7 @@
           <a:p>
             <a:fld id="{40BEADEB-7507-46CB-9ABE-86F6B40F8C4B}" type="datetimeFigureOut">
               <a:rPr lang="en-US" smtClean="0"/>
-              <a:t>7/21/2025</a:t>
+              <a:t>29-Jul-25</a:t>
             </a:fld>
             <a:endParaRPr lang="en-US"/>
           </a:p>
@@ -3300,7 +3483,7 @@
           <a:p>
             <a:fld id="{40BEADEB-7507-46CB-9ABE-86F6B40F8C4B}" type="datetimeFigureOut">
               <a:rPr lang="en-US" smtClean="0"/>
-              <a:t>7/21/2025</a:t>
+              <a:t>29-Jul-25</a:t>
             </a:fld>
             <a:endParaRPr lang="en-US"/>
           </a:p>
@@ -3541,7 +3724,7 @@
           <a:p>
             <a:fld id="{40BEADEB-7507-46CB-9ABE-86F6B40F8C4B}" type="datetimeFigureOut">
               <a:rPr lang="en-US" smtClean="0"/>
-              <a:t>7/21/2025</a:t>
+              <a:t>29-Jul-25</a:t>
             </a:fld>
             <a:endParaRPr lang="en-US"/>
           </a:p>
@@ -4067,7 +4250,7 @@
           <a:p>
             <a:r>
               <a:rPr lang="en-US" dirty="0"/>
-              <a:t>Don’t Repeat Yourself</a:t>
+              <a:t>Don’t Repeat Yourself (DRY)</a:t>
             </a:r>
           </a:p>
         </p:txBody>
@@ -4093,7 +4276,30 @@
           <a:bodyPr/>
           <a:lstStyle/>
           <a:p>
-            <a:endParaRPr lang="en-US"/>
+            <a:r>
+              <a:rPr lang="en-US" dirty="0"/>
+              <a:t>Duplicate code is more likely to have errors, especially during changes</a:t>
+            </a:r>
+          </a:p>
+          <a:p>
+            <a:r>
+              <a:rPr lang="en-US" dirty="0"/>
+              <a:t>If you ever find yourself copying &amp; pasting code in multiple places…</a:t>
+            </a:r>
+          </a:p>
+          <a:p>
+            <a:pPr lvl="1"/>
+            <a:r>
+              <a:rPr lang="en-US" dirty="0"/>
+              <a:t>Probably a good candidate for a function</a:t>
+            </a:r>
+          </a:p>
+          <a:p>
+            <a:pPr lvl="1"/>
+            <a:r>
+              <a:rPr lang="en-US" dirty="0"/>
+              <a:t>Or a loop</a:t>
+            </a:r>
           </a:p>
         </p:txBody>
       </p:sp>
@@ -4129,10 +4335,10 @@
       </p:grpSpPr>
       <p:sp>
         <p:nvSpPr>
-          <p:cNvPr id="4" name="Title 3">
-            <a:extLst>
-              <a:ext uri="{FF2B5EF4-FFF2-40B4-BE49-F238E27FC236}">
-                <a16:creationId xmlns:a16="http://schemas.microsoft.com/office/drawing/2014/main" id="{6EC3678D-063F-76F6-4C7C-5CD29411F6FA}"/>
+          <p:cNvPr id="2" name="Title 1">
+            <a:extLst>
+              <a:ext uri="{FF2B5EF4-FFF2-40B4-BE49-F238E27FC236}">
+                <a16:creationId xmlns:a16="http://schemas.microsoft.com/office/drawing/2014/main" id="{1B5CCB90-BAC8-2C5D-3712-2F782899474A}"/>
               </a:ext>
             </a:extLst>
           </p:cNvPr>
@@ -4150,35 +4356,62 @@
           <a:p>
             <a:r>
               <a:rPr lang="en-US" dirty="0"/>
-              <a:t>So what’s the deal?</a:t>
-            </a:r>
-          </a:p>
-        </p:txBody>
-      </p:sp>
-      <p:sp>
-        <p:nvSpPr>
-          <p:cNvPr id="5" name="Text Placeholder 4">
-            <a:extLst>
-              <a:ext uri="{FF2B5EF4-FFF2-40B4-BE49-F238E27FC236}">
-                <a16:creationId xmlns:a16="http://schemas.microsoft.com/office/drawing/2014/main" id="{3F5808C6-1C0D-7BBA-A58D-01E18830BE2C}"/>
-              </a:ext>
-            </a:extLst>
-          </p:cNvPr>
-          <p:cNvSpPr>
-            <a:spLocks noGrp="1"/>
-          </p:cNvSpPr>
-          <p:nvPr>
-            <p:ph type="body" idx="1"/>
-          </p:nvPr>
-        </p:nvSpPr>
-        <p:spPr/>
-        <p:txBody>
-          <a:bodyPr/>
-          <a:lstStyle/>
-          <a:p>
-            <a:r>
-              <a:rPr lang="en-US" dirty="0"/>
-              <a:t>How do you apply these ideas?</a:t>
+              <a:t>Packages &amp; Modules</a:t>
+            </a:r>
+          </a:p>
+        </p:txBody>
+      </p:sp>
+      <p:sp>
+        <p:nvSpPr>
+          <p:cNvPr id="3" name="Content Placeholder 2">
+            <a:extLst>
+              <a:ext uri="{FF2B5EF4-FFF2-40B4-BE49-F238E27FC236}">
+                <a16:creationId xmlns:a16="http://schemas.microsoft.com/office/drawing/2014/main" id="{4EEC27F5-EB6B-62E2-A896-D04A747F1FE3}"/>
+              </a:ext>
+            </a:extLst>
+          </p:cNvPr>
+          <p:cNvSpPr>
+            <a:spLocks noGrp="1"/>
+          </p:cNvSpPr>
+          <p:nvPr>
+            <p:ph idx="1"/>
+          </p:nvPr>
+        </p:nvSpPr>
+        <p:spPr/>
+        <p:txBody>
+          <a:bodyPr/>
+          <a:lstStyle/>
+          <a:p>
+            <a:r>
+              <a:rPr lang="en-US" dirty="0"/>
+              <a:t>Packages bundle functionality into an installable artifact</a:t>
+            </a:r>
+          </a:p>
+          <a:p>
+            <a:r>
+              <a:rPr lang="en-US" dirty="0"/>
+              <a:t>A package can have multiple modules</a:t>
+            </a:r>
+          </a:p>
+          <a:p>
+            <a:r>
+              <a:rPr lang="en-US" dirty="0"/>
+              <a:t>Packages are any directory with a file called `__init__.py`</a:t>
+            </a:r>
+          </a:p>
+          <a:p>
+            <a:r>
+              <a:rPr lang="en-US" dirty="0"/>
+              <a:t>Every python file is effectively a module</a:t>
+            </a:r>
+          </a:p>
+          <a:p>
+            <a:endParaRPr lang="en-US" dirty="0"/>
+          </a:p>
+          <a:p>
+            <a:r>
+              <a:rPr lang="en-US" dirty="0"/>
+              <a:t>Easy way to bundle your code and share with others for re-use</a:t>
             </a:r>
           </a:p>
         </p:txBody>
@@ -4186,7 +4419,7 @@
     </p:spTree>
     <p:extLst>
       <p:ext uri="{BB962C8B-B14F-4D97-AF65-F5344CB8AC3E}">
-        <p14:creationId xmlns:p14="http://schemas.microsoft.com/office/powerpoint/2010/main" val="3915962001"/>
+        <p14:creationId xmlns:p14="http://schemas.microsoft.com/office/powerpoint/2010/main" val="422245135"/>
       </p:ext>
     </p:extLst>
   </p:cSld>
@@ -4218,7 +4451,7 @@
           <p:cNvPr id="2" name="Title 1">
             <a:extLst>
               <a:ext uri="{FF2B5EF4-FFF2-40B4-BE49-F238E27FC236}">
-                <a16:creationId xmlns:a16="http://schemas.microsoft.com/office/drawing/2014/main" id="{E4E68650-F179-1B91-302C-0F3BF0AA3DED}"/>
+                <a16:creationId xmlns:a16="http://schemas.microsoft.com/office/drawing/2014/main" id="{6A8F51CC-96DA-A170-9BDF-CA1DDC3F0EAC}"/>
               </a:ext>
             </a:extLst>
           </p:cNvPr>
@@ -4236,7 +4469,7 @@
           <a:p>
             <a:r>
               <a:rPr lang="en-US" dirty="0"/>
-              <a:t>Objects, Inheritance, Composition</a:t>
+              <a:t>Design Patterns</a:t>
             </a:r>
           </a:p>
         </p:txBody>
@@ -4246,7 +4479,7 @@
           <p:cNvPr id="3" name="Content Placeholder 2">
             <a:extLst>
               <a:ext uri="{FF2B5EF4-FFF2-40B4-BE49-F238E27FC236}">
-                <a16:creationId xmlns:a16="http://schemas.microsoft.com/office/drawing/2014/main" id="{8A58448E-1F21-F3C9-27AB-16CB0D765E1F}"/>
+                <a16:creationId xmlns:a16="http://schemas.microsoft.com/office/drawing/2014/main" id="{6801696E-C8BF-648F-4248-7D21EF56C07D}"/>
               </a:ext>
             </a:extLst>
           </p:cNvPr>
@@ -4261,25 +4494,6 @@
         <p:txBody>
           <a:bodyPr/>
           <a:lstStyle/>
-          <a:p>
-            <a:r>
-              <a:rPr lang="en-US" dirty="0"/>
-              <a:t>OOP is a powerful way (to shoot yourself in the foot)</a:t>
-            </a:r>
-          </a:p>
-          <a:p>
-            <a:r>
-              <a:rPr lang="en-US" dirty="0"/>
-              <a:t>Composition over inheritance</a:t>
-            </a:r>
-          </a:p>
-          <a:p>
-            <a:pPr lvl="1"/>
-            <a:r>
-              <a:rPr lang="en-US" dirty="0"/>
-              <a:t>Promotes loose coupling</a:t>
-            </a:r>
-          </a:p>
           <a:p>
             <a:endParaRPr lang="en-US" dirty="0"/>
           </a:p>
@@ -4288,7 +4502,7 @@
     </p:spTree>
     <p:extLst>
       <p:ext uri="{BB962C8B-B14F-4D97-AF65-F5344CB8AC3E}">
-        <p14:creationId xmlns:p14="http://schemas.microsoft.com/office/powerpoint/2010/main" val="1655773751"/>
+        <p14:creationId xmlns:p14="http://schemas.microsoft.com/office/powerpoint/2010/main" val="2815691481"/>
       </p:ext>
     </p:extLst>
   </p:cSld>
@@ -4320,7 +4534,7 @@
           <p:cNvPr id="2" name="Title 1">
             <a:extLst>
               <a:ext uri="{FF2B5EF4-FFF2-40B4-BE49-F238E27FC236}">
-                <a16:creationId xmlns:a16="http://schemas.microsoft.com/office/drawing/2014/main" id="{1B5CCB90-BAC8-2C5D-3712-2F782899474A}"/>
+                <a16:creationId xmlns:a16="http://schemas.microsoft.com/office/drawing/2014/main" id="{16A4661A-E272-E0C1-9D8D-18C21FC117C5}"/>
               </a:ext>
             </a:extLst>
           </p:cNvPr>
@@ -4338,7 +4552,7 @@
           <a:p>
             <a:r>
               <a:rPr lang="en-US" dirty="0"/>
-              <a:t>Modules</a:t>
+              <a:t>Performance Anxiety</a:t>
             </a:r>
           </a:p>
         </p:txBody>
@@ -4348,7 +4562,7 @@
           <p:cNvPr id="3" name="Content Placeholder 2">
             <a:extLst>
               <a:ext uri="{FF2B5EF4-FFF2-40B4-BE49-F238E27FC236}">
-                <a16:creationId xmlns:a16="http://schemas.microsoft.com/office/drawing/2014/main" id="{4EEC27F5-EB6B-62E2-A896-D04A747F1FE3}"/>
+                <a16:creationId xmlns:a16="http://schemas.microsoft.com/office/drawing/2014/main" id="{A9572724-EC4A-0F20-01CF-93A08B47F8D5}"/>
               </a:ext>
             </a:extLst>
           </p:cNvPr>
@@ -4371,7 +4585,7 @@
     </p:spTree>
     <p:extLst>
       <p:ext uri="{BB962C8B-B14F-4D97-AF65-F5344CB8AC3E}">
-        <p14:creationId xmlns:p14="http://schemas.microsoft.com/office/powerpoint/2010/main" val="422245135"/>
+        <p14:creationId xmlns:p14="http://schemas.microsoft.com/office/powerpoint/2010/main" val="1780755753"/>
       </p:ext>
     </p:extLst>
   </p:cSld>
@@ -4382,6 +4596,108 @@
 </file>
 
 <file path=ppt/slides/slide14.xml><?xml version="1.0" encoding="utf-8"?>
+<p:sld xmlns:a="http://schemas.openxmlformats.org/drawingml/2006/main" xmlns:r="http://schemas.openxmlformats.org/officeDocument/2006/relationships" xmlns:p="http://schemas.openxmlformats.org/presentationml/2006/main" show="0">
+  <p:cSld>
+    <p:spTree>
+      <p:nvGrpSpPr>
+        <p:cNvPr id="1" name=""/>
+        <p:cNvGrpSpPr/>
+        <p:nvPr/>
+      </p:nvGrpSpPr>
+      <p:grpSpPr>
+        <a:xfrm>
+          <a:off x="0" y="0"/>
+          <a:ext cx="0" cy="0"/>
+          <a:chOff x="0" y="0"/>
+          <a:chExt cx="0" cy="0"/>
+        </a:xfrm>
+      </p:grpSpPr>
+      <p:sp>
+        <p:nvSpPr>
+          <p:cNvPr id="2" name="Title 1">
+            <a:extLst>
+              <a:ext uri="{FF2B5EF4-FFF2-40B4-BE49-F238E27FC236}">
+                <a16:creationId xmlns:a16="http://schemas.microsoft.com/office/drawing/2014/main" id="{E4E68650-F179-1B91-302C-0F3BF0AA3DED}"/>
+              </a:ext>
+            </a:extLst>
+          </p:cNvPr>
+          <p:cNvSpPr>
+            <a:spLocks noGrp="1"/>
+          </p:cNvSpPr>
+          <p:nvPr>
+            <p:ph type="title"/>
+          </p:nvPr>
+        </p:nvSpPr>
+        <p:spPr/>
+        <p:txBody>
+          <a:bodyPr/>
+          <a:lstStyle/>
+          <a:p>
+            <a:r>
+              <a:rPr lang="en-US" dirty="0"/>
+              <a:t>Objects, Inheritance, Composition</a:t>
+            </a:r>
+          </a:p>
+        </p:txBody>
+      </p:sp>
+      <p:sp>
+        <p:nvSpPr>
+          <p:cNvPr id="3" name="Content Placeholder 2">
+            <a:extLst>
+              <a:ext uri="{FF2B5EF4-FFF2-40B4-BE49-F238E27FC236}">
+                <a16:creationId xmlns:a16="http://schemas.microsoft.com/office/drawing/2014/main" id="{8A58448E-1F21-F3C9-27AB-16CB0D765E1F}"/>
+              </a:ext>
+            </a:extLst>
+          </p:cNvPr>
+          <p:cNvSpPr>
+            <a:spLocks noGrp="1"/>
+          </p:cNvSpPr>
+          <p:nvPr>
+            <p:ph idx="1"/>
+          </p:nvPr>
+        </p:nvSpPr>
+        <p:spPr/>
+        <p:txBody>
+          <a:bodyPr/>
+          <a:lstStyle/>
+          <a:p>
+            <a:r>
+              <a:rPr lang="en-US" dirty="0"/>
+              <a:t>OOP is a powerful way (to shoot yourself in the foot)</a:t>
+            </a:r>
+          </a:p>
+          <a:p>
+            <a:r>
+              <a:rPr lang="en-US" dirty="0"/>
+              <a:t>Composition over inheritance</a:t>
+            </a:r>
+          </a:p>
+          <a:p>
+            <a:pPr lvl="1"/>
+            <a:r>
+              <a:rPr lang="en-US" dirty="0"/>
+              <a:t>Promotes loose coupling</a:t>
+            </a:r>
+          </a:p>
+          <a:p>
+            <a:endParaRPr lang="en-US" dirty="0"/>
+          </a:p>
+        </p:txBody>
+      </p:sp>
+    </p:spTree>
+    <p:extLst>
+      <p:ext uri="{BB962C8B-B14F-4D97-AF65-F5344CB8AC3E}">
+        <p14:creationId xmlns:p14="http://schemas.microsoft.com/office/powerpoint/2010/main" val="1655773751"/>
+      </p:ext>
+    </p:extLst>
+  </p:cSld>
+  <p:clrMapOvr>
+    <a:masterClrMapping/>
+  </p:clrMapOvr>
+</p:sld>
+</file>
+
+<file path=ppt/slides/slide15.xml><?xml version="1.0" encoding="utf-8"?>
 <p:sld xmlns:a="http://schemas.openxmlformats.org/drawingml/2006/main" xmlns:r="http://schemas.openxmlformats.org/officeDocument/2006/relationships" xmlns:p="http://schemas.openxmlformats.org/presentationml/2006/main">
   <p:cSld>
     <p:spTree>
@@ -4400,10 +4716,10 @@
       </p:grpSpPr>
       <p:sp>
         <p:nvSpPr>
-          <p:cNvPr id="2" name="Title 1">
-            <a:extLst>
-              <a:ext uri="{FF2B5EF4-FFF2-40B4-BE49-F238E27FC236}">
-                <a16:creationId xmlns:a16="http://schemas.microsoft.com/office/drawing/2014/main" id="{6A8F51CC-96DA-A170-9BDF-CA1DDC3F0EAC}"/>
+          <p:cNvPr id="4" name="Title 3">
+            <a:extLst>
+              <a:ext uri="{FF2B5EF4-FFF2-40B4-BE49-F238E27FC236}">
+                <a16:creationId xmlns:a16="http://schemas.microsoft.com/office/drawing/2014/main" id="{6EC3678D-063F-76F6-4C7C-5CD29411F6FA}"/>
               </a:ext>
             </a:extLst>
           </p:cNvPr>
@@ -4421,40 +4737,43 @@
           <a:p>
             <a:r>
               <a:rPr lang="en-US" dirty="0"/>
-              <a:t>Design Patterns</a:t>
-            </a:r>
-          </a:p>
-        </p:txBody>
-      </p:sp>
-      <p:sp>
-        <p:nvSpPr>
-          <p:cNvPr id="3" name="Content Placeholder 2">
-            <a:extLst>
-              <a:ext uri="{FF2B5EF4-FFF2-40B4-BE49-F238E27FC236}">
-                <a16:creationId xmlns:a16="http://schemas.microsoft.com/office/drawing/2014/main" id="{6801696E-C8BF-648F-4248-7D21EF56C07D}"/>
-              </a:ext>
-            </a:extLst>
-          </p:cNvPr>
-          <p:cNvSpPr>
-            <a:spLocks noGrp="1"/>
-          </p:cNvSpPr>
-          <p:nvPr>
-            <p:ph idx="1"/>
-          </p:nvPr>
-        </p:nvSpPr>
-        <p:spPr/>
-        <p:txBody>
-          <a:bodyPr/>
-          <a:lstStyle/>
-          <a:p>
-            <a:endParaRPr lang="en-US"/>
+              <a:t>So what’s the deal?</a:t>
+            </a:r>
+          </a:p>
+        </p:txBody>
+      </p:sp>
+      <p:sp>
+        <p:nvSpPr>
+          <p:cNvPr id="5" name="Text Placeholder 4">
+            <a:extLst>
+              <a:ext uri="{FF2B5EF4-FFF2-40B4-BE49-F238E27FC236}">
+                <a16:creationId xmlns:a16="http://schemas.microsoft.com/office/drawing/2014/main" id="{3F5808C6-1C0D-7BBA-A58D-01E18830BE2C}"/>
+              </a:ext>
+            </a:extLst>
+          </p:cNvPr>
+          <p:cNvSpPr>
+            <a:spLocks noGrp="1"/>
+          </p:cNvSpPr>
+          <p:nvPr>
+            <p:ph type="body" idx="1"/>
+          </p:nvPr>
+        </p:nvSpPr>
+        <p:spPr/>
+        <p:txBody>
+          <a:bodyPr/>
+          <a:lstStyle/>
+          <a:p>
+            <a:r>
+              <a:rPr lang="en-US" dirty="0"/>
+              <a:t>How do you apply these ideas?</a:t>
+            </a:r>
           </a:p>
         </p:txBody>
       </p:sp>
     </p:spTree>
     <p:extLst>
       <p:ext uri="{BB962C8B-B14F-4D97-AF65-F5344CB8AC3E}">
-        <p14:creationId xmlns:p14="http://schemas.microsoft.com/office/powerpoint/2010/main" val="2815691481"/>
+        <p14:creationId xmlns:p14="http://schemas.microsoft.com/office/powerpoint/2010/main" val="3915962001"/>
       </p:ext>
     </p:extLst>
   </p:cSld>
@@ -4464,7 +4783,7 @@
 </p:sld>
 </file>
 
-<file path=ppt/slides/slide15.xml><?xml version="1.0" encoding="utf-8"?>
+<file path=ppt/slides/slide16.xml><?xml version="1.0" encoding="utf-8"?>
 <p:sld xmlns:a="http://schemas.openxmlformats.org/drawingml/2006/main" xmlns:r="http://schemas.openxmlformats.org/officeDocument/2006/relationships" xmlns:p="http://schemas.openxmlformats.org/presentationml/2006/main">
   <p:cSld>
     <p:spTree>
@@ -4568,7 +4887,7 @@
 </p:sld>
 </file>
 
-<file path=ppt/slides/slide16.xml><?xml version="1.0" encoding="utf-8"?>
+<file path=ppt/slides/slide17.xml><?xml version="1.0" encoding="utf-8"?>
 <p:sld xmlns:a="http://schemas.openxmlformats.org/drawingml/2006/main" xmlns:r="http://schemas.openxmlformats.org/officeDocument/2006/relationships" xmlns:p="http://schemas.openxmlformats.org/presentationml/2006/main">
   <p:cSld>
     <p:spTree>
@@ -4887,6 +5206,33 @@
           <a:bodyPr/>
           <a:lstStyle/>
           <a:p>
+            <a:r>
+              <a:rPr lang="en-US" dirty="0"/>
+              <a:t>Effectively 0 bugs</a:t>
+            </a:r>
+          </a:p>
+          <a:p>
+            <a:r>
+              <a:rPr lang="en-US" dirty="0"/>
+              <a:t>Safety-driven</a:t>
+            </a:r>
+          </a:p>
+          <a:p>
+            <a:r>
+              <a:rPr lang="en-US" dirty="0"/>
+              <a:t>Exhaustive specification, collaborative agreements, rigid change control</a:t>
+            </a:r>
+          </a:p>
+          <a:p>
+            <a:endParaRPr lang="en-US" dirty="0"/>
+          </a:p>
+          <a:p>
+            <a:r>
+              <a:rPr lang="en-US" dirty="0"/>
+              <a:t>The process is the product</a:t>
+            </a:r>
+          </a:p>
+          <a:p>
             <a:endParaRPr lang="en-US" dirty="0"/>
           </a:p>
         </p:txBody>
@@ -4901,6 +5247,199 @@
   <p:clrMapOvr>
     <a:masterClrMapping/>
   </p:clrMapOvr>
+  <p:timing>
+    <p:tnLst>
+      <p:par>
+        <p:cTn id="1" dur="indefinite" restart="never" nodeType="tmRoot">
+          <p:childTnLst>
+            <p:seq concurrent="1" nextAc="seek">
+              <p:cTn id="2" dur="indefinite" nodeType="mainSeq">
+                <p:childTnLst>
+                  <p:par>
+                    <p:cTn id="3" fill="hold">
+                      <p:stCondLst>
+                        <p:cond delay="indefinite"/>
+                      </p:stCondLst>
+                      <p:childTnLst>
+                        <p:par>
+                          <p:cTn id="4" fill="hold">
+                            <p:stCondLst>
+                              <p:cond delay="0"/>
+                            </p:stCondLst>
+                            <p:childTnLst>
+                              <p:par>
+                                <p:cTn id="5" presetID="1" presetClass="entr" presetSubtype="0" fill="hold" grpId="0" nodeType="clickEffect">
+                                  <p:stCondLst>
+                                    <p:cond delay="0"/>
+                                  </p:stCondLst>
+                                  <p:childTnLst>
+                                    <p:set>
+                                      <p:cBhvr>
+                                        <p:cTn id="6" dur="1" fill="hold">
+                                          <p:stCondLst>
+                                            <p:cond delay="0"/>
+                                          </p:stCondLst>
+                                        </p:cTn>
+                                        <p:tgtEl>
+                                          <p:spTgt spid="3">
+                                            <p:txEl>
+                                              <p:pRg st="0" end="0"/>
+                                            </p:txEl>
+                                          </p:spTgt>
+                                        </p:tgtEl>
+                                        <p:attrNameLst>
+                                          <p:attrName>style.visibility</p:attrName>
+                                        </p:attrNameLst>
+                                      </p:cBhvr>
+                                      <p:to>
+                                        <p:strVal val="visible"/>
+                                      </p:to>
+                                    </p:set>
+                                  </p:childTnLst>
+                                </p:cTn>
+                              </p:par>
+                              <p:par>
+                                <p:cTn id="7" presetID="1" presetClass="entr" presetSubtype="0" fill="hold" grpId="0" nodeType="withEffect">
+                                  <p:stCondLst>
+                                    <p:cond delay="0"/>
+                                  </p:stCondLst>
+                                  <p:childTnLst>
+                                    <p:set>
+                                      <p:cBhvr>
+                                        <p:cTn id="8" dur="1" fill="hold">
+                                          <p:stCondLst>
+                                            <p:cond delay="0"/>
+                                          </p:stCondLst>
+                                        </p:cTn>
+                                        <p:tgtEl>
+                                          <p:spTgt spid="3">
+                                            <p:txEl>
+                                              <p:pRg st="1" end="1"/>
+                                            </p:txEl>
+                                          </p:spTgt>
+                                        </p:tgtEl>
+                                        <p:attrNameLst>
+                                          <p:attrName>style.visibility</p:attrName>
+                                        </p:attrNameLst>
+                                      </p:cBhvr>
+                                      <p:to>
+                                        <p:strVal val="visible"/>
+                                      </p:to>
+                                    </p:set>
+                                  </p:childTnLst>
+                                </p:cTn>
+                              </p:par>
+                              <p:par>
+                                <p:cTn id="9" presetID="1" presetClass="entr" presetSubtype="0" fill="hold" grpId="0" nodeType="withEffect">
+                                  <p:stCondLst>
+                                    <p:cond delay="0"/>
+                                  </p:stCondLst>
+                                  <p:childTnLst>
+                                    <p:set>
+                                      <p:cBhvr>
+                                        <p:cTn id="10" dur="1" fill="hold">
+                                          <p:stCondLst>
+                                            <p:cond delay="0"/>
+                                          </p:stCondLst>
+                                        </p:cTn>
+                                        <p:tgtEl>
+                                          <p:spTgt spid="3">
+                                            <p:txEl>
+                                              <p:pRg st="2" end="2"/>
+                                            </p:txEl>
+                                          </p:spTgt>
+                                        </p:tgtEl>
+                                        <p:attrNameLst>
+                                          <p:attrName>style.visibility</p:attrName>
+                                        </p:attrNameLst>
+                                      </p:cBhvr>
+                                      <p:to>
+                                        <p:strVal val="visible"/>
+                                      </p:to>
+                                    </p:set>
+                                  </p:childTnLst>
+                                </p:cTn>
+                              </p:par>
+                            </p:childTnLst>
+                          </p:cTn>
+                        </p:par>
+                      </p:childTnLst>
+                    </p:cTn>
+                  </p:par>
+                  <p:par>
+                    <p:cTn id="11" fill="hold">
+                      <p:stCondLst>
+                        <p:cond delay="indefinite"/>
+                      </p:stCondLst>
+                      <p:childTnLst>
+                        <p:par>
+                          <p:cTn id="12" fill="hold">
+                            <p:stCondLst>
+                              <p:cond delay="0"/>
+                            </p:stCondLst>
+                            <p:childTnLst>
+                              <p:par>
+                                <p:cTn id="13" presetID="1" presetClass="entr" presetSubtype="0" fill="hold" grpId="0" nodeType="clickEffect">
+                                  <p:stCondLst>
+                                    <p:cond delay="0"/>
+                                  </p:stCondLst>
+                                  <p:childTnLst>
+                                    <p:set>
+                                      <p:cBhvr>
+                                        <p:cTn id="14" dur="1" fill="hold">
+                                          <p:stCondLst>
+                                            <p:cond delay="0"/>
+                                          </p:stCondLst>
+                                        </p:cTn>
+                                        <p:tgtEl>
+                                          <p:spTgt spid="3">
+                                            <p:txEl>
+                                              <p:pRg st="4" end="4"/>
+                                            </p:txEl>
+                                          </p:spTgt>
+                                        </p:tgtEl>
+                                        <p:attrNameLst>
+                                          <p:attrName>style.visibility</p:attrName>
+                                        </p:attrNameLst>
+                                      </p:cBhvr>
+                                      <p:to>
+                                        <p:strVal val="visible"/>
+                                      </p:to>
+                                    </p:set>
+                                  </p:childTnLst>
+                                </p:cTn>
+                              </p:par>
+                            </p:childTnLst>
+                          </p:cTn>
+                        </p:par>
+                      </p:childTnLst>
+                    </p:cTn>
+                  </p:par>
+                </p:childTnLst>
+              </p:cTn>
+              <p:prevCondLst>
+                <p:cond evt="onPrev" delay="0">
+                  <p:tgtEl>
+                    <p:sldTgt/>
+                  </p:tgtEl>
+                </p:cond>
+              </p:prevCondLst>
+              <p:nextCondLst>
+                <p:cond evt="onNext" delay="0">
+                  <p:tgtEl>
+                    <p:sldTgt/>
+                  </p:tgtEl>
+                </p:cond>
+              </p:nextCondLst>
+            </p:seq>
+          </p:childTnLst>
+        </p:cTn>
+      </p:par>
+    </p:tnLst>
+    <p:bldLst>
+      <p:bldP spid="3" grpId="0" uiExpand="1" build="p"/>
+    </p:bldLst>
+  </p:timing>
 </p:sld>
 </file>
 
@@ -4970,6 +5509,46 @@
           <a:bodyPr/>
           <a:lstStyle/>
           <a:p>
+            <a:r>
+              <a:rPr lang="en-US" dirty="0"/>
+              <a:t>We are uncovering better ways of developing software by doing it and helping others do it. Through this work we have come to value:</a:t>
+            </a:r>
+          </a:p>
+          <a:p>
+            <a:pPr lvl="1"/>
+            <a:r>
+              <a:rPr lang="en-US" dirty="0"/>
+              <a:t>Individuals and interactions over processes and tools</a:t>
+            </a:r>
+          </a:p>
+          <a:p>
+            <a:pPr lvl="1"/>
+            <a:r>
+              <a:rPr lang="en-US" dirty="0"/>
+              <a:t>Working software over comprehensive documentation</a:t>
+            </a:r>
+          </a:p>
+          <a:p>
+            <a:pPr lvl="1"/>
+            <a:r>
+              <a:rPr lang="en-US" dirty="0"/>
+              <a:t>Customer collaboration over contract negotiation</a:t>
+            </a:r>
+          </a:p>
+          <a:p>
+            <a:pPr lvl="1"/>
+            <a:r>
+              <a:rPr lang="en-US" dirty="0"/>
+              <a:t>Responding to change over following a plan</a:t>
+            </a:r>
+          </a:p>
+          <a:p>
+            <a:r>
+              <a:rPr lang="en-US" dirty="0"/>
+              <a:t>That is, while there is value in the items on the right, we value the items on the left more.</a:t>
+            </a:r>
+          </a:p>
+          <a:p>
             <a:endParaRPr lang="en-US" dirty="0"/>
           </a:p>
         </p:txBody>
@@ -4984,6 +5563,243 @@
   <p:clrMapOvr>
     <a:masterClrMapping/>
   </p:clrMapOvr>
+  <p:timing>
+    <p:tnLst>
+      <p:par>
+        <p:cTn id="1" dur="indefinite" restart="never" nodeType="tmRoot">
+          <p:childTnLst>
+            <p:seq concurrent="1" nextAc="seek">
+              <p:cTn id="2" dur="indefinite" nodeType="mainSeq">
+                <p:childTnLst>
+                  <p:par>
+                    <p:cTn id="3" fill="hold">
+                      <p:stCondLst>
+                        <p:cond delay="indefinite"/>
+                      </p:stCondLst>
+                      <p:childTnLst>
+                        <p:par>
+                          <p:cTn id="4" fill="hold">
+                            <p:stCondLst>
+                              <p:cond delay="0"/>
+                            </p:stCondLst>
+                            <p:childTnLst>
+                              <p:par>
+                                <p:cTn id="5" presetID="1" presetClass="entr" presetSubtype="0" fill="hold" grpId="0" nodeType="clickEffect">
+                                  <p:stCondLst>
+                                    <p:cond delay="0"/>
+                                  </p:stCondLst>
+                                  <p:childTnLst>
+                                    <p:set>
+                                      <p:cBhvr>
+                                        <p:cTn id="6" dur="1" fill="hold">
+                                          <p:stCondLst>
+                                            <p:cond delay="0"/>
+                                          </p:stCondLst>
+                                        </p:cTn>
+                                        <p:tgtEl>
+                                          <p:spTgt spid="3">
+                                            <p:txEl>
+                                              <p:pRg st="0" end="0"/>
+                                            </p:txEl>
+                                          </p:spTgt>
+                                        </p:tgtEl>
+                                        <p:attrNameLst>
+                                          <p:attrName>style.visibility</p:attrName>
+                                        </p:attrNameLst>
+                                      </p:cBhvr>
+                                      <p:to>
+                                        <p:strVal val="visible"/>
+                                      </p:to>
+                                    </p:set>
+                                  </p:childTnLst>
+                                </p:cTn>
+                              </p:par>
+                              <p:par>
+                                <p:cTn id="7" presetID="1" presetClass="entr" presetSubtype="0" fill="hold" grpId="0" nodeType="withEffect">
+                                  <p:stCondLst>
+                                    <p:cond delay="0"/>
+                                  </p:stCondLst>
+                                  <p:childTnLst>
+                                    <p:set>
+                                      <p:cBhvr>
+                                        <p:cTn id="8" dur="1" fill="hold">
+                                          <p:stCondLst>
+                                            <p:cond delay="0"/>
+                                          </p:stCondLst>
+                                        </p:cTn>
+                                        <p:tgtEl>
+                                          <p:spTgt spid="3">
+                                            <p:txEl>
+                                              <p:pRg st="1" end="1"/>
+                                            </p:txEl>
+                                          </p:spTgt>
+                                        </p:tgtEl>
+                                        <p:attrNameLst>
+                                          <p:attrName>style.visibility</p:attrName>
+                                        </p:attrNameLst>
+                                      </p:cBhvr>
+                                      <p:to>
+                                        <p:strVal val="visible"/>
+                                      </p:to>
+                                    </p:set>
+                                  </p:childTnLst>
+                                </p:cTn>
+                              </p:par>
+                              <p:par>
+                                <p:cTn id="9" presetID="1" presetClass="entr" presetSubtype="0" fill="hold" grpId="0" nodeType="withEffect">
+                                  <p:stCondLst>
+                                    <p:cond delay="0"/>
+                                  </p:stCondLst>
+                                  <p:childTnLst>
+                                    <p:set>
+                                      <p:cBhvr>
+                                        <p:cTn id="10" dur="1" fill="hold">
+                                          <p:stCondLst>
+                                            <p:cond delay="0"/>
+                                          </p:stCondLst>
+                                        </p:cTn>
+                                        <p:tgtEl>
+                                          <p:spTgt spid="3">
+                                            <p:txEl>
+                                              <p:pRg st="2" end="2"/>
+                                            </p:txEl>
+                                          </p:spTgt>
+                                        </p:tgtEl>
+                                        <p:attrNameLst>
+                                          <p:attrName>style.visibility</p:attrName>
+                                        </p:attrNameLst>
+                                      </p:cBhvr>
+                                      <p:to>
+                                        <p:strVal val="visible"/>
+                                      </p:to>
+                                    </p:set>
+                                  </p:childTnLst>
+                                </p:cTn>
+                              </p:par>
+                              <p:par>
+                                <p:cTn id="11" presetID="1" presetClass="entr" presetSubtype="0" fill="hold" grpId="0" nodeType="withEffect">
+                                  <p:stCondLst>
+                                    <p:cond delay="0"/>
+                                  </p:stCondLst>
+                                  <p:childTnLst>
+                                    <p:set>
+                                      <p:cBhvr>
+                                        <p:cTn id="12" dur="1" fill="hold">
+                                          <p:stCondLst>
+                                            <p:cond delay="0"/>
+                                          </p:stCondLst>
+                                        </p:cTn>
+                                        <p:tgtEl>
+                                          <p:spTgt spid="3">
+                                            <p:txEl>
+                                              <p:pRg st="3" end="3"/>
+                                            </p:txEl>
+                                          </p:spTgt>
+                                        </p:tgtEl>
+                                        <p:attrNameLst>
+                                          <p:attrName>style.visibility</p:attrName>
+                                        </p:attrNameLst>
+                                      </p:cBhvr>
+                                      <p:to>
+                                        <p:strVal val="visible"/>
+                                      </p:to>
+                                    </p:set>
+                                  </p:childTnLst>
+                                </p:cTn>
+                              </p:par>
+                              <p:par>
+                                <p:cTn id="13" presetID="1" presetClass="entr" presetSubtype="0" fill="hold" grpId="0" nodeType="withEffect">
+                                  <p:stCondLst>
+                                    <p:cond delay="0"/>
+                                  </p:stCondLst>
+                                  <p:childTnLst>
+                                    <p:set>
+                                      <p:cBhvr>
+                                        <p:cTn id="14" dur="1" fill="hold">
+                                          <p:stCondLst>
+                                            <p:cond delay="0"/>
+                                          </p:stCondLst>
+                                        </p:cTn>
+                                        <p:tgtEl>
+                                          <p:spTgt spid="3">
+                                            <p:txEl>
+                                              <p:pRg st="4" end="4"/>
+                                            </p:txEl>
+                                          </p:spTgt>
+                                        </p:tgtEl>
+                                        <p:attrNameLst>
+                                          <p:attrName>style.visibility</p:attrName>
+                                        </p:attrNameLst>
+                                      </p:cBhvr>
+                                      <p:to>
+                                        <p:strVal val="visible"/>
+                                      </p:to>
+                                    </p:set>
+                                  </p:childTnLst>
+                                </p:cTn>
+                              </p:par>
+                              <p:par>
+                                <p:cTn id="15" presetID="1" presetClass="entr" presetSubtype="0" fill="hold" grpId="0" nodeType="withEffect">
+                                  <p:stCondLst>
+                                    <p:cond delay="0"/>
+                                  </p:stCondLst>
+                                  <p:childTnLst>
+                                    <p:set>
+                                      <p:cBhvr>
+                                        <p:cTn id="16" dur="1" fill="hold">
+                                          <p:stCondLst>
+                                            <p:cond delay="0"/>
+                                          </p:stCondLst>
+                                        </p:cTn>
+                                        <p:tgtEl>
+                                          <p:spTgt spid="3">
+                                            <p:txEl>
+                                              <p:pRg st="5" end="5"/>
+                                            </p:txEl>
+                                          </p:spTgt>
+                                        </p:tgtEl>
+                                        <p:attrNameLst>
+                                          <p:attrName>style.visibility</p:attrName>
+                                        </p:attrNameLst>
+                                      </p:cBhvr>
+                                      <p:to>
+                                        <p:strVal val="visible"/>
+                                      </p:to>
+                                    </p:set>
+                                  </p:childTnLst>
+                                </p:cTn>
+                              </p:par>
+                            </p:childTnLst>
+                          </p:cTn>
+                        </p:par>
+                      </p:childTnLst>
+                    </p:cTn>
+                  </p:par>
+                </p:childTnLst>
+              </p:cTn>
+              <p:prevCondLst>
+                <p:cond evt="onPrev" delay="0">
+                  <p:tgtEl>
+                    <p:sldTgt/>
+                  </p:tgtEl>
+                </p:cond>
+              </p:prevCondLst>
+              <p:nextCondLst>
+                <p:cond evt="onNext" delay="0">
+                  <p:tgtEl>
+                    <p:sldTgt/>
+                  </p:tgtEl>
+                </p:cond>
+              </p:nextCondLst>
+            </p:seq>
+          </p:childTnLst>
+        </p:cTn>
+      </p:par>
+    </p:tnLst>
+    <p:bldLst>
+      <p:bldP spid="3" grpId="0" uiExpand="1" build="p"/>
+    </p:bldLst>
+  </p:timing>
 </p:sld>
 </file>
 
@@ -5032,31 +5848,678 @@
           </a:p>
         </p:txBody>
       </p:sp>
-      <p:sp>
-        <p:nvSpPr>
-          <p:cNvPr id="3" name="Content Placeholder 2">
-            <a:extLst>
-              <a:ext uri="{FF2B5EF4-FFF2-40B4-BE49-F238E27FC236}">
-                <a16:creationId xmlns:a16="http://schemas.microsoft.com/office/drawing/2014/main" id="{31F47369-03FB-9507-2EE0-C5BBC74764F4}"/>
-              </a:ext>
-            </a:extLst>
-          </p:cNvPr>
-          <p:cNvSpPr>
-            <a:spLocks noGrp="1"/>
-          </p:cNvSpPr>
+      <p:graphicFrame>
+        <p:nvGraphicFramePr>
+          <p:cNvPr id="4" name="Content Placeholder 3">
+            <a:extLst>
+              <a:ext uri="{FF2B5EF4-FFF2-40B4-BE49-F238E27FC236}">
+                <a16:creationId xmlns:a16="http://schemas.microsoft.com/office/drawing/2014/main" id="{AFDD7E23-D467-A263-5F9C-CEBB7508B736}"/>
+              </a:ext>
+            </a:extLst>
+          </p:cNvPr>
+          <p:cNvGraphicFramePr>
+            <a:graphicFrameLocks noGrp="1"/>
+          </p:cNvGraphicFramePr>
           <p:nvPr>
             <p:ph idx="1"/>
-          </p:nvPr>
-        </p:nvSpPr>
-        <p:spPr/>
-        <p:txBody>
-          <a:bodyPr/>
-          <a:lstStyle/>
-          <a:p>
-            <a:endParaRPr lang="en-US"/>
-          </a:p>
-        </p:txBody>
-      </p:sp>
+            <p:extLst>
+              <p:ext uri="{D42A27DB-BD31-4B8C-83A1-F6EECF244321}">
+                <p14:modId xmlns:p14="http://schemas.microsoft.com/office/powerpoint/2010/main" val="4128798571"/>
+              </p:ext>
+            </p:extLst>
+          </p:nvPr>
+        </p:nvGraphicFramePr>
+        <p:xfrm>
+          <a:off x="838200" y="1892532"/>
+          <a:ext cx="10515600" cy="3657600"/>
+        </p:xfrm>
+        <a:graphic>
+          <a:graphicData uri="http://schemas.openxmlformats.org/drawingml/2006/table">
+            <a:tbl>
+              <a:tblPr/>
+              <a:tblGrid>
+                <a:gridCol w="2724615">
+                  <a:extLst>
+                    <a:ext uri="{9D8B030D-6E8A-4147-A177-3AD203B41FA5}">
+                      <a16:colId xmlns:a16="http://schemas.microsoft.com/office/drawing/2014/main" val="1021654905"/>
+                    </a:ext>
+                  </a:extLst>
+                </a:gridCol>
+                <a:gridCol w="3930805">
+                  <a:extLst>
+                    <a:ext uri="{9D8B030D-6E8A-4147-A177-3AD203B41FA5}">
+                      <a16:colId xmlns:a16="http://schemas.microsoft.com/office/drawing/2014/main" val="3155938336"/>
+                    </a:ext>
+                  </a:extLst>
+                </a:gridCol>
+                <a:gridCol w="3860180">
+                  <a:extLst>
+                    <a:ext uri="{9D8B030D-6E8A-4147-A177-3AD203B41FA5}">
+                      <a16:colId xmlns:a16="http://schemas.microsoft.com/office/drawing/2014/main" val="4120404655"/>
+                    </a:ext>
+                  </a:extLst>
+                </a:gridCol>
+              </a:tblGrid>
+              <a:tr h="0">
+                <a:tc>
+                  <a:txBody>
+                    <a:bodyPr/>
+                    <a:lstStyle/>
+                    <a:p>
+                      <a:r>
+                        <a:rPr lang="en-US" b="1"/>
+                        <a:t>Aspect</a:t>
+                      </a:r>
+                    </a:p>
+                  </a:txBody>
+                  <a:tcPr anchor="ctr">
+                    <a:lnL>
+                      <a:noFill/>
+                    </a:lnL>
+                    <a:lnR>
+                      <a:noFill/>
+                    </a:lnR>
+                    <a:lnT>
+                      <a:noFill/>
+                    </a:lnT>
+                    <a:lnB>
+                      <a:noFill/>
+                    </a:lnB>
+                    <a:noFill/>
+                  </a:tcPr>
+                </a:tc>
+                <a:tc>
+                  <a:txBody>
+                    <a:bodyPr/>
+                    <a:lstStyle/>
+                    <a:p>
+                      <a:r>
+                        <a:rPr lang="en-US" b="1" dirty="0"/>
+                        <a:t>NASA Shuttle Software</a:t>
+                      </a:r>
+                    </a:p>
+                  </a:txBody>
+                  <a:tcPr anchor="ctr">
+                    <a:lnL>
+                      <a:noFill/>
+                    </a:lnL>
+                    <a:lnR>
+                      <a:noFill/>
+                    </a:lnR>
+                    <a:lnT>
+                      <a:noFill/>
+                    </a:lnT>
+                    <a:lnB>
+                      <a:noFill/>
+                    </a:lnB>
+                    <a:noFill/>
+                  </a:tcPr>
+                </a:tc>
+                <a:tc>
+                  <a:txBody>
+                    <a:bodyPr/>
+                    <a:lstStyle/>
+                    <a:p>
+                      <a:r>
+                        <a:rPr lang="en-US" b="1" dirty="0"/>
+                        <a:t>Typical Commercial Software</a:t>
+                      </a:r>
+                    </a:p>
+                  </a:txBody>
+                  <a:tcPr anchor="ctr">
+                    <a:lnL>
+                      <a:noFill/>
+                    </a:lnL>
+                    <a:lnR>
+                      <a:noFill/>
+                    </a:lnR>
+                    <a:lnT>
+                      <a:noFill/>
+                    </a:lnT>
+                    <a:lnB>
+                      <a:noFill/>
+                    </a:lnB>
+                    <a:noFill/>
+                  </a:tcPr>
+                </a:tc>
+                <a:extLst>
+                  <a:ext uri="{0D108BD9-81ED-4DB2-BD59-A6C34878D82A}">
+                    <a16:rowId xmlns:a16="http://schemas.microsoft.com/office/drawing/2014/main" val="3555299948"/>
+                  </a:ext>
+                </a:extLst>
+              </a:tr>
+              <a:tr h="0">
+                <a:tc>
+                  <a:txBody>
+                    <a:bodyPr/>
+                    <a:lstStyle/>
+                    <a:p>
+                      <a:r>
+                        <a:rPr lang="en-US" i="1" dirty="0"/>
+                        <a:t>Lines of Code</a:t>
+                      </a:r>
+                    </a:p>
+                  </a:txBody>
+                  <a:tcPr anchor="ctr">
+                    <a:lnL>
+                      <a:noFill/>
+                    </a:lnL>
+                    <a:lnR>
+                      <a:noFill/>
+                    </a:lnR>
+                    <a:lnT>
+                      <a:noFill/>
+                    </a:lnT>
+                    <a:lnB>
+                      <a:noFill/>
+                    </a:lnB>
+                    <a:noFill/>
+                  </a:tcPr>
+                </a:tc>
+                <a:tc>
+                  <a:txBody>
+                    <a:bodyPr/>
+                    <a:lstStyle/>
+                    <a:p>
+                      <a:r>
+                        <a:rPr lang="en-US" dirty="0"/>
+                        <a:t>~420,000 per version</a:t>
+                      </a:r>
+                    </a:p>
+                  </a:txBody>
+                  <a:tcPr anchor="ctr">
+                    <a:lnL>
+                      <a:noFill/>
+                    </a:lnL>
+                    <a:lnR>
+                      <a:noFill/>
+                    </a:lnR>
+                    <a:lnT>
+                      <a:noFill/>
+                    </a:lnT>
+                    <a:lnB>
+                      <a:noFill/>
+                    </a:lnB>
+                    <a:noFill/>
+                  </a:tcPr>
+                </a:tc>
+                <a:tc>
+                  <a:txBody>
+                    <a:bodyPr/>
+                    <a:lstStyle/>
+                    <a:p>
+                      <a:r>
+                        <a:rPr lang="en-US" dirty="0"/>
+                        <a:t>Similar or greater</a:t>
+                      </a:r>
+                    </a:p>
+                  </a:txBody>
+                  <a:tcPr anchor="ctr">
+                    <a:lnL>
+                      <a:noFill/>
+                    </a:lnL>
+                    <a:lnR>
+                      <a:noFill/>
+                    </a:lnR>
+                    <a:lnT>
+                      <a:noFill/>
+                    </a:lnT>
+                    <a:lnB>
+                      <a:noFill/>
+                    </a:lnB>
+                    <a:noFill/>
+                  </a:tcPr>
+                </a:tc>
+                <a:extLst>
+                  <a:ext uri="{0D108BD9-81ED-4DB2-BD59-A6C34878D82A}">
+                    <a16:rowId xmlns:a16="http://schemas.microsoft.com/office/drawing/2014/main" val="269196198"/>
+                  </a:ext>
+                </a:extLst>
+              </a:tr>
+              <a:tr h="0">
+                <a:tc>
+                  <a:txBody>
+                    <a:bodyPr/>
+                    <a:lstStyle/>
+                    <a:p>
+                      <a:r>
+                        <a:rPr lang="en-US" i="1" dirty="0"/>
+                        <a:t>Error Count per Version</a:t>
+                      </a:r>
+                    </a:p>
+                  </a:txBody>
+                  <a:tcPr anchor="ctr">
+                    <a:lnL>
+                      <a:noFill/>
+                    </a:lnL>
+                    <a:lnR>
+                      <a:noFill/>
+                    </a:lnR>
+                    <a:lnT>
+                      <a:noFill/>
+                    </a:lnT>
+                    <a:lnB>
+                      <a:noFill/>
+                    </a:lnB>
+                    <a:noFill/>
+                  </a:tcPr>
+                </a:tc>
+                <a:tc>
+                  <a:txBody>
+                    <a:bodyPr/>
+                    <a:lstStyle/>
+                    <a:p>
+                      <a:r>
+                        <a:rPr lang="en-US"/>
+                        <a:t>~1</a:t>
+                      </a:r>
+                    </a:p>
+                  </a:txBody>
+                  <a:tcPr anchor="ctr">
+                    <a:lnL>
+                      <a:noFill/>
+                    </a:lnL>
+                    <a:lnR>
+                      <a:noFill/>
+                    </a:lnR>
+                    <a:lnT>
+                      <a:noFill/>
+                    </a:lnT>
+                    <a:lnB>
+                      <a:noFill/>
+                    </a:lnB>
+                    <a:noFill/>
+                  </a:tcPr>
+                </a:tc>
+                <a:tc>
+                  <a:txBody>
+                    <a:bodyPr/>
+                    <a:lstStyle/>
+                    <a:p>
+                      <a:r>
+                        <a:rPr lang="en-US" dirty="0"/>
+                        <a:t>~100-1000</a:t>
+                      </a:r>
+                    </a:p>
+                  </a:txBody>
+                  <a:tcPr anchor="ctr">
+                    <a:lnL>
+                      <a:noFill/>
+                    </a:lnL>
+                    <a:lnR>
+                      <a:noFill/>
+                    </a:lnR>
+                    <a:lnT>
+                      <a:noFill/>
+                    </a:lnT>
+                    <a:lnB>
+                      <a:noFill/>
+                    </a:lnB>
+                    <a:noFill/>
+                  </a:tcPr>
+                </a:tc>
+                <a:extLst>
+                  <a:ext uri="{0D108BD9-81ED-4DB2-BD59-A6C34878D82A}">
+                    <a16:rowId xmlns:a16="http://schemas.microsoft.com/office/drawing/2014/main" val="4038265547"/>
+                  </a:ext>
+                </a:extLst>
+              </a:tr>
+              <a:tr h="0">
+                <a:tc>
+                  <a:txBody>
+                    <a:bodyPr/>
+                    <a:lstStyle/>
+                    <a:p>
+                      <a:r>
+                        <a:rPr lang="en-US" i="1" dirty="0"/>
+                        <a:t>Change Control</a:t>
+                      </a:r>
+                    </a:p>
+                  </a:txBody>
+                  <a:tcPr anchor="ctr">
+                    <a:lnL>
+                      <a:noFill/>
+                    </a:lnL>
+                    <a:lnR>
+                      <a:noFill/>
+                    </a:lnR>
+                    <a:lnT>
+                      <a:noFill/>
+                    </a:lnT>
+                    <a:lnB>
+                      <a:noFill/>
+                    </a:lnB>
+                    <a:noFill/>
+                  </a:tcPr>
+                </a:tc>
+                <a:tc>
+                  <a:txBody>
+                    <a:bodyPr/>
+                    <a:lstStyle/>
+                    <a:p>
+                      <a:r>
+                        <a:rPr lang="en-US"/>
+                        <a:t>Rigid, all changes must be agreed &amp; documented</a:t>
+                      </a:r>
+                    </a:p>
+                  </a:txBody>
+                  <a:tcPr anchor="ctr">
+                    <a:lnL>
+                      <a:noFill/>
+                    </a:lnL>
+                    <a:lnR>
+                      <a:noFill/>
+                    </a:lnR>
+                    <a:lnT>
+                      <a:noFill/>
+                    </a:lnT>
+                    <a:lnB>
+                      <a:noFill/>
+                    </a:lnB>
+                    <a:noFill/>
+                  </a:tcPr>
+                </a:tc>
+                <a:tc>
+                  <a:txBody>
+                    <a:bodyPr/>
+                    <a:lstStyle/>
+                    <a:p>
+                      <a:r>
+                        <a:rPr lang="en-US" dirty="0"/>
+                        <a:t>Flexible, often agile or approximate</a:t>
+                      </a:r>
+                    </a:p>
+                  </a:txBody>
+                  <a:tcPr anchor="ctr">
+                    <a:lnL>
+                      <a:noFill/>
+                    </a:lnL>
+                    <a:lnR>
+                      <a:noFill/>
+                    </a:lnR>
+                    <a:lnT>
+                      <a:noFill/>
+                    </a:lnT>
+                    <a:lnB>
+                      <a:noFill/>
+                    </a:lnB>
+                    <a:noFill/>
+                  </a:tcPr>
+                </a:tc>
+                <a:extLst>
+                  <a:ext uri="{0D108BD9-81ED-4DB2-BD59-A6C34878D82A}">
+                    <a16:rowId xmlns:a16="http://schemas.microsoft.com/office/drawing/2014/main" val="1115344324"/>
+                  </a:ext>
+                </a:extLst>
+              </a:tr>
+              <a:tr h="0">
+                <a:tc>
+                  <a:txBody>
+                    <a:bodyPr/>
+                    <a:lstStyle/>
+                    <a:p>
+                      <a:r>
+                        <a:rPr lang="en-US" i="1" dirty="0"/>
+                        <a:t>Redundancy</a:t>
+                      </a:r>
+                    </a:p>
+                  </a:txBody>
+                  <a:tcPr anchor="ctr">
+                    <a:lnL>
+                      <a:noFill/>
+                    </a:lnL>
+                    <a:lnR>
+                      <a:noFill/>
+                    </a:lnR>
+                    <a:lnT>
+                      <a:noFill/>
+                    </a:lnT>
+                    <a:lnB>
+                      <a:noFill/>
+                    </a:lnB>
+                    <a:noFill/>
+                  </a:tcPr>
+                </a:tc>
+                <a:tc>
+                  <a:txBody>
+                    <a:bodyPr/>
+                    <a:lstStyle/>
+                    <a:p>
+                      <a:r>
+                        <a:rPr lang="en-US" dirty="0"/>
+                        <a:t>Quadruple redundancy with voting system</a:t>
+                      </a:r>
+                    </a:p>
+                  </a:txBody>
+                  <a:tcPr anchor="ctr">
+                    <a:lnL>
+                      <a:noFill/>
+                    </a:lnL>
+                    <a:lnR>
+                      <a:noFill/>
+                    </a:lnR>
+                    <a:lnT>
+                      <a:noFill/>
+                    </a:lnT>
+                    <a:lnB>
+                      <a:noFill/>
+                    </a:lnB>
+                    <a:noFill/>
+                  </a:tcPr>
+                </a:tc>
+                <a:tc>
+                  <a:txBody>
+                    <a:bodyPr/>
+                    <a:lstStyle/>
+                    <a:p>
+                      <a:r>
+                        <a:rPr lang="en-US" dirty="0"/>
+                        <a:t>Rare</a:t>
+                      </a:r>
+                    </a:p>
+                  </a:txBody>
+                  <a:tcPr anchor="ctr">
+                    <a:lnL>
+                      <a:noFill/>
+                    </a:lnL>
+                    <a:lnR>
+                      <a:noFill/>
+                    </a:lnR>
+                    <a:lnT>
+                      <a:noFill/>
+                    </a:lnT>
+                    <a:lnB>
+                      <a:noFill/>
+                    </a:lnB>
+                    <a:noFill/>
+                  </a:tcPr>
+                </a:tc>
+                <a:extLst>
+                  <a:ext uri="{0D108BD9-81ED-4DB2-BD59-A6C34878D82A}">
+                    <a16:rowId xmlns:a16="http://schemas.microsoft.com/office/drawing/2014/main" val="1490886624"/>
+                  </a:ext>
+                </a:extLst>
+              </a:tr>
+              <a:tr h="0">
+                <a:tc>
+                  <a:txBody>
+                    <a:bodyPr/>
+                    <a:lstStyle/>
+                    <a:p>
+                      <a:r>
+                        <a:rPr lang="en-US" i="1" dirty="0"/>
+                        <a:t>Certification</a:t>
+                      </a:r>
+                    </a:p>
+                  </a:txBody>
+                  <a:tcPr anchor="ctr">
+                    <a:lnL>
+                      <a:noFill/>
+                    </a:lnL>
+                    <a:lnR>
+                      <a:noFill/>
+                    </a:lnR>
+                    <a:lnT>
+                      <a:noFill/>
+                    </a:lnT>
+                    <a:lnB>
+                      <a:noFill/>
+                    </a:lnB>
+                    <a:noFill/>
+                  </a:tcPr>
+                </a:tc>
+                <a:tc>
+                  <a:txBody>
+                    <a:bodyPr/>
+                    <a:lstStyle/>
+                    <a:p>
+                      <a:r>
+                        <a:rPr lang="en-US" dirty="0"/>
+                        <a:t>Mandatory human sign-off before every launch</a:t>
+                      </a:r>
+                    </a:p>
+                  </a:txBody>
+                  <a:tcPr anchor="ctr">
+                    <a:lnL>
+                      <a:noFill/>
+                    </a:lnL>
+                    <a:lnR>
+                      <a:noFill/>
+                    </a:lnR>
+                    <a:lnT>
+                      <a:noFill/>
+                    </a:lnT>
+                    <a:lnB>
+                      <a:noFill/>
+                    </a:lnB>
+                    <a:noFill/>
+                  </a:tcPr>
+                </a:tc>
+                <a:tc>
+                  <a:txBody>
+                    <a:bodyPr/>
+                    <a:lstStyle/>
+                    <a:p>
+                      <a:r>
+                        <a:rPr lang="en-US" dirty="0"/>
+                        <a:t>Usually no formal, legal gate sign-off</a:t>
+                      </a:r>
+                    </a:p>
+                  </a:txBody>
+                  <a:tcPr anchor="ctr">
+                    <a:lnL>
+                      <a:noFill/>
+                    </a:lnL>
+                    <a:lnR>
+                      <a:noFill/>
+                    </a:lnR>
+                    <a:lnT>
+                      <a:noFill/>
+                    </a:lnT>
+                    <a:lnB>
+                      <a:noFill/>
+                    </a:lnB>
+                    <a:noFill/>
+                  </a:tcPr>
+                </a:tc>
+                <a:extLst>
+                  <a:ext uri="{0D108BD9-81ED-4DB2-BD59-A6C34878D82A}">
+                    <a16:rowId xmlns:a16="http://schemas.microsoft.com/office/drawing/2014/main" val="3584108388"/>
+                  </a:ext>
+                </a:extLst>
+              </a:tr>
+              <a:tr h="0">
+                <a:tc>
+                  <a:txBody>
+                    <a:bodyPr/>
+                    <a:lstStyle/>
+                    <a:p>
+                      <a:r>
+                        <a:rPr lang="en-US" i="1" dirty="0"/>
+                        <a:t>Design Philosophy</a:t>
+                      </a:r>
+                    </a:p>
+                  </a:txBody>
+                  <a:tcPr anchor="ctr">
+                    <a:lnL>
+                      <a:noFill/>
+                    </a:lnL>
+                    <a:lnR>
+                      <a:noFill/>
+                    </a:lnR>
+                    <a:lnT>
+                      <a:noFill/>
+                    </a:lnT>
+                    <a:lnB>
+                      <a:noFill/>
+                    </a:lnB>
+                    <a:noFill/>
+                  </a:tcPr>
+                </a:tc>
+                <a:tc>
+                  <a:txBody>
+                    <a:bodyPr/>
+                    <a:lstStyle/>
+                    <a:p>
+                      <a:r>
+                        <a:rPr lang="en-US"/>
+                        <a:t>Blueprint-style specs; predict bugs early</a:t>
+                      </a:r>
+                    </a:p>
+                  </a:txBody>
+                  <a:tcPr anchor="ctr">
+                    <a:lnL>
+                      <a:noFill/>
+                    </a:lnL>
+                    <a:lnR>
+                      <a:noFill/>
+                    </a:lnR>
+                    <a:lnT>
+                      <a:noFill/>
+                    </a:lnT>
+                    <a:lnB>
+                      <a:noFill/>
+                    </a:lnB>
+                    <a:noFill/>
+                  </a:tcPr>
+                </a:tc>
+                <a:tc>
+                  <a:txBody>
+                    <a:bodyPr/>
+                    <a:lstStyle/>
+                    <a:p>
+                      <a:r>
+                        <a:rPr lang="en-US" dirty="0"/>
+                        <a:t>Iterative deployment; fix bugs post-launch</a:t>
+                      </a:r>
+                    </a:p>
+                  </a:txBody>
+                  <a:tcPr anchor="ctr">
+                    <a:lnL>
+                      <a:noFill/>
+                    </a:lnL>
+                    <a:lnR>
+                      <a:noFill/>
+                    </a:lnR>
+                    <a:lnT>
+                      <a:noFill/>
+                    </a:lnT>
+                    <a:lnB>
+                      <a:noFill/>
+                    </a:lnB>
+                    <a:noFill/>
+                  </a:tcPr>
+                </a:tc>
+                <a:extLst>
+                  <a:ext uri="{0D108BD9-81ED-4DB2-BD59-A6C34878D82A}">
+                    <a16:rowId xmlns:a16="http://schemas.microsoft.com/office/drawing/2014/main" val="3894334662"/>
+                  </a:ext>
+                </a:extLst>
+              </a:tr>
+            </a:tbl>
+          </a:graphicData>
+        </a:graphic>
+      </p:graphicFrame>
     </p:spTree>
     <p:extLst>
       <p:ext uri="{BB962C8B-B14F-4D97-AF65-F5344CB8AC3E}">
@@ -5067,6 +6530,81 @@
   <p:clrMapOvr>
     <a:masterClrMapping/>
   </p:clrMapOvr>
+  <p:timing>
+    <p:tnLst>
+      <p:par>
+        <p:cTn id="1" dur="indefinite" restart="never" nodeType="tmRoot">
+          <p:childTnLst>
+            <p:seq concurrent="1" nextAc="seek">
+              <p:cTn id="2" dur="indefinite" nodeType="mainSeq">
+                <p:childTnLst>
+                  <p:par>
+                    <p:cTn id="3" fill="hold">
+                      <p:stCondLst>
+                        <p:cond delay="indefinite"/>
+                      </p:stCondLst>
+                      <p:childTnLst>
+                        <p:par>
+                          <p:cTn id="4" fill="hold">
+                            <p:stCondLst>
+                              <p:cond delay="0"/>
+                            </p:stCondLst>
+                            <p:childTnLst>
+                              <p:par>
+                                <p:cTn id="5" presetID="1" presetClass="entr" presetSubtype="0" fill="hold" nodeType="clickEffect">
+                                  <p:stCondLst>
+                                    <p:cond delay="0"/>
+                                  </p:stCondLst>
+                                  <p:childTnLst>
+                                    <p:set>
+                                      <p:cBhvr>
+                                        <p:cTn id="6" dur="1" fill="hold">
+                                          <p:stCondLst>
+                                            <p:cond delay="0"/>
+                                          </p:stCondLst>
+                                        </p:cTn>
+                                        <p:tgtEl>
+                                          <p:spTgt spid="4"/>
+                                        </p:tgtEl>
+                                        <p:attrNameLst>
+                                          <p:attrName>style.visibility</p:attrName>
+                                        </p:attrNameLst>
+                                      </p:cBhvr>
+                                      <p:to>
+                                        <p:strVal val="visible"/>
+                                      </p:to>
+                                    </p:set>
+                                  </p:childTnLst>
+                                </p:cTn>
+                              </p:par>
+                            </p:childTnLst>
+                          </p:cTn>
+                        </p:par>
+                      </p:childTnLst>
+                    </p:cTn>
+                  </p:par>
+                </p:childTnLst>
+              </p:cTn>
+              <p:prevCondLst>
+                <p:cond evt="onPrev" delay="0">
+                  <p:tgtEl>
+                    <p:sldTgt/>
+                  </p:tgtEl>
+                </p:cond>
+              </p:prevCondLst>
+              <p:nextCondLst>
+                <p:cond evt="onNext" delay="0">
+                  <p:tgtEl>
+                    <p:sldTgt/>
+                  </p:tgtEl>
+                </p:cond>
+              </p:nextCondLst>
+            </p:seq>
+          </p:childTnLst>
+        </p:cTn>
+      </p:par>
+    </p:tnLst>
+  </p:timing>
 </p:sld>
 </file>
 
@@ -5139,7 +6677,7 @@
         </p:blipFill>
         <p:spPr>
           <a:xfrm>
-            <a:off x="1793020" y="886666"/>
+            <a:off x="1793020" y="663000"/>
             <a:ext cx="8605959" cy="5971334"/>
           </a:xfrm>
         </p:spPr>
@@ -5272,7 +6810,7 @@
           <a:p>
             <a:r>
               <a:rPr lang="en-US" dirty="0"/>
-              <a:t>Python Styling</a:t>
+              <a:t>Reducing Coding Faults</a:t>
             </a:r>
           </a:p>
         </p:txBody>
@@ -5298,7 +6836,10 @@
           <a:bodyPr/>
           <a:lstStyle/>
           <a:p>
-            <a:endParaRPr lang="en-US"/>
+            <a:r>
+              <a:rPr lang="en-US" dirty="0"/>
+              <a:t>Some thoughts &amp; techniques</a:t>
+            </a:r>
           </a:p>
         </p:txBody>
       </p:sp>
@@ -5337,7 +6878,7 @@
           <p:cNvPr id="2" name="Title 1">
             <a:extLst>
               <a:ext uri="{FF2B5EF4-FFF2-40B4-BE49-F238E27FC236}">
-                <a16:creationId xmlns:a16="http://schemas.microsoft.com/office/drawing/2014/main" id="{65EC6E67-3B0A-1EF6-AA22-1F17095DF0BA}"/>
+                <a16:creationId xmlns:a16="http://schemas.microsoft.com/office/drawing/2014/main" id="{9C2C6B46-0BEF-9BA7-B42C-693CB09800F0}"/>
               </a:ext>
             </a:extLst>
           </p:cNvPr>
@@ -5355,7 +6896,7 @@
           <a:p>
             <a:r>
               <a:rPr lang="en-US" dirty="0"/>
-              <a:t>PEP 8</a:t>
+              <a:t>PEP 20</a:t>
             </a:r>
           </a:p>
         </p:txBody>
@@ -5365,30 +6906,246 @@
           <p:cNvPr id="3" name="Content Placeholder 2">
             <a:extLst>
               <a:ext uri="{FF2B5EF4-FFF2-40B4-BE49-F238E27FC236}">
-                <a16:creationId xmlns:a16="http://schemas.microsoft.com/office/drawing/2014/main" id="{8C705516-98BC-2807-70B4-CDB97913C1E1}"/>
-              </a:ext>
-            </a:extLst>
-          </p:cNvPr>
-          <p:cNvSpPr>
-            <a:spLocks noGrp="1"/>
-          </p:cNvSpPr>
-          <p:nvPr>
-            <p:ph idx="1"/>
-          </p:nvPr>
-        </p:nvSpPr>
-        <p:spPr/>
-        <p:txBody>
-          <a:bodyPr/>
-          <a:lstStyle/>
-          <a:p>
-            <a:endParaRPr lang="en-US"/>
+                <a16:creationId xmlns:a16="http://schemas.microsoft.com/office/drawing/2014/main" id="{DE30EE1C-5514-D329-B647-BD69B8AE9B81}"/>
+              </a:ext>
+            </a:extLst>
+          </p:cNvPr>
+          <p:cNvSpPr>
+            <a:spLocks noGrp="1"/>
+          </p:cNvSpPr>
+          <p:nvPr>
+            <p:ph sz="half" idx="1"/>
+          </p:nvPr>
+        </p:nvSpPr>
+        <p:spPr/>
+        <p:txBody>
+          <a:bodyPr>
+            <a:normAutofit fontScale="70000" lnSpcReduction="20000"/>
+          </a:bodyPr>
+          <a:lstStyle/>
+          <a:p>
+            <a:pPr marL="514350" indent="-514350">
+              <a:buFont typeface="+mj-lt"/>
+              <a:buAutoNum type="arabicPeriod"/>
+            </a:pPr>
+            <a:r>
+              <a:rPr lang="en-US" dirty="0"/>
+              <a:t>Beautiful is better than ugly.</a:t>
+            </a:r>
+          </a:p>
+          <a:p>
+            <a:pPr marL="514350" indent="-514350">
+              <a:buFont typeface="+mj-lt"/>
+              <a:buAutoNum type="arabicPeriod"/>
+            </a:pPr>
+            <a:r>
+              <a:rPr lang="en-US" dirty="0"/>
+              <a:t>Explicit is better than implicit.</a:t>
+            </a:r>
+          </a:p>
+          <a:p>
+            <a:pPr marL="514350" indent="-514350">
+              <a:buFont typeface="+mj-lt"/>
+              <a:buAutoNum type="arabicPeriod"/>
+            </a:pPr>
+            <a:r>
+              <a:rPr lang="en-US" dirty="0"/>
+              <a:t>Simple is better than complex.</a:t>
+            </a:r>
+          </a:p>
+          <a:p>
+            <a:pPr marL="514350" indent="-514350">
+              <a:buFont typeface="+mj-lt"/>
+              <a:buAutoNum type="arabicPeriod"/>
+            </a:pPr>
+            <a:r>
+              <a:rPr lang="en-US" dirty="0"/>
+              <a:t>Complex is better than complicated.</a:t>
+            </a:r>
+          </a:p>
+          <a:p>
+            <a:pPr marL="514350" indent="-514350">
+              <a:buFont typeface="+mj-lt"/>
+              <a:buAutoNum type="arabicPeriod"/>
+            </a:pPr>
+            <a:r>
+              <a:rPr lang="en-US" dirty="0"/>
+              <a:t>Flat is better than nested.</a:t>
+            </a:r>
+          </a:p>
+          <a:p>
+            <a:pPr marL="514350" indent="-514350">
+              <a:buFont typeface="+mj-lt"/>
+              <a:buAutoNum type="arabicPeriod"/>
+            </a:pPr>
+            <a:r>
+              <a:rPr lang="en-US" dirty="0"/>
+              <a:t>Sparse is better than dense.</a:t>
+            </a:r>
+          </a:p>
+          <a:p>
+            <a:pPr marL="514350" indent="-514350">
+              <a:buFont typeface="+mj-lt"/>
+              <a:buAutoNum type="arabicPeriod"/>
+            </a:pPr>
+            <a:r>
+              <a:rPr lang="en-US" dirty="0"/>
+              <a:t>Readability counts.</a:t>
+            </a:r>
+          </a:p>
+          <a:p>
+            <a:pPr marL="514350" indent="-514350">
+              <a:buFont typeface="+mj-lt"/>
+              <a:buAutoNum type="arabicPeriod"/>
+            </a:pPr>
+            <a:r>
+              <a:rPr lang="en-US" dirty="0"/>
+              <a:t>Special cases aren't special enough to break the rules.</a:t>
+            </a:r>
+          </a:p>
+          <a:p>
+            <a:pPr marL="514350" indent="-514350">
+              <a:buFont typeface="+mj-lt"/>
+              <a:buAutoNum type="arabicPeriod"/>
+            </a:pPr>
+            <a:r>
+              <a:rPr lang="en-US" dirty="0"/>
+              <a:t>Although practicality beats purity.</a:t>
+            </a:r>
+          </a:p>
+          <a:p>
+            <a:pPr marL="514350" indent="-514350">
+              <a:buFont typeface="+mj-lt"/>
+              <a:buAutoNum type="arabicPeriod"/>
+            </a:pPr>
+            <a:r>
+              <a:rPr lang="en-US" dirty="0"/>
+              <a:t>Errors should never pass silently.</a:t>
+            </a:r>
+          </a:p>
+          <a:p>
+            <a:pPr marL="514350" indent="-514350">
+              <a:buFont typeface="+mj-lt"/>
+              <a:buAutoNum type="arabicPeriod"/>
+            </a:pPr>
+            <a:r>
+              <a:rPr lang="en-US" dirty="0"/>
+              <a:t>Unless explicitly silenced.</a:t>
+            </a:r>
+          </a:p>
+          <a:p>
+            <a:endParaRPr lang="en-US" dirty="0"/>
+          </a:p>
+        </p:txBody>
+      </p:sp>
+      <p:sp>
+        <p:nvSpPr>
+          <p:cNvPr id="5" name="Content Placeholder 4">
+            <a:extLst>
+              <a:ext uri="{FF2B5EF4-FFF2-40B4-BE49-F238E27FC236}">
+                <a16:creationId xmlns:a16="http://schemas.microsoft.com/office/drawing/2014/main" id="{F2F048F9-DD31-4CF5-2F87-72A32D5DB426}"/>
+              </a:ext>
+            </a:extLst>
+          </p:cNvPr>
+          <p:cNvSpPr>
+            <a:spLocks noGrp="1"/>
+          </p:cNvSpPr>
+          <p:nvPr>
+            <p:ph sz="half" idx="2"/>
+          </p:nvPr>
+        </p:nvSpPr>
+        <p:spPr/>
+        <p:txBody>
+          <a:bodyPr>
+            <a:normAutofit fontScale="70000" lnSpcReduction="20000"/>
+          </a:bodyPr>
+          <a:lstStyle/>
+          <a:p>
+            <a:pPr marL="514350" indent="-514350">
+              <a:buFont typeface="+mj-lt"/>
+              <a:buAutoNum type="arabicPeriod" startAt="12"/>
+            </a:pPr>
+            <a:r>
+              <a:rPr lang="en-US" dirty="0"/>
+              <a:t>In the face of ambiguity, refuse the temptation to guess.</a:t>
+            </a:r>
+          </a:p>
+          <a:p>
+            <a:pPr marL="514350" indent="-514350">
+              <a:buFont typeface="+mj-lt"/>
+              <a:buAutoNum type="arabicPeriod" startAt="12"/>
+            </a:pPr>
+            <a:r>
+              <a:rPr lang="en-US" dirty="0"/>
+              <a:t>There should be one-- and preferably only one --obvious way to do it.</a:t>
+            </a:r>
+          </a:p>
+          <a:p>
+            <a:pPr marL="514350" indent="-514350">
+              <a:buFont typeface="+mj-lt"/>
+              <a:buAutoNum type="arabicPeriod" startAt="12"/>
+            </a:pPr>
+            <a:r>
+              <a:rPr lang="en-US" dirty="0"/>
+              <a:t>Although that way may not be obvious at first unless you're Dutch.</a:t>
+            </a:r>
+          </a:p>
+          <a:p>
+            <a:pPr marL="514350" indent="-514350">
+              <a:buFont typeface="+mj-lt"/>
+              <a:buAutoNum type="arabicPeriod" startAt="12"/>
+            </a:pPr>
+            <a:r>
+              <a:rPr lang="en-US" dirty="0"/>
+              <a:t>Now is better than never.</a:t>
+            </a:r>
+          </a:p>
+          <a:p>
+            <a:pPr marL="514350" indent="-514350">
+              <a:buFont typeface="+mj-lt"/>
+              <a:buAutoNum type="arabicPeriod" startAt="12"/>
+            </a:pPr>
+            <a:r>
+              <a:rPr lang="en-US" dirty="0"/>
+              <a:t>Although never is often better than *right* now.</a:t>
+            </a:r>
+          </a:p>
+          <a:p>
+            <a:pPr marL="514350" indent="-514350">
+              <a:buFont typeface="+mj-lt"/>
+              <a:buAutoNum type="arabicPeriod" startAt="12"/>
+            </a:pPr>
+            <a:r>
+              <a:rPr lang="en-US" dirty="0"/>
+              <a:t>If the implementation is hard to explain, it's a bad idea.</a:t>
+            </a:r>
+          </a:p>
+          <a:p>
+            <a:pPr marL="514350" indent="-514350">
+              <a:buFont typeface="+mj-lt"/>
+              <a:buAutoNum type="arabicPeriod" startAt="12"/>
+            </a:pPr>
+            <a:r>
+              <a:rPr lang="en-US" dirty="0"/>
+              <a:t>If the implementation is easy to explain, it may be a good idea.</a:t>
+            </a:r>
+          </a:p>
+          <a:p>
+            <a:pPr marL="514350" indent="-514350">
+              <a:buFont typeface="+mj-lt"/>
+              <a:buAutoNum type="arabicPeriod" startAt="12"/>
+            </a:pPr>
+            <a:r>
+              <a:rPr lang="en-US" dirty="0"/>
+              <a:t>Namespaces are one honking great idea -- let's do more of those!</a:t>
+            </a:r>
           </a:p>
         </p:txBody>
       </p:sp>
     </p:spTree>
     <p:extLst>
       <p:ext uri="{BB962C8B-B14F-4D97-AF65-F5344CB8AC3E}">
-        <p14:creationId xmlns:p14="http://schemas.microsoft.com/office/powerpoint/2010/main" val="979563941"/>
+        <p14:creationId xmlns:p14="http://schemas.microsoft.com/office/powerpoint/2010/main" val="2485384477"/>
       </p:ext>
     </p:extLst>
   </p:cSld>
@@ -5420,7 +7177,7 @@
           <p:cNvPr id="2" name="Title 1">
             <a:extLst>
               <a:ext uri="{FF2B5EF4-FFF2-40B4-BE49-F238E27FC236}">
-                <a16:creationId xmlns:a16="http://schemas.microsoft.com/office/drawing/2014/main" id="{9C2C6B46-0BEF-9BA7-B42C-693CB09800F0}"/>
+                <a16:creationId xmlns:a16="http://schemas.microsoft.com/office/drawing/2014/main" id="{65EC6E67-3B0A-1EF6-AA22-1F17095DF0BA}"/>
               </a:ext>
             </a:extLst>
           </p:cNvPr>
@@ -5438,7 +7195,7 @@
           <a:p>
             <a:r>
               <a:rPr lang="en-US" dirty="0"/>
-              <a:t>PEP 20</a:t>
+              <a:t>PEP 8</a:t>
             </a:r>
           </a:p>
         </p:txBody>
@@ -5448,7 +7205,7 @@
           <p:cNvPr id="3" name="Content Placeholder 2">
             <a:extLst>
               <a:ext uri="{FF2B5EF4-FFF2-40B4-BE49-F238E27FC236}">
-                <a16:creationId xmlns:a16="http://schemas.microsoft.com/office/drawing/2014/main" id="{DE30EE1C-5514-D329-B647-BD69B8AE9B81}"/>
+                <a16:creationId xmlns:a16="http://schemas.microsoft.com/office/drawing/2014/main" id="{8C705516-98BC-2807-70B4-CDB97913C1E1}"/>
               </a:ext>
             </a:extLst>
           </p:cNvPr>
@@ -5464,14 +7221,78 @@
           <a:bodyPr/>
           <a:lstStyle/>
           <a:p>
-            <a:endParaRPr lang="en-US"/>
+            <a:r>
+              <a:rPr lang="en-US" dirty="0"/>
+              <a:t>Python Style Guide</a:t>
+            </a:r>
+          </a:p>
+          <a:p>
+            <a:r>
+              <a:rPr lang="en-US" dirty="0"/>
+              <a:t>Covers</a:t>
+            </a:r>
+          </a:p>
+          <a:p>
+            <a:pPr lvl="1"/>
+            <a:r>
+              <a:rPr lang="en-US" dirty="0"/>
+              <a:t>Indentation</a:t>
+            </a:r>
+          </a:p>
+          <a:p>
+            <a:pPr lvl="1"/>
+            <a:r>
+              <a:rPr lang="en-US" dirty="0"/>
+              <a:t>Docstrings</a:t>
+            </a:r>
+          </a:p>
+          <a:p>
+            <a:pPr lvl="1"/>
+            <a:r>
+              <a:rPr lang="en-US" dirty="0"/>
+              <a:t>Long code lines</a:t>
+            </a:r>
+          </a:p>
+          <a:p>
+            <a:pPr lvl="1"/>
+            <a:r>
+              <a:rPr lang="en-US" dirty="0"/>
+              <a:t>Whitespace in a line</a:t>
+            </a:r>
+          </a:p>
+          <a:p>
+            <a:pPr lvl="1"/>
+            <a:r>
+              <a:rPr lang="en-US" dirty="0"/>
+              <a:t>Comments</a:t>
+            </a:r>
+          </a:p>
+          <a:p>
+            <a:pPr lvl="1"/>
+            <a:r>
+              <a:rPr lang="en-US" dirty="0"/>
+              <a:t>Naming conventions</a:t>
+            </a:r>
+          </a:p>
+          <a:p>
+            <a:pPr lvl="1"/>
+            <a:r>
+              <a:rPr lang="en-US" dirty="0"/>
+              <a:t>And more!</a:t>
+            </a:r>
+          </a:p>
+          <a:p>
+            <a:r>
+              <a:rPr lang="en-US" dirty="0"/>
+              <a:t>Why is style important?</a:t>
+            </a:r>
           </a:p>
         </p:txBody>
       </p:sp>
     </p:spTree>
     <p:extLst>
       <p:ext uri="{BB962C8B-B14F-4D97-AF65-F5344CB8AC3E}">
-        <p14:creationId xmlns:p14="http://schemas.microsoft.com/office/powerpoint/2010/main" val="2485384477"/>
+        <p14:creationId xmlns:p14="http://schemas.microsoft.com/office/powerpoint/2010/main" val="979563941"/>
       </p:ext>
     </p:extLst>
   </p:cSld>

</xml_diff>

<commit_message>
adds initial exercise for clean code
</commit_message>
<xml_diff>
--- a/lesson09/Clean Code/Writing Clean Code.pptx
+++ b/lesson09/Clean Code/Writing Clean Code.pptx
@@ -5,7 +5,7 @@
     <p:sldMasterId id="2147483648" r:id="rId1"/>
   </p:sldMasterIdLst>
   <p:notesMasterIdLst>
-    <p:notesMasterId r:id="rId19"/>
+    <p:notesMasterId r:id="rId18"/>
   </p:notesMasterIdLst>
   <p:sldIdLst>
     <p:sldId id="256" r:id="rId2"/>
@@ -20,11 +20,10 @@
     <p:sldId id="259" r:id="rId11"/>
     <p:sldId id="266" r:id="rId12"/>
     <p:sldId id="267" r:id="rId13"/>
-    <p:sldId id="272" r:id="rId14"/>
-    <p:sldId id="264" r:id="rId15"/>
-    <p:sldId id="265" r:id="rId16"/>
-    <p:sldId id="268" r:id="rId17"/>
-    <p:sldId id="269" r:id="rId18"/>
+    <p:sldId id="264" r:id="rId14"/>
+    <p:sldId id="265" r:id="rId15"/>
+    <p:sldId id="273" r:id="rId16"/>
+    <p:sldId id="274" r:id="rId17"/>
   </p:sldIdLst>
   <p:sldSz cx="12192000" cy="6858000"/>
   <p:notesSz cx="6858000" cy="9144000"/>
@@ -707,12 +706,15 @@
           <a:bodyPr/>
           <a:lstStyle/>
           <a:p>
-            <a:endParaRPr lang="en-US" dirty="0"/>
-          </a:p>
-          <a:p>
-            <a:r>
-              <a:rPr lang="en-US" dirty="0"/>
-              <a:t>https://dev.to/romansery/why-you-should-favor-composition-over-inheritance-57m6</a:t>
+            <a:r>
+              <a:rPr lang="en-US" dirty="0"/>
+              <a:t>Just an intro that these ideas exist</a:t>
+            </a:r>
+          </a:p>
+          <a:p>
+            <a:r>
+              <a:rPr lang="en-US" dirty="0"/>
+              <a:t>https://refactoring.guru/design-patterns/catalog</a:t>
             </a:r>
           </a:p>
         </p:txBody>
@@ -734,7 +736,7 @@
           <a:p>
             <a:fld id="{09279270-E9D6-4AB0-B8D4-A4702B609EB2}" type="slidenum">
               <a:rPr lang="en-US" smtClean="0"/>
-              <a:t>14</a:t>
+              <a:t>12</a:t>
             </a:fld>
             <a:endParaRPr lang="en-US"/>
           </a:p>
@@ -743,7 +745,7 @@
     </p:spTree>
     <p:extLst>
       <p:ext uri="{BB962C8B-B14F-4D97-AF65-F5344CB8AC3E}">
-        <p14:creationId xmlns:p14="http://schemas.microsoft.com/office/powerpoint/2010/main" val="3642034805"/>
+        <p14:creationId xmlns:p14="http://schemas.microsoft.com/office/powerpoint/2010/main" val="3677552764"/>
       </p:ext>
     </p:extLst>
   </p:cSld>
@@ -797,9 +799,12 @@
           <a:bodyPr/>
           <a:lstStyle/>
           <a:p>
-            <a:r>
-              <a:rPr lang="en-US" dirty="0"/>
-              <a:t>We’ll look at select examples moving forward</a:t>
+            <a:endParaRPr lang="en-US" dirty="0"/>
+          </a:p>
+          <a:p>
+            <a:r>
+              <a:rPr lang="en-US" dirty="0"/>
+              <a:t>https://dev.to/romansery/why-you-should-favor-composition-over-inheritance-57m6</a:t>
             </a:r>
           </a:p>
         </p:txBody>
@@ -821,7 +826,7 @@
           <a:p>
             <a:fld id="{09279270-E9D6-4AB0-B8D4-A4702B609EB2}" type="slidenum">
               <a:rPr lang="en-US" smtClean="0"/>
-              <a:t>15</a:t>
+              <a:t>13</a:t>
             </a:fld>
             <a:endParaRPr lang="en-US"/>
           </a:p>
@@ -830,7 +835,7 @@
     </p:spTree>
     <p:extLst>
       <p:ext uri="{BB962C8B-B14F-4D97-AF65-F5344CB8AC3E}">
-        <p14:creationId xmlns:p14="http://schemas.microsoft.com/office/powerpoint/2010/main" val="329043299"/>
+        <p14:creationId xmlns:p14="http://schemas.microsoft.com/office/powerpoint/2010/main" val="3642034805"/>
       </p:ext>
     </p:extLst>
   </p:cSld>
@@ -886,7 +891,7 @@
           <a:p>
             <a:r>
               <a:rPr lang="en-US" dirty="0"/>
-              <a:t>https://github.com/analysis-tools-dev/dynamic-analysis?tab=readme-ov-file#python</a:t>
+              <a:t>We’ll look at select examples moving forward</a:t>
             </a:r>
           </a:p>
         </p:txBody>
@@ -908,7 +913,7 @@
           <a:p>
             <a:fld id="{09279270-E9D6-4AB0-B8D4-A4702B609EB2}" type="slidenum">
               <a:rPr lang="en-US" smtClean="0"/>
-              <a:t>17</a:t>
+              <a:t>14</a:t>
             </a:fld>
             <a:endParaRPr lang="en-US"/>
           </a:p>
@@ -917,7 +922,7 @@
     </p:spTree>
     <p:extLst>
       <p:ext uri="{BB962C8B-B14F-4D97-AF65-F5344CB8AC3E}">
-        <p14:creationId xmlns:p14="http://schemas.microsoft.com/office/powerpoint/2010/main" val="3240961306"/>
+        <p14:creationId xmlns:p14="http://schemas.microsoft.com/office/powerpoint/2010/main" val="329043299"/>
       </p:ext>
     </p:extLst>
   </p:cSld>
@@ -4416,6 +4421,36 @@
           </a:p>
         </p:txBody>
       </p:sp>
+      <p:pic>
+        <p:nvPicPr>
+          <p:cNvPr id="5" name="Picture 4">
+            <a:extLst>
+              <a:ext uri="{FF2B5EF4-FFF2-40B4-BE49-F238E27FC236}">
+                <a16:creationId xmlns:a16="http://schemas.microsoft.com/office/drawing/2014/main" id="{DF6AE88B-382C-412D-21D1-0919D2DC7AB7}"/>
+              </a:ext>
+            </a:extLst>
+          </p:cNvPr>
+          <p:cNvPicPr>
+            <a:picLocks noChangeAspect="1"/>
+          </p:cNvPicPr>
+          <p:nvPr/>
+        </p:nvPicPr>
+        <p:blipFill>
+          <a:blip r:embed="rId3"/>
+          <a:stretch>
+            <a:fillRect/>
+          </a:stretch>
+        </p:blipFill>
+        <p:spPr>
+          <a:xfrm>
+            <a:off x="3185640" y="5092530"/>
+            <a:ext cx="5001323" cy="1219370"/>
+          </a:xfrm>
+          <a:prstGeom prst="rect">
+            <a:avLst/>
+          </a:prstGeom>
+        </p:spPr>
+      </p:pic>
     </p:spTree>
     <p:extLst>
       <p:ext uri="{BB962C8B-B14F-4D97-AF65-F5344CB8AC3E}">
@@ -4426,6 +4461,81 @@
   <p:clrMapOvr>
     <a:masterClrMapping/>
   </p:clrMapOvr>
+  <p:timing>
+    <p:tnLst>
+      <p:par>
+        <p:cTn id="1" dur="indefinite" restart="never" nodeType="tmRoot">
+          <p:childTnLst>
+            <p:seq concurrent="1" nextAc="seek">
+              <p:cTn id="2" dur="indefinite" nodeType="mainSeq">
+                <p:childTnLst>
+                  <p:par>
+                    <p:cTn id="3" fill="hold">
+                      <p:stCondLst>
+                        <p:cond delay="indefinite"/>
+                      </p:stCondLst>
+                      <p:childTnLst>
+                        <p:par>
+                          <p:cTn id="4" fill="hold">
+                            <p:stCondLst>
+                              <p:cond delay="0"/>
+                            </p:stCondLst>
+                            <p:childTnLst>
+                              <p:par>
+                                <p:cTn id="5" presetID="1" presetClass="entr" presetSubtype="0" fill="hold" nodeType="clickEffect">
+                                  <p:stCondLst>
+                                    <p:cond delay="0"/>
+                                  </p:stCondLst>
+                                  <p:childTnLst>
+                                    <p:set>
+                                      <p:cBhvr>
+                                        <p:cTn id="6" dur="1" fill="hold">
+                                          <p:stCondLst>
+                                            <p:cond delay="0"/>
+                                          </p:stCondLst>
+                                        </p:cTn>
+                                        <p:tgtEl>
+                                          <p:spTgt spid="5"/>
+                                        </p:tgtEl>
+                                        <p:attrNameLst>
+                                          <p:attrName>style.visibility</p:attrName>
+                                        </p:attrNameLst>
+                                      </p:cBhvr>
+                                      <p:to>
+                                        <p:strVal val="visible"/>
+                                      </p:to>
+                                    </p:set>
+                                  </p:childTnLst>
+                                </p:cTn>
+                              </p:par>
+                            </p:childTnLst>
+                          </p:cTn>
+                        </p:par>
+                      </p:childTnLst>
+                    </p:cTn>
+                  </p:par>
+                </p:childTnLst>
+              </p:cTn>
+              <p:prevCondLst>
+                <p:cond evt="onPrev" delay="0">
+                  <p:tgtEl>
+                    <p:sldTgt/>
+                  </p:tgtEl>
+                </p:cond>
+              </p:prevCondLst>
+              <p:nextCondLst>
+                <p:cond evt="onNext" delay="0">
+                  <p:tgtEl>
+                    <p:sldTgt/>
+                  </p:tgtEl>
+                </p:cond>
+              </p:nextCondLst>
+            </p:seq>
+          </p:childTnLst>
+        </p:cTn>
+      </p:par>
+    </p:tnLst>
+  </p:timing>
 </p:sld>
 </file>
 
@@ -4495,7 +4605,22 @@
           <a:bodyPr/>
           <a:lstStyle/>
           <a:p>
-            <a:endParaRPr lang="en-US" dirty="0"/>
+            <a:r>
+              <a:rPr lang="en-US" dirty="0"/>
+              <a:t>Creational – How do we make objects?</a:t>
+            </a:r>
+          </a:p>
+          <a:p>
+            <a:r>
+              <a:rPr lang="en-US" dirty="0"/>
+              <a:t>Structural – How do we structure our objects?</a:t>
+            </a:r>
+          </a:p>
+          <a:p>
+            <a:r>
+              <a:rPr lang="en-US" dirty="0"/>
+              <a:t>Behavioral – How do our objects interact?</a:t>
+            </a:r>
           </a:p>
         </p:txBody>
       </p:sp>
@@ -4513,6 +4638,108 @@
 </file>
 
 <file path=ppt/slides/slide13.xml><?xml version="1.0" encoding="utf-8"?>
+<p:sld xmlns:a="http://schemas.openxmlformats.org/drawingml/2006/main" xmlns:r="http://schemas.openxmlformats.org/officeDocument/2006/relationships" xmlns:p="http://schemas.openxmlformats.org/presentationml/2006/main" show="0">
+  <p:cSld>
+    <p:spTree>
+      <p:nvGrpSpPr>
+        <p:cNvPr id="1" name=""/>
+        <p:cNvGrpSpPr/>
+        <p:nvPr/>
+      </p:nvGrpSpPr>
+      <p:grpSpPr>
+        <a:xfrm>
+          <a:off x="0" y="0"/>
+          <a:ext cx="0" cy="0"/>
+          <a:chOff x="0" y="0"/>
+          <a:chExt cx="0" cy="0"/>
+        </a:xfrm>
+      </p:grpSpPr>
+      <p:sp>
+        <p:nvSpPr>
+          <p:cNvPr id="2" name="Title 1">
+            <a:extLst>
+              <a:ext uri="{FF2B5EF4-FFF2-40B4-BE49-F238E27FC236}">
+                <a16:creationId xmlns:a16="http://schemas.microsoft.com/office/drawing/2014/main" id="{E4E68650-F179-1B91-302C-0F3BF0AA3DED}"/>
+              </a:ext>
+            </a:extLst>
+          </p:cNvPr>
+          <p:cNvSpPr>
+            <a:spLocks noGrp="1"/>
+          </p:cNvSpPr>
+          <p:nvPr>
+            <p:ph type="title"/>
+          </p:nvPr>
+        </p:nvSpPr>
+        <p:spPr/>
+        <p:txBody>
+          <a:bodyPr/>
+          <a:lstStyle/>
+          <a:p>
+            <a:r>
+              <a:rPr lang="en-US" dirty="0"/>
+              <a:t>Objects, Inheritance, Composition</a:t>
+            </a:r>
+          </a:p>
+        </p:txBody>
+      </p:sp>
+      <p:sp>
+        <p:nvSpPr>
+          <p:cNvPr id="3" name="Content Placeholder 2">
+            <a:extLst>
+              <a:ext uri="{FF2B5EF4-FFF2-40B4-BE49-F238E27FC236}">
+                <a16:creationId xmlns:a16="http://schemas.microsoft.com/office/drawing/2014/main" id="{8A58448E-1F21-F3C9-27AB-16CB0D765E1F}"/>
+              </a:ext>
+            </a:extLst>
+          </p:cNvPr>
+          <p:cNvSpPr>
+            <a:spLocks noGrp="1"/>
+          </p:cNvSpPr>
+          <p:nvPr>
+            <p:ph idx="1"/>
+          </p:nvPr>
+        </p:nvSpPr>
+        <p:spPr/>
+        <p:txBody>
+          <a:bodyPr/>
+          <a:lstStyle/>
+          <a:p>
+            <a:r>
+              <a:rPr lang="en-US" dirty="0"/>
+              <a:t>OOP is a powerful way (to shoot yourself in the foot)</a:t>
+            </a:r>
+          </a:p>
+          <a:p>
+            <a:r>
+              <a:rPr lang="en-US" dirty="0"/>
+              <a:t>Composition over inheritance</a:t>
+            </a:r>
+          </a:p>
+          <a:p>
+            <a:pPr lvl="1"/>
+            <a:r>
+              <a:rPr lang="en-US" dirty="0"/>
+              <a:t>Promotes loose coupling</a:t>
+            </a:r>
+          </a:p>
+          <a:p>
+            <a:endParaRPr lang="en-US" dirty="0"/>
+          </a:p>
+        </p:txBody>
+      </p:sp>
+    </p:spTree>
+    <p:extLst>
+      <p:ext uri="{BB962C8B-B14F-4D97-AF65-F5344CB8AC3E}">
+        <p14:creationId xmlns:p14="http://schemas.microsoft.com/office/powerpoint/2010/main" val="1655773751"/>
+      </p:ext>
+    </p:extLst>
+  </p:cSld>
+  <p:clrMapOvr>
+    <a:masterClrMapping/>
+  </p:clrMapOvr>
+</p:sld>
+</file>
+
+<file path=ppt/slides/slide14.xml><?xml version="1.0" encoding="utf-8"?>
 <p:sld xmlns:a="http://schemas.openxmlformats.org/drawingml/2006/main" xmlns:r="http://schemas.openxmlformats.org/officeDocument/2006/relationships" xmlns:p="http://schemas.openxmlformats.org/presentationml/2006/main">
   <p:cSld>
     <p:spTree>
@@ -4531,10 +4758,10 @@
       </p:grpSpPr>
       <p:sp>
         <p:nvSpPr>
-          <p:cNvPr id="2" name="Title 1">
-            <a:extLst>
-              <a:ext uri="{FF2B5EF4-FFF2-40B4-BE49-F238E27FC236}">
-                <a16:creationId xmlns:a16="http://schemas.microsoft.com/office/drawing/2014/main" id="{16A4661A-E272-E0C1-9D8D-18C21FC117C5}"/>
+          <p:cNvPr id="4" name="Title 3">
+            <a:extLst>
+              <a:ext uri="{FF2B5EF4-FFF2-40B4-BE49-F238E27FC236}">
+                <a16:creationId xmlns:a16="http://schemas.microsoft.com/office/drawing/2014/main" id="{6EC3678D-063F-76F6-4C7C-5CD29411F6FA}"/>
               </a:ext>
             </a:extLst>
           </p:cNvPr>
@@ -4552,142 +4779,90 @@
           <a:p>
             <a:r>
               <a:rPr lang="en-US" dirty="0"/>
-              <a:t>Performance Anxiety</a:t>
-            </a:r>
-          </a:p>
-        </p:txBody>
-      </p:sp>
-      <p:sp>
-        <p:nvSpPr>
-          <p:cNvPr id="3" name="Content Placeholder 2">
-            <a:extLst>
-              <a:ext uri="{FF2B5EF4-FFF2-40B4-BE49-F238E27FC236}">
-                <a16:creationId xmlns:a16="http://schemas.microsoft.com/office/drawing/2014/main" id="{A9572724-EC4A-0F20-01CF-93A08B47F8D5}"/>
-              </a:ext>
-            </a:extLst>
-          </p:cNvPr>
-          <p:cNvSpPr>
-            <a:spLocks noGrp="1"/>
-          </p:cNvSpPr>
-          <p:nvPr>
-            <p:ph idx="1"/>
-          </p:nvPr>
-        </p:nvSpPr>
-        <p:spPr/>
-        <p:txBody>
-          <a:bodyPr/>
-          <a:lstStyle/>
-          <a:p>
-            <a:endParaRPr lang="en-US"/>
-          </a:p>
-        </p:txBody>
-      </p:sp>
+              <a:t>So what’s the deal?</a:t>
+            </a:r>
+          </a:p>
+        </p:txBody>
+      </p:sp>
+      <p:sp>
+        <p:nvSpPr>
+          <p:cNvPr id="5" name="Text Placeholder 4">
+            <a:extLst>
+              <a:ext uri="{FF2B5EF4-FFF2-40B4-BE49-F238E27FC236}">
+                <a16:creationId xmlns:a16="http://schemas.microsoft.com/office/drawing/2014/main" id="{3F5808C6-1C0D-7BBA-A58D-01E18830BE2C}"/>
+              </a:ext>
+            </a:extLst>
+          </p:cNvPr>
+          <p:cNvSpPr>
+            <a:spLocks noGrp="1"/>
+          </p:cNvSpPr>
+          <p:nvPr>
+            <p:ph type="body" idx="1"/>
+          </p:nvPr>
+        </p:nvSpPr>
+        <p:spPr/>
+        <p:txBody>
+          <a:bodyPr/>
+          <a:lstStyle/>
+          <a:p>
+            <a:r>
+              <a:rPr lang="en-US" dirty="0"/>
+              <a:t>How do you apply these ideas?</a:t>
+            </a:r>
+          </a:p>
+        </p:txBody>
+      </p:sp>
+      <p:pic>
+        <p:nvPicPr>
+          <p:cNvPr id="1026" name="Picture 2">
+            <a:extLst>
+              <a:ext uri="{FF2B5EF4-FFF2-40B4-BE49-F238E27FC236}">
+                <a16:creationId xmlns:a16="http://schemas.microsoft.com/office/drawing/2014/main" id="{2113968A-B5FD-D3CF-FDFC-1317B4946152}"/>
+              </a:ext>
+            </a:extLst>
+          </p:cNvPr>
+          <p:cNvPicPr>
+            <a:picLocks noChangeAspect="1" noChangeArrowheads="1"/>
+          </p:cNvPicPr>
+          <p:nvPr/>
+        </p:nvPicPr>
+        <p:blipFill>
+          <a:blip r:embed="rId3">
+            <a:extLst>
+              <a:ext uri="{28A0092B-C50C-407E-A947-70E740481C1C}">
+                <a14:useLocalDpi xmlns:a14="http://schemas.microsoft.com/office/drawing/2010/main" val="0"/>
+              </a:ext>
+            </a:extLst>
+          </a:blip>
+          <a:srcRect/>
+          <a:stretch>
+            <a:fillRect/>
+          </a:stretch>
+        </p:blipFill>
+        <p:spPr bwMode="auto">
+          <a:xfrm>
+            <a:off x="7123042" y="1872818"/>
+            <a:ext cx="4889083" cy="3526552"/>
+          </a:xfrm>
+          <a:prstGeom prst="rect">
+            <a:avLst/>
+          </a:prstGeom>
+          <a:noFill/>
+          <a:extLst>
+            <a:ext uri="{909E8E84-426E-40DD-AFC4-6F175D3DCCD1}">
+              <a14:hiddenFill xmlns:a14="http://schemas.microsoft.com/office/drawing/2010/main">
+                <a:solidFill>
+                  <a:srgbClr val="FFFFFF"/>
+                </a:solidFill>
+              </a14:hiddenFill>
+            </a:ext>
+          </a:extLst>
+        </p:spPr>
+      </p:pic>
     </p:spTree>
     <p:extLst>
       <p:ext uri="{BB962C8B-B14F-4D97-AF65-F5344CB8AC3E}">
-        <p14:creationId xmlns:p14="http://schemas.microsoft.com/office/powerpoint/2010/main" val="1780755753"/>
-      </p:ext>
-    </p:extLst>
-  </p:cSld>
-  <p:clrMapOvr>
-    <a:masterClrMapping/>
-  </p:clrMapOvr>
-</p:sld>
-</file>
-
-<file path=ppt/slides/slide14.xml><?xml version="1.0" encoding="utf-8"?>
-<p:sld xmlns:a="http://schemas.openxmlformats.org/drawingml/2006/main" xmlns:r="http://schemas.openxmlformats.org/officeDocument/2006/relationships" xmlns:p="http://schemas.openxmlformats.org/presentationml/2006/main" show="0">
-  <p:cSld>
-    <p:spTree>
-      <p:nvGrpSpPr>
-        <p:cNvPr id="1" name=""/>
-        <p:cNvGrpSpPr/>
-        <p:nvPr/>
-      </p:nvGrpSpPr>
-      <p:grpSpPr>
-        <a:xfrm>
-          <a:off x="0" y="0"/>
-          <a:ext cx="0" cy="0"/>
-          <a:chOff x="0" y="0"/>
-          <a:chExt cx="0" cy="0"/>
-        </a:xfrm>
-      </p:grpSpPr>
-      <p:sp>
-        <p:nvSpPr>
-          <p:cNvPr id="2" name="Title 1">
-            <a:extLst>
-              <a:ext uri="{FF2B5EF4-FFF2-40B4-BE49-F238E27FC236}">
-                <a16:creationId xmlns:a16="http://schemas.microsoft.com/office/drawing/2014/main" id="{E4E68650-F179-1B91-302C-0F3BF0AA3DED}"/>
-              </a:ext>
-            </a:extLst>
-          </p:cNvPr>
-          <p:cNvSpPr>
-            <a:spLocks noGrp="1"/>
-          </p:cNvSpPr>
-          <p:nvPr>
-            <p:ph type="title"/>
-          </p:nvPr>
-        </p:nvSpPr>
-        <p:spPr/>
-        <p:txBody>
-          <a:bodyPr/>
-          <a:lstStyle/>
-          <a:p>
-            <a:r>
-              <a:rPr lang="en-US" dirty="0"/>
-              <a:t>Objects, Inheritance, Composition</a:t>
-            </a:r>
-          </a:p>
-        </p:txBody>
-      </p:sp>
-      <p:sp>
-        <p:nvSpPr>
-          <p:cNvPr id="3" name="Content Placeholder 2">
-            <a:extLst>
-              <a:ext uri="{FF2B5EF4-FFF2-40B4-BE49-F238E27FC236}">
-                <a16:creationId xmlns:a16="http://schemas.microsoft.com/office/drawing/2014/main" id="{8A58448E-1F21-F3C9-27AB-16CB0D765E1F}"/>
-              </a:ext>
-            </a:extLst>
-          </p:cNvPr>
-          <p:cNvSpPr>
-            <a:spLocks noGrp="1"/>
-          </p:cNvSpPr>
-          <p:nvPr>
-            <p:ph idx="1"/>
-          </p:nvPr>
-        </p:nvSpPr>
-        <p:spPr/>
-        <p:txBody>
-          <a:bodyPr/>
-          <a:lstStyle/>
-          <a:p>
-            <a:r>
-              <a:rPr lang="en-US" dirty="0"/>
-              <a:t>OOP is a powerful way (to shoot yourself in the foot)</a:t>
-            </a:r>
-          </a:p>
-          <a:p>
-            <a:r>
-              <a:rPr lang="en-US" dirty="0"/>
-              <a:t>Composition over inheritance</a:t>
-            </a:r>
-          </a:p>
-          <a:p>
-            <a:pPr lvl="1"/>
-            <a:r>
-              <a:rPr lang="en-US" dirty="0"/>
-              <a:t>Promotes loose coupling</a:t>
-            </a:r>
-          </a:p>
-          <a:p>
-            <a:endParaRPr lang="en-US" dirty="0"/>
-          </a:p>
-        </p:txBody>
-      </p:sp>
-    </p:spTree>
-    <p:extLst>
-      <p:ext uri="{BB962C8B-B14F-4D97-AF65-F5344CB8AC3E}">
-        <p14:creationId xmlns:p14="http://schemas.microsoft.com/office/powerpoint/2010/main" val="1655773751"/>
+        <p14:creationId xmlns:p14="http://schemas.microsoft.com/office/powerpoint/2010/main" val="3915962001"/>
       </p:ext>
     </p:extLst>
   </p:cSld>
@@ -4719,7 +4894,7 @@
           <p:cNvPr id="4" name="Title 3">
             <a:extLst>
               <a:ext uri="{FF2B5EF4-FFF2-40B4-BE49-F238E27FC236}">
-                <a16:creationId xmlns:a16="http://schemas.microsoft.com/office/drawing/2014/main" id="{6EC3678D-063F-76F6-4C7C-5CD29411F6FA}"/>
+                <a16:creationId xmlns:a16="http://schemas.microsoft.com/office/drawing/2014/main" id="{921C4E34-4958-19FF-6EB6-B6C5B835614D}"/>
               </a:ext>
             </a:extLst>
           </p:cNvPr>
@@ -4737,17 +4912,17 @@
           <a:p>
             <a:r>
               <a:rPr lang="en-US" dirty="0"/>
-              <a:t>So what’s the deal?</a:t>
-            </a:r>
-          </a:p>
-        </p:txBody>
-      </p:sp>
-      <p:sp>
-        <p:nvSpPr>
-          <p:cNvPr id="5" name="Text Placeholder 4">
-            <a:extLst>
-              <a:ext uri="{FF2B5EF4-FFF2-40B4-BE49-F238E27FC236}">
-                <a16:creationId xmlns:a16="http://schemas.microsoft.com/office/drawing/2014/main" id="{3F5808C6-1C0D-7BBA-A58D-01E18830BE2C}"/>
+              <a:t>Tooling and Techniques</a:t>
+            </a:r>
+          </a:p>
+        </p:txBody>
+      </p:sp>
+      <p:sp>
+        <p:nvSpPr>
+          <p:cNvPr id="7" name="Text Placeholder 6">
+            <a:extLst>
+              <a:ext uri="{FF2B5EF4-FFF2-40B4-BE49-F238E27FC236}">
+                <a16:creationId xmlns:a16="http://schemas.microsoft.com/office/drawing/2014/main" id="{E025D94D-7111-E8AB-2012-E40F17186317}"/>
               </a:ext>
             </a:extLst>
           </p:cNvPr>
@@ -4765,15 +4940,175 @@
           <a:p>
             <a:r>
               <a:rPr lang="en-US" dirty="0"/>
-              <a:t>How do you apply these ideas?</a:t>
-            </a:r>
+              <a:t>Techniques</a:t>
+            </a:r>
+          </a:p>
+        </p:txBody>
+      </p:sp>
+      <p:sp>
+        <p:nvSpPr>
+          <p:cNvPr id="5" name="Content Placeholder 4">
+            <a:extLst>
+              <a:ext uri="{FF2B5EF4-FFF2-40B4-BE49-F238E27FC236}">
+                <a16:creationId xmlns:a16="http://schemas.microsoft.com/office/drawing/2014/main" id="{BC3314DE-F1D6-97AF-84BC-4CC9EE088CEE}"/>
+              </a:ext>
+            </a:extLst>
+          </p:cNvPr>
+          <p:cNvSpPr>
+            <a:spLocks noGrp="1"/>
+          </p:cNvSpPr>
+          <p:nvPr>
+            <p:ph sz="half" idx="2"/>
+          </p:nvPr>
+        </p:nvSpPr>
+        <p:spPr/>
+        <p:txBody>
+          <a:bodyPr/>
+          <a:lstStyle/>
+          <a:p>
+            <a:r>
+              <a:rPr lang="en-US" dirty="0"/>
+              <a:t>Software Design Processes</a:t>
+            </a:r>
+          </a:p>
+          <a:p>
+            <a:r>
+              <a:rPr lang="en-US" dirty="0"/>
+              <a:t>Code Reviews</a:t>
+            </a:r>
+          </a:p>
+          <a:p>
+            <a:r>
+              <a:rPr lang="en-US" dirty="0"/>
+              <a:t>Test Cases</a:t>
+            </a:r>
+          </a:p>
+          <a:p>
+            <a:r>
+              <a:rPr lang="en-US" dirty="0"/>
+              <a:t>Pair Programming</a:t>
+            </a:r>
+          </a:p>
+          <a:p>
+            <a:endParaRPr lang="en-US" dirty="0"/>
+          </a:p>
+        </p:txBody>
+      </p:sp>
+      <p:sp>
+        <p:nvSpPr>
+          <p:cNvPr id="8" name="Text Placeholder 7">
+            <a:extLst>
+              <a:ext uri="{FF2B5EF4-FFF2-40B4-BE49-F238E27FC236}">
+                <a16:creationId xmlns:a16="http://schemas.microsoft.com/office/drawing/2014/main" id="{5188DF68-4BF3-15B5-48DC-6E6E715F33E4}"/>
+              </a:ext>
+            </a:extLst>
+          </p:cNvPr>
+          <p:cNvSpPr>
+            <a:spLocks noGrp="1"/>
+          </p:cNvSpPr>
+          <p:nvPr>
+            <p:ph type="body" sz="quarter" idx="3"/>
+          </p:nvPr>
+        </p:nvSpPr>
+        <p:spPr/>
+        <p:txBody>
+          <a:bodyPr/>
+          <a:lstStyle/>
+          <a:p>
+            <a:r>
+              <a:rPr lang="en-US" dirty="0"/>
+              <a:t>Tooling</a:t>
+            </a:r>
+          </a:p>
+        </p:txBody>
+      </p:sp>
+      <p:sp>
+        <p:nvSpPr>
+          <p:cNvPr id="6" name="Content Placeholder 5">
+            <a:extLst>
+              <a:ext uri="{FF2B5EF4-FFF2-40B4-BE49-F238E27FC236}">
+                <a16:creationId xmlns:a16="http://schemas.microsoft.com/office/drawing/2014/main" id="{058822E7-07DB-9EFA-2479-C78885DB19B3}"/>
+              </a:ext>
+            </a:extLst>
+          </p:cNvPr>
+          <p:cNvSpPr>
+            <a:spLocks noGrp="1"/>
+          </p:cNvSpPr>
+          <p:nvPr>
+            <p:ph sz="quarter" idx="4"/>
+          </p:nvPr>
+        </p:nvSpPr>
+        <p:spPr/>
+        <p:txBody>
+          <a:bodyPr/>
+          <a:lstStyle/>
+          <a:p>
+            <a:r>
+              <a:rPr lang="en-US" dirty="0"/>
+              <a:t>Static analysis</a:t>
+            </a:r>
+          </a:p>
+          <a:p>
+            <a:pPr lvl="1"/>
+            <a:r>
+              <a:rPr lang="en-US" dirty="0"/>
+              <a:t>Formatters (black)</a:t>
+            </a:r>
+          </a:p>
+          <a:p>
+            <a:pPr lvl="1"/>
+            <a:r>
+              <a:rPr lang="en-US" dirty="0"/>
+              <a:t>Linters (</a:t>
+            </a:r>
+            <a:r>
+              <a:rPr lang="en-US" dirty="0" err="1"/>
+              <a:t>pylint</a:t>
+            </a:r>
+            <a:r>
+              <a:rPr lang="en-US" dirty="0"/>
+              <a:t>)</a:t>
+            </a:r>
+          </a:p>
+          <a:p>
+            <a:r>
+              <a:rPr lang="en-US" dirty="0"/>
+              <a:t>Dynamic analysis</a:t>
+            </a:r>
+          </a:p>
+          <a:p>
+            <a:pPr lvl="1"/>
+            <a:r>
+              <a:rPr lang="en-US" dirty="0"/>
+              <a:t>Debuggers</a:t>
+            </a:r>
+          </a:p>
+          <a:p>
+            <a:pPr lvl="1"/>
+            <a:r>
+              <a:rPr lang="en-US" dirty="0"/>
+              <a:t>Profilers</a:t>
+            </a:r>
+          </a:p>
+          <a:p>
+            <a:r>
+              <a:rPr lang="en-US" dirty="0"/>
+              <a:t>Repository analysis</a:t>
+            </a:r>
+          </a:p>
+          <a:p>
+            <a:r>
+              <a:rPr lang="en-US"/>
+              <a:t>Pre-commit hooks</a:t>
+            </a:r>
+            <a:endParaRPr lang="en-US" dirty="0"/>
           </a:p>
         </p:txBody>
       </p:sp>
     </p:spTree>
     <p:extLst>
       <p:ext uri="{BB962C8B-B14F-4D97-AF65-F5344CB8AC3E}">
-        <p14:creationId xmlns:p14="http://schemas.microsoft.com/office/powerpoint/2010/main" val="3915962001"/>
+        <p14:creationId xmlns:p14="http://schemas.microsoft.com/office/powerpoint/2010/main" val="1202502916"/>
       </p:ext>
     </p:extLst>
   </p:cSld>
@@ -4802,10 +5137,10 @@
       </p:grpSpPr>
       <p:sp>
         <p:nvSpPr>
-          <p:cNvPr id="2" name="Title 1">
-            <a:extLst>
-              <a:ext uri="{FF2B5EF4-FFF2-40B4-BE49-F238E27FC236}">
-                <a16:creationId xmlns:a16="http://schemas.microsoft.com/office/drawing/2014/main" id="{0FD810A1-2CAB-E75F-2FC9-CC139E2D2C05}"/>
+          <p:cNvPr id="7" name="Title 6">
+            <a:extLst>
+              <a:ext uri="{FF2B5EF4-FFF2-40B4-BE49-F238E27FC236}">
+                <a16:creationId xmlns:a16="http://schemas.microsoft.com/office/drawing/2014/main" id="{85C65107-8E07-8266-ADFE-60646C2F3583}"/>
               </a:ext>
             </a:extLst>
           </p:cNvPr>
@@ -4821,197 +5156,74 @@
           <a:bodyPr/>
           <a:lstStyle/>
           <a:p>
-            <a:endParaRPr lang="en-US"/>
-          </a:p>
-        </p:txBody>
-      </p:sp>
-      <p:pic>
-        <p:nvPicPr>
-          <p:cNvPr id="1026" name="Picture 2">
-            <a:extLst>
-              <a:ext uri="{FF2B5EF4-FFF2-40B4-BE49-F238E27FC236}">
-                <a16:creationId xmlns:a16="http://schemas.microsoft.com/office/drawing/2014/main" id="{2113968A-B5FD-D3CF-FDFC-1317B4946152}"/>
-              </a:ext>
-            </a:extLst>
-          </p:cNvPr>
-          <p:cNvPicPr>
-            <a:picLocks noGrp="1" noChangeAspect="1" noChangeArrowheads="1"/>
-          </p:cNvPicPr>
+            <a:r>
+              <a:rPr lang="en-US" dirty="0"/>
+              <a:t>Hands-On #1</a:t>
+            </a:r>
+          </a:p>
+        </p:txBody>
+      </p:sp>
+      <p:sp>
+        <p:nvSpPr>
+          <p:cNvPr id="8" name="Content Placeholder 7">
+            <a:extLst>
+              <a:ext uri="{FF2B5EF4-FFF2-40B4-BE49-F238E27FC236}">
+                <a16:creationId xmlns:a16="http://schemas.microsoft.com/office/drawing/2014/main" id="{9BAE6363-D32F-2F9D-1D68-ACDDEC6E4560}"/>
+              </a:ext>
+            </a:extLst>
+          </p:cNvPr>
+          <p:cNvSpPr>
+            <a:spLocks noGrp="1"/>
+          </p:cNvSpPr>
           <p:nvPr>
             <p:ph idx="1"/>
           </p:nvPr>
-        </p:nvPicPr>
-        <p:blipFill>
-          <a:blip r:embed="rId2">
-            <a:extLst>
-              <a:ext uri="{28A0092B-C50C-407E-A947-70E740481C1C}">
-                <a14:useLocalDpi xmlns:a14="http://schemas.microsoft.com/office/drawing/2010/main" val="0"/>
-              </a:ext>
-            </a:extLst>
-          </a:blip>
-          <a:srcRect/>
-          <a:stretch>
-            <a:fillRect/>
-          </a:stretch>
-        </p:blipFill>
-        <p:spPr bwMode="auto">
-          <a:xfrm>
-            <a:off x="2723722" y="1896568"/>
-            <a:ext cx="6372152" cy="4596307"/>
-          </a:xfrm>
-          <a:prstGeom prst="rect">
-            <a:avLst/>
-          </a:prstGeom>
-          <a:noFill/>
-          <a:extLst>
-            <a:ext uri="{909E8E84-426E-40DD-AFC4-6F175D3DCCD1}">
-              <a14:hiddenFill xmlns:a14="http://schemas.microsoft.com/office/drawing/2010/main">
-                <a:solidFill>
-                  <a:srgbClr val="FFFFFF"/>
-                </a:solidFill>
-              </a14:hiddenFill>
-            </a:ext>
-          </a:extLst>
-        </p:spPr>
-      </p:pic>
+        </p:nvSpPr>
+        <p:spPr/>
+        <p:txBody>
+          <a:bodyPr/>
+          <a:lstStyle/>
+          <a:p>
+            <a:r>
+              <a:rPr lang="en-US" dirty="0"/>
+              <a:t>Use an </a:t>
+            </a:r>
+            <a:r>
+              <a:rPr lang="en-US" dirty="0" err="1"/>
+              <a:t>autoformatter</a:t>
+            </a:r>
+            <a:r>
+              <a:rPr lang="en-US" dirty="0"/>
+              <a:t> to style code</a:t>
+            </a:r>
+          </a:p>
+          <a:p>
+            <a:r>
+              <a:rPr lang="en-US" dirty="0"/>
+              <a:t>Use a linter to identify problem areas</a:t>
+            </a:r>
+          </a:p>
+          <a:p>
+            <a:r>
+              <a:rPr lang="en-US" dirty="0"/>
+              <a:t>Setup pre-commit hooks to handle issues before commits</a:t>
+            </a:r>
+          </a:p>
+          <a:p>
+            <a:endParaRPr lang="en-US" dirty="0"/>
+          </a:p>
+          <a:p>
+            <a:r>
+              <a:rPr lang="en-US" dirty="0"/>
+              <a:t>Write unit tests to validate functionality – if time permits</a:t>
+            </a:r>
+          </a:p>
+        </p:txBody>
+      </p:sp>
     </p:spTree>
     <p:extLst>
       <p:ext uri="{BB962C8B-B14F-4D97-AF65-F5344CB8AC3E}">
-        <p14:creationId xmlns:p14="http://schemas.microsoft.com/office/powerpoint/2010/main" val="3360491341"/>
-      </p:ext>
-    </p:extLst>
-  </p:cSld>
-  <p:clrMapOvr>
-    <a:masterClrMapping/>
-  </p:clrMapOvr>
-</p:sld>
-</file>
-
-<file path=ppt/slides/slide17.xml><?xml version="1.0" encoding="utf-8"?>
-<p:sld xmlns:a="http://schemas.openxmlformats.org/drawingml/2006/main" xmlns:r="http://schemas.openxmlformats.org/officeDocument/2006/relationships" xmlns:p="http://schemas.openxmlformats.org/presentationml/2006/main">
-  <p:cSld>
-    <p:spTree>
-      <p:nvGrpSpPr>
-        <p:cNvPr id="1" name=""/>
-        <p:cNvGrpSpPr/>
-        <p:nvPr/>
-      </p:nvGrpSpPr>
-      <p:grpSpPr>
-        <a:xfrm>
-          <a:off x="0" y="0"/>
-          <a:ext cx="0" cy="0"/>
-          <a:chOff x="0" y="0"/>
-          <a:chExt cx="0" cy="0"/>
-        </a:xfrm>
-      </p:grpSpPr>
-      <p:sp>
-        <p:nvSpPr>
-          <p:cNvPr id="2" name="Title 1">
-            <a:extLst>
-              <a:ext uri="{FF2B5EF4-FFF2-40B4-BE49-F238E27FC236}">
-                <a16:creationId xmlns:a16="http://schemas.microsoft.com/office/drawing/2014/main" id="{E2967715-C799-D1FD-47B7-F9E310DAF040}"/>
-              </a:ext>
-            </a:extLst>
-          </p:cNvPr>
-          <p:cNvSpPr>
-            <a:spLocks noGrp="1"/>
-          </p:cNvSpPr>
-          <p:nvPr>
-            <p:ph type="title"/>
-          </p:nvPr>
-        </p:nvSpPr>
-        <p:spPr/>
-        <p:txBody>
-          <a:bodyPr/>
-          <a:lstStyle/>
-          <a:p>
-            <a:r>
-              <a:rPr lang="en-US" dirty="0"/>
-              <a:t>Tooling</a:t>
-            </a:r>
-          </a:p>
-        </p:txBody>
-      </p:sp>
-      <p:sp>
-        <p:nvSpPr>
-          <p:cNvPr id="3" name="Content Placeholder 2">
-            <a:extLst>
-              <a:ext uri="{FF2B5EF4-FFF2-40B4-BE49-F238E27FC236}">
-                <a16:creationId xmlns:a16="http://schemas.microsoft.com/office/drawing/2014/main" id="{856EDF6B-2FED-613C-856B-DB784C758C6F}"/>
-              </a:ext>
-            </a:extLst>
-          </p:cNvPr>
-          <p:cNvSpPr>
-            <a:spLocks noGrp="1"/>
-          </p:cNvSpPr>
-          <p:nvPr>
-            <p:ph idx="1"/>
-          </p:nvPr>
-        </p:nvSpPr>
-        <p:spPr/>
-        <p:txBody>
-          <a:bodyPr/>
-          <a:lstStyle/>
-          <a:p>
-            <a:r>
-              <a:rPr lang="en-US" dirty="0"/>
-              <a:t>Static analysis</a:t>
-            </a:r>
-          </a:p>
-          <a:p>
-            <a:pPr lvl="1"/>
-            <a:r>
-              <a:rPr lang="en-US" dirty="0"/>
-              <a:t>Formatters (black)</a:t>
-            </a:r>
-          </a:p>
-          <a:p>
-            <a:pPr lvl="1"/>
-            <a:r>
-              <a:rPr lang="en-US" dirty="0"/>
-              <a:t>Linters (</a:t>
-            </a:r>
-            <a:r>
-              <a:rPr lang="en-US" dirty="0" err="1"/>
-              <a:t>pylint</a:t>
-            </a:r>
-            <a:r>
-              <a:rPr lang="en-US" dirty="0"/>
-              <a:t>)</a:t>
-            </a:r>
-          </a:p>
-          <a:p>
-            <a:r>
-              <a:rPr lang="en-US" dirty="0"/>
-              <a:t>Dynamic analysis</a:t>
-            </a:r>
-          </a:p>
-          <a:p>
-            <a:pPr lvl="1"/>
-            <a:r>
-              <a:rPr lang="en-US" dirty="0"/>
-              <a:t>Debuggers</a:t>
-            </a:r>
-          </a:p>
-          <a:p>
-            <a:pPr lvl="1"/>
-            <a:r>
-              <a:rPr lang="en-US" dirty="0"/>
-              <a:t>Profilers</a:t>
-            </a:r>
-          </a:p>
-          <a:p>
-            <a:endParaRPr lang="en-US" dirty="0"/>
-          </a:p>
-          <a:p>
-            <a:endParaRPr lang="en-US" dirty="0"/>
-          </a:p>
-        </p:txBody>
-      </p:sp>
-    </p:spTree>
-    <p:extLst>
-      <p:ext uri="{BB962C8B-B14F-4D97-AF65-F5344CB8AC3E}">
-        <p14:creationId xmlns:p14="http://schemas.microsoft.com/office/powerpoint/2010/main" val="358832259"/>
+        <p14:creationId xmlns:p14="http://schemas.microsoft.com/office/powerpoint/2010/main" val="3620894232"/>
       </p:ext>
     </p:extLst>
   </p:cSld>

</xml_diff>

<commit_message>
minor fixes for clean code and fixed space explorer planet bug
</commit_message>
<xml_diff>
--- a/lesson09/Clean Code/Writing Clean Code.pptx
+++ b/lesson09/Clean Code/Writing Clean Code.pptx
@@ -212,7 +212,7 @@
           <a:p>
             <a:fld id="{ABAB54D4-40B1-4F4F-A71E-587F6353CB71}" type="datetimeFigureOut">
               <a:rPr lang="en-US" smtClean="0"/>
-              <a:t>29-Jul-25</a:t>
+              <a:t>8/4/2025</a:t>
             </a:fld>
             <a:endParaRPr lang="en-US"/>
           </a:p>
@@ -1079,7 +1079,7 @@
           <a:p>
             <a:fld id="{40BEADEB-7507-46CB-9ABE-86F6B40F8C4B}" type="datetimeFigureOut">
               <a:rPr lang="en-US" smtClean="0"/>
-              <a:t>29-Jul-25</a:t>
+              <a:t>8/4/2025</a:t>
             </a:fld>
             <a:endParaRPr lang="en-US"/>
           </a:p>
@@ -1277,7 +1277,7 @@
           <a:p>
             <a:fld id="{40BEADEB-7507-46CB-9ABE-86F6B40F8C4B}" type="datetimeFigureOut">
               <a:rPr lang="en-US" smtClean="0"/>
-              <a:t>29-Jul-25</a:t>
+              <a:t>8/4/2025</a:t>
             </a:fld>
             <a:endParaRPr lang="en-US"/>
           </a:p>
@@ -1485,7 +1485,7 @@
           <a:p>
             <a:fld id="{40BEADEB-7507-46CB-9ABE-86F6B40F8C4B}" type="datetimeFigureOut">
               <a:rPr lang="en-US" smtClean="0"/>
-              <a:t>29-Jul-25</a:t>
+              <a:t>8/4/2025</a:t>
             </a:fld>
             <a:endParaRPr lang="en-US"/>
           </a:p>
@@ -1683,7 +1683,7 @@
           <a:p>
             <a:fld id="{40BEADEB-7507-46CB-9ABE-86F6B40F8C4B}" type="datetimeFigureOut">
               <a:rPr lang="en-US" smtClean="0"/>
-              <a:t>29-Jul-25</a:t>
+              <a:t>8/4/2025</a:t>
             </a:fld>
             <a:endParaRPr lang="en-US"/>
           </a:p>
@@ -1958,7 +1958,7 @@
           <a:p>
             <a:fld id="{40BEADEB-7507-46CB-9ABE-86F6B40F8C4B}" type="datetimeFigureOut">
               <a:rPr lang="en-US" smtClean="0"/>
-              <a:t>29-Jul-25</a:t>
+              <a:t>8/4/2025</a:t>
             </a:fld>
             <a:endParaRPr lang="en-US"/>
           </a:p>
@@ -2223,7 +2223,7 @@
           <a:p>
             <a:fld id="{40BEADEB-7507-46CB-9ABE-86F6B40F8C4B}" type="datetimeFigureOut">
               <a:rPr lang="en-US" smtClean="0"/>
-              <a:t>29-Jul-25</a:t>
+              <a:t>8/4/2025</a:t>
             </a:fld>
             <a:endParaRPr lang="en-US"/>
           </a:p>
@@ -2635,7 +2635,7 @@
           <a:p>
             <a:fld id="{40BEADEB-7507-46CB-9ABE-86F6B40F8C4B}" type="datetimeFigureOut">
               <a:rPr lang="en-US" smtClean="0"/>
-              <a:t>29-Jul-25</a:t>
+              <a:t>8/4/2025</a:t>
             </a:fld>
             <a:endParaRPr lang="en-US"/>
           </a:p>
@@ -2776,7 +2776,7 @@
           <a:p>
             <a:fld id="{40BEADEB-7507-46CB-9ABE-86F6B40F8C4B}" type="datetimeFigureOut">
               <a:rPr lang="en-US" smtClean="0"/>
-              <a:t>29-Jul-25</a:t>
+              <a:t>8/4/2025</a:t>
             </a:fld>
             <a:endParaRPr lang="en-US"/>
           </a:p>
@@ -2889,7 +2889,7 @@
           <a:p>
             <a:fld id="{40BEADEB-7507-46CB-9ABE-86F6B40F8C4B}" type="datetimeFigureOut">
               <a:rPr lang="en-US" smtClean="0"/>
-              <a:t>29-Jul-25</a:t>
+              <a:t>8/4/2025</a:t>
             </a:fld>
             <a:endParaRPr lang="en-US"/>
           </a:p>
@@ -3200,7 +3200,7 @@
           <a:p>
             <a:fld id="{40BEADEB-7507-46CB-9ABE-86F6B40F8C4B}" type="datetimeFigureOut">
               <a:rPr lang="en-US" smtClean="0"/>
-              <a:t>29-Jul-25</a:t>
+              <a:t>8/4/2025</a:t>
             </a:fld>
             <a:endParaRPr lang="en-US"/>
           </a:p>
@@ -3488,7 +3488,7 @@
           <a:p>
             <a:fld id="{40BEADEB-7507-46CB-9ABE-86F6B40F8C4B}" type="datetimeFigureOut">
               <a:rPr lang="en-US" smtClean="0"/>
-              <a:t>29-Jul-25</a:t>
+              <a:t>8/4/2025</a:t>
             </a:fld>
             <a:endParaRPr lang="en-US"/>
           </a:p>
@@ -3729,7 +3729,7 @@
           <a:p>
             <a:fld id="{40BEADEB-7507-46CB-9ABE-86F6B40F8C4B}" type="datetimeFigureOut">
               <a:rPr lang="en-US" smtClean="0"/>
-              <a:t>29-Jul-25</a:t>
+              <a:t>8/4/2025</a:t>
             </a:fld>
             <a:endParaRPr lang="en-US"/>
           </a:p>
@@ -5104,6 +5104,110 @@
           </a:p>
         </p:txBody>
       </p:sp>
+      <p:sp>
+        <p:nvSpPr>
+          <p:cNvPr id="2" name="Rectangle 1">
+            <a:extLst>
+              <a:ext uri="{FF2B5EF4-FFF2-40B4-BE49-F238E27FC236}">
+                <a16:creationId xmlns:a16="http://schemas.microsoft.com/office/drawing/2014/main" id="{69ECCA25-4A41-4D40-68F4-3F34213DF5DF}"/>
+              </a:ext>
+            </a:extLst>
+          </p:cNvPr>
+          <p:cNvSpPr/>
+          <p:nvPr/>
+        </p:nvSpPr>
+        <p:spPr>
+          <a:xfrm>
+            <a:off x="6172200" y="2505075"/>
+            <a:ext cx="4071258" cy="1316038"/>
+          </a:xfrm>
+          <a:prstGeom prst="rect">
+            <a:avLst/>
+          </a:prstGeom>
+          <a:noFill/>
+          <a:ln w="76200">
+            <a:solidFill>
+              <a:srgbClr val="FF0000"/>
+            </a:solidFill>
+          </a:ln>
+        </p:spPr>
+        <p:style>
+          <a:lnRef idx="2">
+            <a:schemeClr val="accent1">
+              <a:shade val="15000"/>
+            </a:schemeClr>
+          </a:lnRef>
+          <a:fillRef idx="1">
+            <a:schemeClr val="accent1"/>
+          </a:fillRef>
+          <a:effectRef idx="0">
+            <a:schemeClr val="accent1"/>
+          </a:effectRef>
+          <a:fontRef idx="minor">
+            <a:schemeClr val="lt1"/>
+          </a:fontRef>
+        </p:style>
+        <p:txBody>
+          <a:bodyPr rtlCol="0" anchor="ctr"/>
+          <a:lstStyle/>
+          <a:p>
+            <a:pPr algn="ctr"/>
+            <a:endParaRPr lang="en-US"/>
+          </a:p>
+        </p:txBody>
+      </p:sp>
+      <p:sp>
+        <p:nvSpPr>
+          <p:cNvPr id="3" name="Rectangle 2">
+            <a:extLst>
+              <a:ext uri="{FF2B5EF4-FFF2-40B4-BE49-F238E27FC236}">
+                <a16:creationId xmlns:a16="http://schemas.microsoft.com/office/drawing/2014/main" id="{11CE8EC8-85EE-A381-E89E-7A584F5EE7D5}"/>
+              </a:ext>
+            </a:extLst>
+          </p:cNvPr>
+          <p:cNvSpPr/>
+          <p:nvPr/>
+        </p:nvSpPr>
+        <p:spPr>
+          <a:xfrm>
+            <a:off x="6172200" y="5531644"/>
+            <a:ext cx="4071258" cy="658019"/>
+          </a:xfrm>
+          <a:prstGeom prst="rect">
+            <a:avLst/>
+          </a:prstGeom>
+          <a:noFill/>
+          <a:ln w="76200">
+            <a:solidFill>
+              <a:srgbClr val="FF0000"/>
+            </a:solidFill>
+          </a:ln>
+        </p:spPr>
+        <p:style>
+          <a:lnRef idx="2">
+            <a:schemeClr val="accent1">
+              <a:shade val="15000"/>
+            </a:schemeClr>
+          </a:lnRef>
+          <a:fillRef idx="1">
+            <a:schemeClr val="accent1"/>
+          </a:fillRef>
+          <a:effectRef idx="0">
+            <a:schemeClr val="accent1"/>
+          </a:effectRef>
+          <a:fontRef idx="minor">
+            <a:schemeClr val="lt1"/>
+          </a:fontRef>
+        </p:style>
+        <p:txBody>
+          <a:bodyPr rtlCol="0" anchor="ctr"/>
+          <a:lstStyle/>
+          <a:p>
+            <a:pPr algn="ctr"/>
+            <a:endParaRPr lang="en-US"/>
+          </a:p>
+        </p:txBody>
+      </p:sp>
     </p:spTree>
     <p:extLst>
       <p:ext uri="{BB962C8B-B14F-4D97-AF65-F5344CB8AC3E}">
@@ -5114,6 +5218,483 @@
   <p:clrMapOvr>
     <a:masterClrMapping/>
   </p:clrMapOvr>
+  <p:timing>
+    <p:tnLst>
+      <p:par>
+        <p:cTn id="1" dur="indefinite" restart="never" nodeType="tmRoot">
+          <p:childTnLst>
+            <p:seq concurrent="1" nextAc="seek">
+              <p:cTn id="2" dur="indefinite" nodeType="mainSeq">
+                <p:childTnLst>
+                  <p:par>
+                    <p:cTn id="3" fill="hold">
+                      <p:stCondLst>
+                        <p:cond delay="indefinite"/>
+                      </p:stCondLst>
+                      <p:childTnLst>
+                        <p:par>
+                          <p:cTn id="4" fill="hold">
+                            <p:stCondLst>
+                              <p:cond delay="0"/>
+                            </p:stCondLst>
+                            <p:childTnLst>
+                              <p:par>
+                                <p:cTn id="5" presetID="1" presetClass="entr" presetSubtype="0" fill="hold" grpId="0" nodeType="clickEffect">
+                                  <p:stCondLst>
+                                    <p:cond delay="0"/>
+                                  </p:stCondLst>
+                                  <p:childTnLst>
+                                    <p:set>
+                                      <p:cBhvr>
+                                        <p:cTn id="6" dur="1" fill="hold">
+                                          <p:stCondLst>
+                                            <p:cond delay="0"/>
+                                          </p:stCondLst>
+                                        </p:cTn>
+                                        <p:tgtEl>
+                                          <p:spTgt spid="8">
+                                            <p:txEl>
+                                              <p:pRg st="0" end="0"/>
+                                            </p:txEl>
+                                          </p:spTgt>
+                                        </p:tgtEl>
+                                        <p:attrNameLst>
+                                          <p:attrName>style.visibility</p:attrName>
+                                        </p:attrNameLst>
+                                      </p:cBhvr>
+                                      <p:to>
+                                        <p:strVal val="visible"/>
+                                      </p:to>
+                                    </p:set>
+                                  </p:childTnLst>
+                                </p:cTn>
+                              </p:par>
+                              <p:par>
+                                <p:cTn id="7" presetID="1" presetClass="entr" presetSubtype="0" fill="hold" grpId="0" nodeType="withEffect">
+                                  <p:stCondLst>
+                                    <p:cond delay="0"/>
+                                  </p:stCondLst>
+                                  <p:childTnLst>
+                                    <p:set>
+                                      <p:cBhvr>
+                                        <p:cTn id="8" dur="1" fill="hold">
+                                          <p:stCondLst>
+                                            <p:cond delay="0"/>
+                                          </p:stCondLst>
+                                        </p:cTn>
+                                        <p:tgtEl>
+                                          <p:spTgt spid="6">
+                                            <p:txEl>
+                                              <p:pRg st="0" end="0"/>
+                                            </p:txEl>
+                                          </p:spTgt>
+                                        </p:tgtEl>
+                                        <p:attrNameLst>
+                                          <p:attrName>style.visibility</p:attrName>
+                                        </p:attrNameLst>
+                                      </p:cBhvr>
+                                      <p:to>
+                                        <p:strVal val="visible"/>
+                                      </p:to>
+                                    </p:set>
+                                  </p:childTnLst>
+                                </p:cTn>
+                              </p:par>
+                              <p:par>
+                                <p:cTn id="9" presetID="1" presetClass="entr" presetSubtype="0" fill="hold" grpId="0" nodeType="withEffect">
+                                  <p:stCondLst>
+                                    <p:cond delay="0"/>
+                                  </p:stCondLst>
+                                  <p:childTnLst>
+                                    <p:set>
+                                      <p:cBhvr>
+                                        <p:cTn id="10" dur="1" fill="hold">
+                                          <p:stCondLst>
+                                            <p:cond delay="0"/>
+                                          </p:stCondLst>
+                                        </p:cTn>
+                                        <p:tgtEl>
+                                          <p:spTgt spid="6">
+                                            <p:txEl>
+                                              <p:pRg st="1" end="1"/>
+                                            </p:txEl>
+                                          </p:spTgt>
+                                        </p:tgtEl>
+                                        <p:attrNameLst>
+                                          <p:attrName>style.visibility</p:attrName>
+                                        </p:attrNameLst>
+                                      </p:cBhvr>
+                                      <p:to>
+                                        <p:strVal val="visible"/>
+                                      </p:to>
+                                    </p:set>
+                                  </p:childTnLst>
+                                </p:cTn>
+                              </p:par>
+                              <p:par>
+                                <p:cTn id="11" presetID="1" presetClass="entr" presetSubtype="0" fill="hold" grpId="0" nodeType="withEffect">
+                                  <p:stCondLst>
+                                    <p:cond delay="0"/>
+                                  </p:stCondLst>
+                                  <p:childTnLst>
+                                    <p:set>
+                                      <p:cBhvr>
+                                        <p:cTn id="12" dur="1" fill="hold">
+                                          <p:stCondLst>
+                                            <p:cond delay="0"/>
+                                          </p:stCondLst>
+                                        </p:cTn>
+                                        <p:tgtEl>
+                                          <p:spTgt spid="6">
+                                            <p:txEl>
+                                              <p:pRg st="2" end="2"/>
+                                            </p:txEl>
+                                          </p:spTgt>
+                                        </p:tgtEl>
+                                        <p:attrNameLst>
+                                          <p:attrName>style.visibility</p:attrName>
+                                        </p:attrNameLst>
+                                      </p:cBhvr>
+                                      <p:to>
+                                        <p:strVal val="visible"/>
+                                      </p:to>
+                                    </p:set>
+                                  </p:childTnLst>
+                                </p:cTn>
+                              </p:par>
+                            </p:childTnLst>
+                          </p:cTn>
+                        </p:par>
+                      </p:childTnLst>
+                    </p:cTn>
+                  </p:par>
+                  <p:par>
+                    <p:cTn id="13" fill="hold">
+                      <p:stCondLst>
+                        <p:cond delay="indefinite"/>
+                      </p:stCondLst>
+                      <p:childTnLst>
+                        <p:par>
+                          <p:cTn id="14" fill="hold">
+                            <p:stCondLst>
+                              <p:cond delay="0"/>
+                            </p:stCondLst>
+                            <p:childTnLst>
+                              <p:par>
+                                <p:cTn id="15" presetID="1" presetClass="entr" presetSubtype="0" fill="hold" grpId="0" nodeType="clickEffect">
+                                  <p:stCondLst>
+                                    <p:cond delay="0"/>
+                                  </p:stCondLst>
+                                  <p:childTnLst>
+                                    <p:set>
+                                      <p:cBhvr>
+                                        <p:cTn id="16" dur="1" fill="hold">
+                                          <p:stCondLst>
+                                            <p:cond delay="0"/>
+                                          </p:stCondLst>
+                                        </p:cTn>
+                                        <p:tgtEl>
+                                          <p:spTgt spid="6">
+                                            <p:txEl>
+                                              <p:pRg st="3" end="3"/>
+                                            </p:txEl>
+                                          </p:spTgt>
+                                        </p:tgtEl>
+                                        <p:attrNameLst>
+                                          <p:attrName>style.visibility</p:attrName>
+                                        </p:attrNameLst>
+                                      </p:cBhvr>
+                                      <p:to>
+                                        <p:strVal val="visible"/>
+                                      </p:to>
+                                    </p:set>
+                                  </p:childTnLst>
+                                </p:cTn>
+                              </p:par>
+                              <p:par>
+                                <p:cTn id="17" presetID="1" presetClass="entr" presetSubtype="0" fill="hold" grpId="0" nodeType="withEffect">
+                                  <p:stCondLst>
+                                    <p:cond delay="0"/>
+                                  </p:stCondLst>
+                                  <p:childTnLst>
+                                    <p:set>
+                                      <p:cBhvr>
+                                        <p:cTn id="18" dur="1" fill="hold">
+                                          <p:stCondLst>
+                                            <p:cond delay="0"/>
+                                          </p:stCondLst>
+                                        </p:cTn>
+                                        <p:tgtEl>
+                                          <p:spTgt spid="6">
+                                            <p:txEl>
+                                              <p:pRg st="4" end="4"/>
+                                            </p:txEl>
+                                          </p:spTgt>
+                                        </p:tgtEl>
+                                        <p:attrNameLst>
+                                          <p:attrName>style.visibility</p:attrName>
+                                        </p:attrNameLst>
+                                      </p:cBhvr>
+                                      <p:to>
+                                        <p:strVal val="visible"/>
+                                      </p:to>
+                                    </p:set>
+                                  </p:childTnLst>
+                                </p:cTn>
+                              </p:par>
+                              <p:par>
+                                <p:cTn id="19" presetID="1" presetClass="entr" presetSubtype="0" fill="hold" grpId="0" nodeType="withEffect">
+                                  <p:stCondLst>
+                                    <p:cond delay="0"/>
+                                  </p:stCondLst>
+                                  <p:childTnLst>
+                                    <p:set>
+                                      <p:cBhvr>
+                                        <p:cTn id="20" dur="1" fill="hold">
+                                          <p:stCondLst>
+                                            <p:cond delay="0"/>
+                                          </p:stCondLst>
+                                        </p:cTn>
+                                        <p:tgtEl>
+                                          <p:spTgt spid="6">
+                                            <p:txEl>
+                                              <p:pRg st="5" end="5"/>
+                                            </p:txEl>
+                                          </p:spTgt>
+                                        </p:tgtEl>
+                                        <p:attrNameLst>
+                                          <p:attrName>style.visibility</p:attrName>
+                                        </p:attrNameLst>
+                                      </p:cBhvr>
+                                      <p:to>
+                                        <p:strVal val="visible"/>
+                                      </p:to>
+                                    </p:set>
+                                  </p:childTnLst>
+                                </p:cTn>
+                              </p:par>
+                            </p:childTnLst>
+                          </p:cTn>
+                        </p:par>
+                      </p:childTnLst>
+                    </p:cTn>
+                  </p:par>
+                  <p:par>
+                    <p:cTn id="21" fill="hold">
+                      <p:stCondLst>
+                        <p:cond delay="indefinite"/>
+                      </p:stCondLst>
+                      <p:childTnLst>
+                        <p:par>
+                          <p:cTn id="22" fill="hold">
+                            <p:stCondLst>
+                              <p:cond delay="0"/>
+                            </p:stCondLst>
+                            <p:childTnLst>
+                              <p:par>
+                                <p:cTn id="23" presetID="1" presetClass="entr" presetSubtype="0" fill="hold" grpId="0" nodeType="clickEffect">
+                                  <p:stCondLst>
+                                    <p:cond delay="0"/>
+                                  </p:stCondLst>
+                                  <p:childTnLst>
+                                    <p:set>
+                                      <p:cBhvr>
+                                        <p:cTn id="24" dur="1" fill="hold">
+                                          <p:stCondLst>
+                                            <p:cond delay="0"/>
+                                          </p:stCondLst>
+                                        </p:cTn>
+                                        <p:tgtEl>
+                                          <p:spTgt spid="6">
+                                            <p:txEl>
+                                              <p:pRg st="6" end="6"/>
+                                            </p:txEl>
+                                          </p:spTgt>
+                                        </p:tgtEl>
+                                        <p:attrNameLst>
+                                          <p:attrName>style.visibility</p:attrName>
+                                        </p:attrNameLst>
+                                      </p:cBhvr>
+                                      <p:to>
+                                        <p:strVal val="visible"/>
+                                      </p:to>
+                                    </p:set>
+                                  </p:childTnLst>
+                                </p:cTn>
+                              </p:par>
+                            </p:childTnLst>
+                          </p:cTn>
+                        </p:par>
+                      </p:childTnLst>
+                    </p:cTn>
+                  </p:par>
+                  <p:par>
+                    <p:cTn id="25" fill="hold">
+                      <p:stCondLst>
+                        <p:cond delay="indefinite"/>
+                      </p:stCondLst>
+                      <p:childTnLst>
+                        <p:par>
+                          <p:cTn id="26" fill="hold">
+                            <p:stCondLst>
+                              <p:cond delay="0"/>
+                            </p:stCondLst>
+                            <p:childTnLst>
+                              <p:par>
+                                <p:cTn id="27" presetID="1" presetClass="entr" presetSubtype="0" fill="hold" grpId="0" nodeType="clickEffect">
+                                  <p:stCondLst>
+                                    <p:cond delay="0"/>
+                                  </p:stCondLst>
+                                  <p:childTnLst>
+                                    <p:set>
+                                      <p:cBhvr>
+                                        <p:cTn id="28" dur="1" fill="hold">
+                                          <p:stCondLst>
+                                            <p:cond delay="0"/>
+                                          </p:stCondLst>
+                                        </p:cTn>
+                                        <p:tgtEl>
+                                          <p:spTgt spid="6">
+                                            <p:txEl>
+                                              <p:pRg st="7" end="7"/>
+                                            </p:txEl>
+                                          </p:spTgt>
+                                        </p:tgtEl>
+                                        <p:attrNameLst>
+                                          <p:attrName>style.visibility</p:attrName>
+                                        </p:attrNameLst>
+                                      </p:cBhvr>
+                                      <p:to>
+                                        <p:strVal val="visible"/>
+                                      </p:to>
+                                    </p:set>
+                                  </p:childTnLst>
+                                </p:cTn>
+                              </p:par>
+                            </p:childTnLst>
+                          </p:cTn>
+                        </p:par>
+                      </p:childTnLst>
+                    </p:cTn>
+                  </p:par>
+                  <p:par>
+                    <p:cTn id="29" fill="hold">
+                      <p:stCondLst>
+                        <p:cond delay="indefinite"/>
+                      </p:stCondLst>
+                      <p:childTnLst>
+                        <p:par>
+                          <p:cTn id="30" fill="hold">
+                            <p:stCondLst>
+                              <p:cond delay="0"/>
+                            </p:stCondLst>
+                            <p:childTnLst>
+                              <p:par>
+                                <p:cTn id="31" presetID="1" presetClass="entr" presetSubtype="0" fill="hold" grpId="0" nodeType="clickEffect">
+                                  <p:stCondLst>
+                                    <p:cond delay="0"/>
+                                  </p:stCondLst>
+                                  <p:childTnLst>
+                                    <p:set>
+                                      <p:cBhvr>
+                                        <p:cTn id="32" dur="1" fill="hold">
+                                          <p:stCondLst>
+                                            <p:cond delay="0"/>
+                                          </p:stCondLst>
+                                        </p:cTn>
+                                        <p:tgtEl>
+                                          <p:spTgt spid="2"/>
+                                        </p:tgtEl>
+                                        <p:attrNameLst>
+                                          <p:attrName>style.visibility</p:attrName>
+                                        </p:attrNameLst>
+                                      </p:cBhvr>
+                                      <p:to>
+                                        <p:strVal val="visible"/>
+                                      </p:to>
+                                    </p:set>
+                                  </p:childTnLst>
+                                </p:cTn>
+                              </p:par>
+                            </p:childTnLst>
+                          </p:cTn>
+                        </p:par>
+                      </p:childTnLst>
+                    </p:cTn>
+                  </p:par>
+                  <p:par>
+                    <p:cTn id="33" fill="hold">
+                      <p:stCondLst>
+                        <p:cond delay="indefinite"/>
+                      </p:stCondLst>
+                      <p:childTnLst>
+                        <p:par>
+                          <p:cTn id="34" fill="hold">
+                            <p:stCondLst>
+                              <p:cond delay="0"/>
+                            </p:stCondLst>
+                            <p:childTnLst>
+                              <p:par>
+                                <p:cTn id="35" presetID="1" presetClass="entr" presetSubtype="0" fill="hold" grpId="0" nodeType="clickEffect">
+                                  <p:stCondLst>
+                                    <p:cond delay="0"/>
+                                  </p:stCondLst>
+                                  <p:childTnLst>
+                                    <p:set>
+                                      <p:cBhvr>
+                                        <p:cTn id="36" dur="1" fill="hold">
+                                          <p:stCondLst>
+                                            <p:cond delay="0"/>
+                                          </p:stCondLst>
+                                        </p:cTn>
+                                        <p:tgtEl>
+                                          <p:spTgt spid="3"/>
+                                        </p:tgtEl>
+                                        <p:attrNameLst>
+                                          <p:attrName>style.visibility</p:attrName>
+                                        </p:attrNameLst>
+                                      </p:cBhvr>
+                                      <p:to>
+                                        <p:strVal val="visible"/>
+                                      </p:to>
+                                    </p:set>
+                                  </p:childTnLst>
+                                </p:cTn>
+                              </p:par>
+                            </p:childTnLst>
+                          </p:cTn>
+                        </p:par>
+                      </p:childTnLst>
+                    </p:cTn>
+                  </p:par>
+                </p:childTnLst>
+              </p:cTn>
+              <p:prevCondLst>
+                <p:cond evt="onPrev" delay="0">
+                  <p:tgtEl>
+                    <p:sldTgt/>
+                  </p:tgtEl>
+                </p:cond>
+              </p:prevCondLst>
+              <p:nextCondLst>
+                <p:cond evt="onNext" delay="0">
+                  <p:tgtEl>
+                    <p:sldTgt/>
+                  </p:tgtEl>
+                </p:cond>
+              </p:nextCondLst>
+            </p:seq>
+          </p:childTnLst>
+        </p:cTn>
+      </p:par>
+    </p:tnLst>
+    <p:bldLst>
+      <p:bldP spid="8" grpId="0" build="p"/>
+      <p:bldP spid="6" grpId="0" build="p"/>
+      <p:bldP spid="2" grpId="0" animBg="1"/>
+      <p:bldP spid="3" grpId="0" animBg="1"/>
+    </p:bldLst>
+  </p:timing>
 </p:sld>
 </file>
 
@@ -7363,6 +7944,971 @@
   <p:clrMapOvr>
     <a:masterClrMapping/>
   </p:clrMapOvr>
+  <p:timing>
+    <p:tnLst>
+      <p:par>
+        <p:cTn id="1" dur="indefinite" restart="never" nodeType="tmRoot">
+          <p:childTnLst>
+            <p:seq concurrent="1" nextAc="seek">
+              <p:cTn id="2" dur="indefinite" nodeType="mainSeq">
+                <p:childTnLst>
+                  <p:par>
+                    <p:cTn id="3" fill="hold">
+                      <p:stCondLst>
+                        <p:cond delay="indefinite"/>
+                      </p:stCondLst>
+                      <p:childTnLst>
+                        <p:par>
+                          <p:cTn id="4" fill="hold">
+                            <p:stCondLst>
+                              <p:cond delay="0"/>
+                            </p:stCondLst>
+                            <p:childTnLst>
+                              <p:par>
+                                <p:cTn id="5" presetID="1" presetClass="entr" presetSubtype="0" fill="hold" grpId="0" nodeType="clickEffect">
+                                  <p:stCondLst>
+                                    <p:cond delay="0"/>
+                                  </p:stCondLst>
+                                  <p:childTnLst>
+                                    <p:set>
+                                      <p:cBhvr>
+                                        <p:cTn id="6" dur="1" fill="hold">
+                                          <p:stCondLst>
+                                            <p:cond delay="0"/>
+                                          </p:stCondLst>
+                                        </p:cTn>
+                                        <p:tgtEl>
+                                          <p:spTgt spid="3">
+                                            <p:txEl>
+                                              <p:pRg st="0" end="0"/>
+                                            </p:txEl>
+                                          </p:spTgt>
+                                        </p:tgtEl>
+                                        <p:attrNameLst>
+                                          <p:attrName>style.visibility</p:attrName>
+                                        </p:attrNameLst>
+                                      </p:cBhvr>
+                                      <p:to>
+                                        <p:strVal val="visible"/>
+                                      </p:to>
+                                    </p:set>
+                                  </p:childTnLst>
+                                </p:cTn>
+                              </p:par>
+                            </p:childTnLst>
+                          </p:cTn>
+                        </p:par>
+                      </p:childTnLst>
+                    </p:cTn>
+                  </p:par>
+                  <p:par>
+                    <p:cTn id="7" fill="hold">
+                      <p:stCondLst>
+                        <p:cond delay="indefinite"/>
+                      </p:stCondLst>
+                      <p:childTnLst>
+                        <p:par>
+                          <p:cTn id="8" fill="hold">
+                            <p:stCondLst>
+                              <p:cond delay="0"/>
+                            </p:stCondLst>
+                            <p:childTnLst>
+                              <p:par>
+                                <p:cTn id="9" presetID="1" presetClass="entr" presetSubtype="0" fill="hold" grpId="0" nodeType="clickEffect">
+                                  <p:stCondLst>
+                                    <p:cond delay="0"/>
+                                  </p:stCondLst>
+                                  <p:childTnLst>
+                                    <p:set>
+                                      <p:cBhvr>
+                                        <p:cTn id="10" dur="1" fill="hold">
+                                          <p:stCondLst>
+                                            <p:cond delay="0"/>
+                                          </p:stCondLst>
+                                        </p:cTn>
+                                        <p:tgtEl>
+                                          <p:spTgt spid="3">
+                                            <p:txEl>
+                                              <p:pRg st="1" end="1"/>
+                                            </p:txEl>
+                                          </p:spTgt>
+                                        </p:tgtEl>
+                                        <p:attrNameLst>
+                                          <p:attrName>style.visibility</p:attrName>
+                                        </p:attrNameLst>
+                                      </p:cBhvr>
+                                      <p:to>
+                                        <p:strVal val="visible"/>
+                                      </p:to>
+                                    </p:set>
+                                  </p:childTnLst>
+                                </p:cTn>
+                              </p:par>
+                            </p:childTnLst>
+                          </p:cTn>
+                        </p:par>
+                      </p:childTnLst>
+                    </p:cTn>
+                  </p:par>
+                  <p:par>
+                    <p:cTn id="11" fill="hold">
+                      <p:stCondLst>
+                        <p:cond delay="indefinite"/>
+                      </p:stCondLst>
+                      <p:childTnLst>
+                        <p:par>
+                          <p:cTn id="12" fill="hold">
+                            <p:stCondLst>
+                              <p:cond delay="0"/>
+                            </p:stCondLst>
+                            <p:childTnLst>
+                              <p:par>
+                                <p:cTn id="13" presetID="1" presetClass="entr" presetSubtype="0" fill="hold" grpId="0" nodeType="clickEffect">
+                                  <p:stCondLst>
+                                    <p:cond delay="0"/>
+                                  </p:stCondLst>
+                                  <p:childTnLst>
+                                    <p:set>
+                                      <p:cBhvr>
+                                        <p:cTn id="14" dur="1" fill="hold">
+                                          <p:stCondLst>
+                                            <p:cond delay="0"/>
+                                          </p:stCondLst>
+                                        </p:cTn>
+                                        <p:tgtEl>
+                                          <p:spTgt spid="3">
+                                            <p:txEl>
+                                              <p:pRg st="2" end="2"/>
+                                            </p:txEl>
+                                          </p:spTgt>
+                                        </p:tgtEl>
+                                        <p:attrNameLst>
+                                          <p:attrName>style.visibility</p:attrName>
+                                        </p:attrNameLst>
+                                      </p:cBhvr>
+                                      <p:to>
+                                        <p:strVal val="visible"/>
+                                      </p:to>
+                                    </p:set>
+                                  </p:childTnLst>
+                                </p:cTn>
+                              </p:par>
+                            </p:childTnLst>
+                          </p:cTn>
+                        </p:par>
+                      </p:childTnLst>
+                    </p:cTn>
+                  </p:par>
+                  <p:par>
+                    <p:cTn id="15" fill="hold">
+                      <p:stCondLst>
+                        <p:cond delay="indefinite"/>
+                      </p:stCondLst>
+                      <p:childTnLst>
+                        <p:par>
+                          <p:cTn id="16" fill="hold">
+                            <p:stCondLst>
+                              <p:cond delay="0"/>
+                            </p:stCondLst>
+                            <p:childTnLst>
+                              <p:par>
+                                <p:cTn id="17" presetID="1" presetClass="entr" presetSubtype="0" fill="hold" grpId="0" nodeType="clickEffect">
+                                  <p:stCondLst>
+                                    <p:cond delay="0"/>
+                                  </p:stCondLst>
+                                  <p:childTnLst>
+                                    <p:set>
+                                      <p:cBhvr>
+                                        <p:cTn id="18" dur="1" fill="hold">
+                                          <p:stCondLst>
+                                            <p:cond delay="0"/>
+                                          </p:stCondLst>
+                                        </p:cTn>
+                                        <p:tgtEl>
+                                          <p:spTgt spid="3">
+                                            <p:txEl>
+                                              <p:pRg st="3" end="3"/>
+                                            </p:txEl>
+                                          </p:spTgt>
+                                        </p:tgtEl>
+                                        <p:attrNameLst>
+                                          <p:attrName>style.visibility</p:attrName>
+                                        </p:attrNameLst>
+                                      </p:cBhvr>
+                                      <p:to>
+                                        <p:strVal val="visible"/>
+                                      </p:to>
+                                    </p:set>
+                                  </p:childTnLst>
+                                </p:cTn>
+                              </p:par>
+                            </p:childTnLst>
+                          </p:cTn>
+                        </p:par>
+                      </p:childTnLst>
+                    </p:cTn>
+                  </p:par>
+                  <p:par>
+                    <p:cTn id="19" fill="hold">
+                      <p:stCondLst>
+                        <p:cond delay="indefinite"/>
+                      </p:stCondLst>
+                      <p:childTnLst>
+                        <p:par>
+                          <p:cTn id="20" fill="hold">
+                            <p:stCondLst>
+                              <p:cond delay="0"/>
+                            </p:stCondLst>
+                            <p:childTnLst>
+                              <p:par>
+                                <p:cTn id="21" presetID="1" presetClass="entr" presetSubtype="0" fill="hold" grpId="0" nodeType="clickEffect">
+                                  <p:stCondLst>
+                                    <p:cond delay="0"/>
+                                  </p:stCondLst>
+                                  <p:childTnLst>
+                                    <p:set>
+                                      <p:cBhvr>
+                                        <p:cTn id="22" dur="1" fill="hold">
+                                          <p:stCondLst>
+                                            <p:cond delay="0"/>
+                                          </p:stCondLst>
+                                        </p:cTn>
+                                        <p:tgtEl>
+                                          <p:spTgt spid="3">
+                                            <p:txEl>
+                                              <p:pRg st="4" end="4"/>
+                                            </p:txEl>
+                                          </p:spTgt>
+                                        </p:tgtEl>
+                                        <p:attrNameLst>
+                                          <p:attrName>style.visibility</p:attrName>
+                                        </p:attrNameLst>
+                                      </p:cBhvr>
+                                      <p:to>
+                                        <p:strVal val="visible"/>
+                                      </p:to>
+                                    </p:set>
+                                  </p:childTnLst>
+                                </p:cTn>
+                              </p:par>
+                            </p:childTnLst>
+                          </p:cTn>
+                        </p:par>
+                      </p:childTnLst>
+                    </p:cTn>
+                  </p:par>
+                  <p:par>
+                    <p:cTn id="23" fill="hold">
+                      <p:stCondLst>
+                        <p:cond delay="indefinite"/>
+                      </p:stCondLst>
+                      <p:childTnLst>
+                        <p:par>
+                          <p:cTn id="24" fill="hold">
+                            <p:stCondLst>
+                              <p:cond delay="0"/>
+                            </p:stCondLst>
+                            <p:childTnLst>
+                              <p:par>
+                                <p:cTn id="25" presetID="1" presetClass="entr" presetSubtype="0" fill="hold" grpId="0" nodeType="clickEffect">
+                                  <p:stCondLst>
+                                    <p:cond delay="0"/>
+                                  </p:stCondLst>
+                                  <p:childTnLst>
+                                    <p:set>
+                                      <p:cBhvr>
+                                        <p:cTn id="26" dur="1" fill="hold">
+                                          <p:stCondLst>
+                                            <p:cond delay="0"/>
+                                          </p:stCondLst>
+                                        </p:cTn>
+                                        <p:tgtEl>
+                                          <p:spTgt spid="3">
+                                            <p:txEl>
+                                              <p:pRg st="5" end="5"/>
+                                            </p:txEl>
+                                          </p:spTgt>
+                                        </p:tgtEl>
+                                        <p:attrNameLst>
+                                          <p:attrName>style.visibility</p:attrName>
+                                        </p:attrNameLst>
+                                      </p:cBhvr>
+                                      <p:to>
+                                        <p:strVal val="visible"/>
+                                      </p:to>
+                                    </p:set>
+                                  </p:childTnLst>
+                                </p:cTn>
+                              </p:par>
+                            </p:childTnLst>
+                          </p:cTn>
+                        </p:par>
+                      </p:childTnLst>
+                    </p:cTn>
+                  </p:par>
+                  <p:par>
+                    <p:cTn id="27" fill="hold">
+                      <p:stCondLst>
+                        <p:cond delay="indefinite"/>
+                      </p:stCondLst>
+                      <p:childTnLst>
+                        <p:par>
+                          <p:cTn id="28" fill="hold">
+                            <p:stCondLst>
+                              <p:cond delay="0"/>
+                            </p:stCondLst>
+                            <p:childTnLst>
+                              <p:par>
+                                <p:cTn id="29" presetID="1" presetClass="entr" presetSubtype="0" fill="hold" grpId="0" nodeType="clickEffect">
+                                  <p:stCondLst>
+                                    <p:cond delay="0"/>
+                                  </p:stCondLst>
+                                  <p:childTnLst>
+                                    <p:set>
+                                      <p:cBhvr>
+                                        <p:cTn id="30" dur="1" fill="hold">
+                                          <p:stCondLst>
+                                            <p:cond delay="0"/>
+                                          </p:stCondLst>
+                                        </p:cTn>
+                                        <p:tgtEl>
+                                          <p:spTgt spid="3">
+                                            <p:txEl>
+                                              <p:pRg st="6" end="6"/>
+                                            </p:txEl>
+                                          </p:spTgt>
+                                        </p:tgtEl>
+                                        <p:attrNameLst>
+                                          <p:attrName>style.visibility</p:attrName>
+                                        </p:attrNameLst>
+                                      </p:cBhvr>
+                                      <p:to>
+                                        <p:strVal val="visible"/>
+                                      </p:to>
+                                    </p:set>
+                                  </p:childTnLst>
+                                </p:cTn>
+                              </p:par>
+                            </p:childTnLst>
+                          </p:cTn>
+                        </p:par>
+                      </p:childTnLst>
+                    </p:cTn>
+                  </p:par>
+                  <p:par>
+                    <p:cTn id="31" fill="hold">
+                      <p:stCondLst>
+                        <p:cond delay="indefinite"/>
+                      </p:stCondLst>
+                      <p:childTnLst>
+                        <p:par>
+                          <p:cTn id="32" fill="hold">
+                            <p:stCondLst>
+                              <p:cond delay="0"/>
+                            </p:stCondLst>
+                            <p:childTnLst>
+                              <p:par>
+                                <p:cTn id="33" presetID="1" presetClass="entr" presetSubtype="0" fill="hold" grpId="0" nodeType="clickEffect">
+                                  <p:stCondLst>
+                                    <p:cond delay="0"/>
+                                  </p:stCondLst>
+                                  <p:childTnLst>
+                                    <p:set>
+                                      <p:cBhvr>
+                                        <p:cTn id="34" dur="1" fill="hold">
+                                          <p:stCondLst>
+                                            <p:cond delay="0"/>
+                                          </p:stCondLst>
+                                        </p:cTn>
+                                        <p:tgtEl>
+                                          <p:spTgt spid="3">
+                                            <p:txEl>
+                                              <p:pRg st="7" end="7"/>
+                                            </p:txEl>
+                                          </p:spTgt>
+                                        </p:tgtEl>
+                                        <p:attrNameLst>
+                                          <p:attrName>style.visibility</p:attrName>
+                                        </p:attrNameLst>
+                                      </p:cBhvr>
+                                      <p:to>
+                                        <p:strVal val="visible"/>
+                                      </p:to>
+                                    </p:set>
+                                  </p:childTnLst>
+                                </p:cTn>
+                              </p:par>
+                            </p:childTnLst>
+                          </p:cTn>
+                        </p:par>
+                      </p:childTnLst>
+                    </p:cTn>
+                  </p:par>
+                  <p:par>
+                    <p:cTn id="35" fill="hold">
+                      <p:stCondLst>
+                        <p:cond delay="indefinite"/>
+                      </p:stCondLst>
+                      <p:childTnLst>
+                        <p:par>
+                          <p:cTn id="36" fill="hold">
+                            <p:stCondLst>
+                              <p:cond delay="0"/>
+                            </p:stCondLst>
+                            <p:childTnLst>
+                              <p:par>
+                                <p:cTn id="37" presetID="1" presetClass="entr" presetSubtype="0" fill="hold" grpId="0" nodeType="clickEffect">
+                                  <p:stCondLst>
+                                    <p:cond delay="0"/>
+                                  </p:stCondLst>
+                                  <p:childTnLst>
+                                    <p:set>
+                                      <p:cBhvr>
+                                        <p:cTn id="38" dur="1" fill="hold">
+                                          <p:stCondLst>
+                                            <p:cond delay="0"/>
+                                          </p:stCondLst>
+                                        </p:cTn>
+                                        <p:tgtEl>
+                                          <p:spTgt spid="3">
+                                            <p:txEl>
+                                              <p:pRg st="8" end="8"/>
+                                            </p:txEl>
+                                          </p:spTgt>
+                                        </p:tgtEl>
+                                        <p:attrNameLst>
+                                          <p:attrName>style.visibility</p:attrName>
+                                        </p:attrNameLst>
+                                      </p:cBhvr>
+                                      <p:to>
+                                        <p:strVal val="visible"/>
+                                      </p:to>
+                                    </p:set>
+                                  </p:childTnLst>
+                                </p:cTn>
+                              </p:par>
+                            </p:childTnLst>
+                          </p:cTn>
+                        </p:par>
+                      </p:childTnLst>
+                    </p:cTn>
+                  </p:par>
+                  <p:par>
+                    <p:cTn id="39" fill="hold">
+                      <p:stCondLst>
+                        <p:cond delay="indefinite"/>
+                      </p:stCondLst>
+                      <p:childTnLst>
+                        <p:par>
+                          <p:cTn id="40" fill="hold">
+                            <p:stCondLst>
+                              <p:cond delay="0"/>
+                            </p:stCondLst>
+                            <p:childTnLst>
+                              <p:par>
+                                <p:cTn id="41" presetID="1" presetClass="entr" presetSubtype="0" fill="hold" grpId="0" nodeType="clickEffect">
+                                  <p:stCondLst>
+                                    <p:cond delay="0"/>
+                                  </p:stCondLst>
+                                  <p:childTnLst>
+                                    <p:set>
+                                      <p:cBhvr>
+                                        <p:cTn id="42" dur="1" fill="hold">
+                                          <p:stCondLst>
+                                            <p:cond delay="0"/>
+                                          </p:stCondLst>
+                                        </p:cTn>
+                                        <p:tgtEl>
+                                          <p:spTgt spid="3">
+                                            <p:txEl>
+                                              <p:pRg st="9" end="9"/>
+                                            </p:txEl>
+                                          </p:spTgt>
+                                        </p:tgtEl>
+                                        <p:attrNameLst>
+                                          <p:attrName>style.visibility</p:attrName>
+                                        </p:attrNameLst>
+                                      </p:cBhvr>
+                                      <p:to>
+                                        <p:strVal val="visible"/>
+                                      </p:to>
+                                    </p:set>
+                                  </p:childTnLst>
+                                </p:cTn>
+                              </p:par>
+                            </p:childTnLst>
+                          </p:cTn>
+                        </p:par>
+                      </p:childTnLst>
+                    </p:cTn>
+                  </p:par>
+                  <p:par>
+                    <p:cTn id="43" fill="hold">
+                      <p:stCondLst>
+                        <p:cond delay="indefinite"/>
+                      </p:stCondLst>
+                      <p:childTnLst>
+                        <p:par>
+                          <p:cTn id="44" fill="hold">
+                            <p:stCondLst>
+                              <p:cond delay="0"/>
+                            </p:stCondLst>
+                            <p:childTnLst>
+                              <p:par>
+                                <p:cTn id="45" presetID="1" presetClass="entr" presetSubtype="0" fill="hold" grpId="0" nodeType="clickEffect">
+                                  <p:stCondLst>
+                                    <p:cond delay="0"/>
+                                  </p:stCondLst>
+                                  <p:childTnLst>
+                                    <p:set>
+                                      <p:cBhvr>
+                                        <p:cTn id="46" dur="1" fill="hold">
+                                          <p:stCondLst>
+                                            <p:cond delay="0"/>
+                                          </p:stCondLst>
+                                        </p:cTn>
+                                        <p:tgtEl>
+                                          <p:spTgt spid="3">
+                                            <p:txEl>
+                                              <p:pRg st="10" end="10"/>
+                                            </p:txEl>
+                                          </p:spTgt>
+                                        </p:tgtEl>
+                                        <p:attrNameLst>
+                                          <p:attrName>style.visibility</p:attrName>
+                                        </p:attrNameLst>
+                                      </p:cBhvr>
+                                      <p:to>
+                                        <p:strVal val="visible"/>
+                                      </p:to>
+                                    </p:set>
+                                  </p:childTnLst>
+                                </p:cTn>
+                              </p:par>
+                            </p:childTnLst>
+                          </p:cTn>
+                        </p:par>
+                      </p:childTnLst>
+                    </p:cTn>
+                  </p:par>
+                  <p:par>
+                    <p:cTn id="47" fill="hold">
+                      <p:stCondLst>
+                        <p:cond delay="indefinite"/>
+                      </p:stCondLst>
+                      <p:childTnLst>
+                        <p:par>
+                          <p:cTn id="48" fill="hold">
+                            <p:stCondLst>
+                              <p:cond delay="0"/>
+                            </p:stCondLst>
+                            <p:childTnLst>
+                              <p:par>
+                                <p:cTn id="49" presetID="1" presetClass="entr" presetSubtype="0" fill="hold" grpId="0" nodeType="clickEffect">
+                                  <p:stCondLst>
+                                    <p:cond delay="0"/>
+                                  </p:stCondLst>
+                                  <p:childTnLst>
+                                    <p:set>
+                                      <p:cBhvr>
+                                        <p:cTn id="50" dur="1" fill="hold">
+                                          <p:stCondLst>
+                                            <p:cond delay="0"/>
+                                          </p:stCondLst>
+                                        </p:cTn>
+                                        <p:tgtEl>
+                                          <p:spTgt spid="5">
+                                            <p:txEl>
+                                              <p:pRg st="0" end="0"/>
+                                            </p:txEl>
+                                          </p:spTgt>
+                                        </p:tgtEl>
+                                        <p:attrNameLst>
+                                          <p:attrName>style.visibility</p:attrName>
+                                        </p:attrNameLst>
+                                      </p:cBhvr>
+                                      <p:to>
+                                        <p:strVal val="visible"/>
+                                      </p:to>
+                                    </p:set>
+                                  </p:childTnLst>
+                                </p:cTn>
+                              </p:par>
+                            </p:childTnLst>
+                          </p:cTn>
+                        </p:par>
+                      </p:childTnLst>
+                    </p:cTn>
+                  </p:par>
+                  <p:par>
+                    <p:cTn id="51" fill="hold">
+                      <p:stCondLst>
+                        <p:cond delay="indefinite"/>
+                      </p:stCondLst>
+                      <p:childTnLst>
+                        <p:par>
+                          <p:cTn id="52" fill="hold">
+                            <p:stCondLst>
+                              <p:cond delay="0"/>
+                            </p:stCondLst>
+                            <p:childTnLst>
+                              <p:par>
+                                <p:cTn id="53" presetID="1" presetClass="entr" presetSubtype="0" fill="hold" grpId="0" nodeType="clickEffect">
+                                  <p:stCondLst>
+                                    <p:cond delay="0"/>
+                                  </p:stCondLst>
+                                  <p:childTnLst>
+                                    <p:set>
+                                      <p:cBhvr>
+                                        <p:cTn id="54" dur="1" fill="hold">
+                                          <p:stCondLst>
+                                            <p:cond delay="0"/>
+                                          </p:stCondLst>
+                                        </p:cTn>
+                                        <p:tgtEl>
+                                          <p:spTgt spid="5">
+                                            <p:txEl>
+                                              <p:pRg st="1" end="1"/>
+                                            </p:txEl>
+                                          </p:spTgt>
+                                        </p:tgtEl>
+                                        <p:attrNameLst>
+                                          <p:attrName>style.visibility</p:attrName>
+                                        </p:attrNameLst>
+                                      </p:cBhvr>
+                                      <p:to>
+                                        <p:strVal val="visible"/>
+                                      </p:to>
+                                    </p:set>
+                                  </p:childTnLst>
+                                </p:cTn>
+                              </p:par>
+                            </p:childTnLst>
+                          </p:cTn>
+                        </p:par>
+                      </p:childTnLst>
+                    </p:cTn>
+                  </p:par>
+                  <p:par>
+                    <p:cTn id="55" fill="hold">
+                      <p:stCondLst>
+                        <p:cond delay="indefinite"/>
+                      </p:stCondLst>
+                      <p:childTnLst>
+                        <p:par>
+                          <p:cTn id="56" fill="hold">
+                            <p:stCondLst>
+                              <p:cond delay="0"/>
+                            </p:stCondLst>
+                            <p:childTnLst>
+                              <p:par>
+                                <p:cTn id="57" presetID="1" presetClass="entr" presetSubtype="0" fill="hold" grpId="0" nodeType="clickEffect">
+                                  <p:stCondLst>
+                                    <p:cond delay="0"/>
+                                  </p:stCondLst>
+                                  <p:childTnLst>
+                                    <p:set>
+                                      <p:cBhvr>
+                                        <p:cTn id="58" dur="1" fill="hold">
+                                          <p:stCondLst>
+                                            <p:cond delay="0"/>
+                                          </p:stCondLst>
+                                        </p:cTn>
+                                        <p:tgtEl>
+                                          <p:spTgt spid="5">
+                                            <p:txEl>
+                                              <p:pRg st="2" end="2"/>
+                                            </p:txEl>
+                                          </p:spTgt>
+                                        </p:tgtEl>
+                                        <p:attrNameLst>
+                                          <p:attrName>style.visibility</p:attrName>
+                                        </p:attrNameLst>
+                                      </p:cBhvr>
+                                      <p:to>
+                                        <p:strVal val="visible"/>
+                                      </p:to>
+                                    </p:set>
+                                  </p:childTnLst>
+                                </p:cTn>
+                              </p:par>
+                            </p:childTnLst>
+                          </p:cTn>
+                        </p:par>
+                      </p:childTnLst>
+                    </p:cTn>
+                  </p:par>
+                  <p:par>
+                    <p:cTn id="59" fill="hold">
+                      <p:stCondLst>
+                        <p:cond delay="indefinite"/>
+                      </p:stCondLst>
+                      <p:childTnLst>
+                        <p:par>
+                          <p:cTn id="60" fill="hold">
+                            <p:stCondLst>
+                              <p:cond delay="0"/>
+                            </p:stCondLst>
+                            <p:childTnLst>
+                              <p:par>
+                                <p:cTn id="61" presetID="1" presetClass="entr" presetSubtype="0" fill="hold" grpId="0" nodeType="clickEffect">
+                                  <p:stCondLst>
+                                    <p:cond delay="0"/>
+                                  </p:stCondLst>
+                                  <p:childTnLst>
+                                    <p:set>
+                                      <p:cBhvr>
+                                        <p:cTn id="62" dur="1" fill="hold">
+                                          <p:stCondLst>
+                                            <p:cond delay="0"/>
+                                          </p:stCondLst>
+                                        </p:cTn>
+                                        <p:tgtEl>
+                                          <p:spTgt spid="5">
+                                            <p:txEl>
+                                              <p:pRg st="3" end="3"/>
+                                            </p:txEl>
+                                          </p:spTgt>
+                                        </p:tgtEl>
+                                        <p:attrNameLst>
+                                          <p:attrName>style.visibility</p:attrName>
+                                        </p:attrNameLst>
+                                      </p:cBhvr>
+                                      <p:to>
+                                        <p:strVal val="visible"/>
+                                      </p:to>
+                                    </p:set>
+                                  </p:childTnLst>
+                                </p:cTn>
+                              </p:par>
+                            </p:childTnLst>
+                          </p:cTn>
+                        </p:par>
+                      </p:childTnLst>
+                    </p:cTn>
+                  </p:par>
+                  <p:par>
+                    <p:cTn id="63" fill="hold">
+                      <p:stCondLst>
+                        <p:cond delay="indefinite"/>
+                      </p:stCondLst>
+                      <p:childTnLst>
+                        <p:par>
+                          <p:cTn id="64" fill="hold">
+                            <p:stCondLst>
+                              <p:cond delay="0"/>
+                            </p:stCondLst>
+                            <p:childTnLst>
+                              <p:par>
+                                <p:cTn id="65" presetID="1" presetClass="entr" presetSubtype="0" fill="hold" grpId="0" nodeType="clickEffect">
+                                  <p:stCondLst>
+                                    <p:cond delay="0"/>
+                                  </p:stCondLst>
+                                  <p:childTnLst>
+                                    <p:set>
+                                      <p:cBhvr>
+                                        <p:cTn id="66" dur="1" fill="hold">
+                                          <p:stCondLst>
+                                            <p:cond delay="0"/>
+                                          </p:stCondLst>
+                                        </p:cTn>
+                                        <p:tgtEl>
+                                          <p:spTgt spid="5">
+                                            <p:txEl>
+                                              <p:pRg st="4" end="4"/>
+                                            </p:txEl>
+                                          </p:spTgt>
+                                        </p:tgtEl>
+                                        <p:attrNameLst>
+                                          <p:attrName>style.visibility</p:attrName>
+                                        </p:attrNameLst>
+                                      </p:cBhvr>
+                                      <p:to>
+                                        <p:strVal val="visible"/>
+                                      </p:to>
+                                    </p:set>
+                                  </p:childTnLst>
+                                </p:cTn>
+                              </p:par>
+                            </p:childTnLst>
+                          </p:cTn>
+                        </p:par>
+                      </p:childTnLst>
+                    </p:cTn>
+                  </p:par>
+                  <p:par>
+                    <p:cTn id="67" fill="hold">
+                      <p:stCondLst>
+                        <p:cond delay="indefinite"/>
+                      </p:stCondLst>
+                      <p:childTnLst>
+                        <p:par>
+                          <p:cTn id="68" fill="hold">
+                            <p:stCondLst>
+                              <p:cond delay="0"/>
+                            </p:stCondLst>
+                            <p:childTnLst>
+                              <p:par>
+                                <p:cTn id="69" presetID="1" presetClass="entr" presetSubtype="0" fill="hold" grpId="0" nodeType="clickEffect">
+                                  <p:stCondLst>
+                                    <p:cond delay="0"/>
+                                  </p:stCondLst>
+                                  <p:childTnLst>
+                                    <p:set>
+                                      <p:cBhvr>
+                                        <p:cTn id="70" dur="1" fill="hold">
+                                          <p:stCondLst>
+                                            <p:cond delay="0"/>
+                                          </p:stCondLst>
+                                        </p:cTn>
+                                        <p:tgtEl>
+                                          <p:spTgt spid="5">
+                                            <p:txEl>
+                                              <p:pRg st="5" end="5"/>
+                                            </p:txEl>
+                                          </p:spTgt>
+                                        </p:tgtEl>
+                                        <p:attrNameLst>
+                                          <p:attrName>style.visibility</p:attrName>
+                                        </p:attrNameLst>
+                                      </p:cBhvr>
+                                      <p:to>
+                                        <p:strVal val="visible"/>
+                                      </p:to>
+                                    </p:set>
+                                  </p:childTnLst>
+                                </p:cTn>
+                              </p:par>
+                            </p:childTnLst>
+                          </p:cTn>
+                        </p:par>
+                      </p:childTnLst>
+                    </p:cTn>
+                  </p:par>
+                  <p:par>
+                    <p:cTn id="71" fill="hold">
+                      <p:stCondLst>
+                        <p:cond delay="indefinite"/>
+                      </p:stCondLst>
+                      <p:childTnLst>
+                        <p:par>
+                          <p:cTn id="72" fill="hold">
+                            <p:stCondLst>
+                              <p:cond delay="0"/>
+                            </p:stCondLst>
+                            <p:childTnLst>
+                              <p:par>
+                                <p:cTn id="73" presetID="1" presetClass="entr" presetSubtype="0" fill="hold" grpId="0" nodeType="clickEffect">
+                                  <p:stCondLst>
+                                    <p:cond delay="0"/>
+                                  </p:stCondLst>
+                                  <p:childTnLst>
+                                    <p:set>
+                                      <p:cBhvr>
+                                        <p:cTn id="74" dur="1" fill="hold">
+                                          <p:stCondLst>
+                                            <p:cond delay="0"/>
+                                          </p:stCondLst>
+                                        </p:cTn>
+                                        <p:tgtEl>
+                                          <p:spTgt spid="5">
+                                            <p:txEl>
+                                              <p:pRg st="6" end="6"/>
+                                            </p:txEl>
+                                          </p:spTgt>
+                                        </p:tgtEl>
+                                        <p:attrNameLst>
+                                          <p:attrName>style.visibility</p:attrName>
+                                        </p:attrNameLst>
+                                      </p:cBhvr>
+                                      <p:to>
+                                        <p:strVal val="visible"/>
+                                      </p:to>
+                                    </p:set>
+                                  </p:childTnLst>
+                                </p:cTn>
+                              </p:par>
+                            </p:childTnLst>
+                          </p:cTn>
+                        </p:par>
+                      </p:childTnLst>
+                    </p:cTn>
+                  </p:par>
+                  <p:par>
+                    <p:cTn id="75" fill="hold">
+                      <p:stCondLst>
+                        <p:cond delay="indefinite"/>
+                      </p:stCondLst>
+                      <p:childTnLst>
+                        <p:par>
+                          <p:cTn id="76" fill="hold">
+                            <p:stCondLst>
+                              <p:cond delay="0"/>
+                            </p:stCondLst>
+                            <p:childTnLst>
+                              <p:par>
+                                <p:cTn id="77" presetID="1" presetClass="entr" presetSubtype="0" fill="hold" grpId="0" nodeType="clickEffect">
+                                  <p:stCondLst>
+                                    <p:cond delay="0"/>
+                                  </p:stCondLst>
+                                  <p:childTnLst>
+                                    <p:set>
+                                      <p:cBhvr>
+                                        <p:cTn id="78" dur="1" fill="hold">
+                                          <p:stCondLst>
+                                            <p:cond delay="0"/>
+                                          </p:stCondLst>
+                                        </p:cTn>
+                                        <p:tgtEl>
+                                          <p:spTgt spid="5">
+                                            <p:txEl>
+                                              <p:pRg st="7" end="7"/>
+                                            </p:txEl>
+                                          </p:spTgt>
+                                        </p:tgtEl>
+                                        <p:attrNameLst>
+                                          <p:attrName>style.visibility</p:attrName>
+                                        </p:attrNameLst>
+                                      </p:cBhvr>
+                                      <p:to>
+                                        <p:strVal val="visible"/>
+                                      </p:to>
+                                    </p:set>
+                                  </p:childTnLst>
+                                </p:cTn>
+                              </p:par>
+                            </p:childTnLst>
+                          </p:cTn>
+                        </p:par>
+                      </p:childTnLst>
+                    </p:cTn>
+                  </p:par>
+                </p:childTnLst>
+              </p:cTn>
+              <p:prevCondLst>
+                <p:cond evt="onPrev" delay="0">
+                  <p:tgtEl>
+                    <p:sldTgt/>
+                  </p:tgtEl>
+                </p:cond>
+              </p:prevCondLst>
+              <p:nextCondLst>
+                <p:cond evt="onNext" delay="0">
+                  <p:tgtEl>
+                    <p:sldTgt/>
+                  </p:tgtEl>
+                </p:cond>
+              </p:nextCondLst>
+            </p:seq>
+          </p:childTnLst>
+        </p:cTn>
+      </p:par>
+    </p:tnLst>
+    <p:bldLst>
+      <p:bldP spid="3" grpId="0" build="p"/>
+      <p:bldP spid="5" grpId="0" build="p"/>
+    </p:bldLst>
+  </p:timing>
 </p:sld>
 </file>
 
@@ -7510,6 +9056,403 @@
   <p:clrMapOvr>
     <a:masterClrMapping/>
   </p:clrMapOvr>
+  <p:timing>
+    <p:tnLst>
+      <p:par>
+        <p:cTn id="1" dur="indefinite" restart="never" nodeType="tmRoot">
+          <p:childTnLst>
+            <p:seq concurrent="1" nextAc="seek">
+              <p:cTn id="2" dur="indefinite" nodeType="mainSeq">
+                <p:childTnLst>
+                  <p:par>
+                    <p:cTn id="3" fill="hold">
+                      <p:stCondLst>
+                        <p:cond delay="indefinite"/>
+                      </p:stCondLst>
+                      <p:childTnLst>
+                        <p:par>
+                          <p:cTn id="4" fill="hold">
+                            <p:stCondLst>
+                              <p:cond delay="0"/>
+                            </p:stCondLst>
+                            <p:childTnLst>
+                              <p:par>
+                                <p:cTn id="5" presetID="1" presetClass="entr" presetSubtype="0" fill="hold" grpId="0" nodeType="clickEffect">
+                                  <p:stCondLst>
+                                    <p:cond delay="0"/>
+                                  </p:stCondLst>
+                                  <p:childTnLst>
+                                    <p:set>
+                                      <p:cBhvr>
+                                        <p:cTn id="6" dur="1" fill="hold">
+                                          <p:stCondLst>
+                                            <p:cond delay="0"/>
+                                          </p:stCondLst>
+                                        </p:cTn>
+                                        <p:tgtEl>
+                                          <p:spTgt spid="3">
+                                            <p:txEl>
+                                              <p:pRg st="0" end="0"/>
+                                            </p:txEl>
+                                          </p:spTgt>
+                                        </p:tgtEl>
+                                        <p:attrNameLst>
+                                          <p:attrName>style.visibility</p:attrName>
+                                        </p:attrNameLst>
+                                      </p:cBhvr>
+                                      <p:to>
+                                        <p:strVal val="visible"/>
+                                      </p:to>
+                                    </p:set>
+                                  </p:childTnLst>
+                                </p:cTn>
+                              </p:par>
+                            </p:childTnLst>
+                          </p:cTn>
+                        </p:par>
+                      </p:childTnLst>
+                    </p:cTn>
+                  </p:par>
+                  <p:par>
+                    <p:cTn id="7" fill="hold">
+                      <p:stCondLst>
+                        <p:cond delay="indefinite"/>
+                      </p:stCondLst>
+                      <p:childTnLst>
+                        <p:par>
+                          <p:cTn id="8" fill="hold">
+                            <p:stCondLst>
+                              <p:cond delay="0"/>
+                            </p:stCondLst>
+                            <p:childTnLst>
+                              <p:par>
+                                <p:cTn id="9" presetID="1" presetClass="entr" presetSubtype="0" fill="hold" grpId="0" nodeType="clickEffect">
+                                  <p:stCondLst>
+                                    <p:cond delay="0"/>
+                                  </p:stCondLst>
+                                  <p:childTnLst>
+                                    <p:set>
+                                      <p:cBhvr>
+                                        <p:cTn id="10" dur="1" fill="hold">
+                                          <p:stCondLst>
+                                            <p:cond delay="0"/>
+                                          </p:stCondLst>
+                                        </p:cTn>
+                                        <p:tgtEl>
+                                          <p:spTgt spid="3">
+                                            <p:txEl>
+                                              <p:pRg st="1" end="1"/>
+                                            </p:txEl>
+                                          </p:spTgt>
+                                        </p:tgtEl>
+                                        <p:attrNameLst>
+                                          <p:attrName>style.visibility</p:attrName>
+                                        </p:attrNameLst>
+                                      </p:cBhvr>
+                                      <p:to>
+                                        <p:strVal val="visible"/>
+                                      </p:to>
+                                    </p:set>
+                                  </p:childTnLst>
+                                </p:cTn>
+                              </p:par>
+                              <p:par>
+                                <p:cTn id="11" presetID="1" presetClass="entr" presetSubtype="0" fill="hold" grpId="0" nodeType="withEffect">
+                                  <p:stCondLst>
+                                    <p:cond delay="0"/>
+                                  </p:stCondLst>
+                                  <p:childTnLst>
+                                    <p:set>
+                                      <p:cBhvr>
+                                        <p:cTn id="12" dur="1" fill="hold">
+                                          <p:stCondLst>
+                                            <p:cond delay="0"/>
+                                          </p:stCondLst>
+                                        </p:cTn>
+                                        <p:tgtEl>
+                                          <p:spTgt spid="3">
+                                            <p:txEl>
+                                              <p:pRg st="2" end="2"/>
+                                            </p:txEl>
+                                          </p:spTgt>
+                                        </p:tgtEl>
+                                        <p:attrNameLst>
+                                          <p:attrName>style.visibility</p:attrName>
+                                        </p:attrNameLst>
+                                      </p:cBhvr>
+                                      <p:to>
+                                        <p:strVal val="visible"/>
+                                      </p:to>
+                                    </p:set>
+                                  </p:childTnLst>
+                                </p:cTn>
+                              </p:par>
+                              <p:par>
+                                <p:cTn id="13" presetID="1" presetClass="entr" presetSubtype="0" fill="hold" grpId="0" nodeType="withEffect">
+                                  <p:stCondLst>
+                                    <p:cond delay="0"/>
+                                  </p:stCondLst>
+                                  <p:childTnLst>
+                                    <p:set>
+                                      <p:cBhvr>
+                                        <p:cTn id="14" dur="1" fill="hold">
+                                          <p:stCondLst>
+                                            <p:cond delay="0"/>
+                                          </p:stCondLst>
+                                        </p:cTn>
+                                        <p:tgtEl>
+                                          <p:spTgt spid="3">
+                                            <p:txEl>
+                                              <p:pRg st="3" end="3"/>
+                                            </p:txEl>
+                                          </p:spTgt>
+                                        </p:tgtEl>
+                                        <p:attrNameLst>
+                                          <p:attrName>style.visibility</p:attrName>
+                                        </p:attrNameLst>
+                                      </p:cBhvr>
+                                      <p:to>
+                                        <p:strVal val="visible"/>
+                                      </p:to>
+                                    </p:set>
+                                  </p:childTnLst>
+                                </p:cTn>
+                              </p:par>
+                              <p:par>
+                                <p:cTn id="15" presetID="1" presetClass="entr" presetSubtype="0" fill="hold" grpId="0" nodeType="withEffect">
+                                  <p:stCondLst>
+                                    <p:cond delay="0"/>
+                                  </p:stCondLst>
+                                  <p:childTnLst>
+                                    <p:set>
+                                      <p:cBhvr>
+                                        <p:cTn id="16" dur="1" fill="hold">
+                                          <p:stCondLst>
+                                            <p:cond delay="0"/>
+                                          </p:stCondLst>
+                                        </p:cTn>
+                                        <p:tgtEl>
+                                          <p:spTgt spid="3">
+                                            <p:txEl>
+                                              <p:pRg st="4" end="4"/>
+                                            </p:txEl>
+                                          </p:spTgt>
+                                        </p:tgtEl>
+                                        <p:attrNameLst>
+                                          <p:attrName>style.visibility</p:attrName>
+                                        </p:attrNameLst>
+                                      </p:cBhvr>
+                                      <p:to>
+                                        <p:strVal val="visible"/>
+                                      </p:to>
+                                    </p:set>
+                                  </p:childTnLst>
+                                </p:cTn>
+                              </p:par>
+                              <p:par>
+                                <p:cTn id="17" presetID="1" presetClass="entr" presetSubtype="0" fill="hold" grpId="0" nodeType="withEffect">
+                                  <p:stCondLst>
+                                    <p:cond delay="0"/>
+                                  </p:stCondLst>
+                                  <p:childTnLst>
+                                    <p:set>
+                                      <p:cBhvr>
+                                        <p:cTn id="18" dur="1" fill="hold">
+                                          <p:stCondLst>
+                                            <p:cond delay="0"/>
+                                          </p:stCondLst>
+                                        </p:cTn>
+                                        <p:tgtEl>
+                                          <p:spTgt spid="3">
+                                            <p:txEl>
+                                              <p:pRg st="5" end="5"/>
+                                            </p:txEl>
+                                          </p:spTgt>
+                                        </p:tgtEl>
+                                        <p:attrNameLst>
+                                          <p:attrName>style.visibility</p:attrName>
+                                        </p:attrNameLst>
+                                      </p:cBhvr>
+                                      <p:to>
+                                        <p:strVal val="visible"/>
+                                      </p:to>
+                                    </p:set>
+                                  </p:childTnLst>
+                                </p:cTn>
+                              </p:par>
+                              <p:par>
+                                <p:cTn id="19" presetID="1" presetClass="entr" presetSubtype="0" fill="hold" grpId="0" nodeType="withEffect">
+                                  <p:stCondLst>
+                                    <p:cond delay="0"/>
+                                  </p:stCondLst>
+                                  <p:childTnLst>
+                                    <p:set>
+                                      <p:cBhvr>
+                                        <p:cTn id="20" dur="1" fill="hold">
+                                          <p:stCondLst>
+                                            <p:cond delay="0"/>
+                                          </p:stCondLst>
+                                        </p:cTn>
+                                        <p:tgtEl>
+                                          <p:spTgt spid="3">
+                                            <p:txEl>
+                                              <p:pRg st="6" end="6"/>
+                                            </p:txEl>
+                                          </p:spTgt>
+                                        </p:tgtEl>
+                                        <p:attrNameLst>
+                                          <p:attrName>style.visibility</p:attrName>
+                                        </p:attrNameLst>
+                                      </p:cBhvr>
+                                      <p:to>
+                                        <p:strVal val="visible"/>
+                                      </p:to>
+                                    </p:set>
+                                  </p:childTnLst>
+                                </p:cTn>
+                              </p:par>
+                              <p:par>
+                                <p:cTn id="21" presetID="1" presetClass="entr" presetSubtype="0" fill="hold" grpId="0" nodeType="withEffect">
+                                  <p:stCondLst>
+                                    <p:cond delay="0"/>
+                                  </p:stCondLst>
+                                  <p:childTnLst>
+                                    <p:set>
+                                      <p:cBhvr>
+                                        <p:cTn id="22" dur="1" fill="hold">
+                                          <p:stCondLst>
+                                            <p:cond delay="0"/>
+                                          </p:stCondLst>
+                                        </p:cTn>
+                                        <p:tgtEl>
+                                          <p:spTgt spid="3">
+                                            <p:txEl>
+                                              <p:pRg st="7" end="7"/>
+                                            </p:txEl>
+                                          </p:spTgt>
+                                        </p:tgtEl>
+                                        <p:attrNameLst>
+                                          <p:attrName>style.visibility</p:attrName>
+                                        </p:attrNameLst>
+                                      </p:cBhvr>
+                                      <p:to>
+                                        <p:strVal val="visible"/>
+                                      </p:to>
+                                    </p:set>
+                                  </p:childTnLst>
+                                </p:cTn>
+                              </p:par>
+                              <p:par>
+                                <p:cTn id="23" presetID="1" presetClass="entr" presetSubtype="0" fill="hold" grpId="0" nodeType="withEffect">
+                                  <p:stCondLst>
+                                    <p:cond delay="0"/>
+                                  </p:stCondLst>
+                                  <p:childTnLst>
+                                    <p:set>
+                                      <p:cBhvr>
+                                        <p:cTn id="24" dur="1" fill="hold">
+                                          <p:stCondLst>
+                                            <p:cond delay="0"/>
+                                          </p:stCondLst>
+                                        </p:cTn>
+                                        <p:tgtEl>
+                                          <p:spTgt spid="3">
+                                            <p:txEl>
+                                              <p:pRg st="8" end="8"/>
+                                            </p:txEl>
+                                          </p:spTgt>
+                                        </p:tgtEl>
+                                        <p:attrNameLst>
+                                          <p:attrName>style.visibility</p:attrName>
+                                        </p:attrNameLst>
+                                      </p:cBhvr>
+                                      <p:to>
+                                        <p:strVal val="visible"/>
+                                      </p:to>
+                                    </p:set>
+                                  </p:childTnLst>
+                                </p:cTn>
+                              </p:par>
+                            </p:childTnLst>
+                          </p:cTn>
+                        </p:par>
+                      </p:childTnLst>
+                    </p:cTn>
+                  </p:par>
+                  <p:par>
+                    <p:cTn id="25" fill="hold">
+                      <p:stCondLst>
+                        <p:cond delay="indefinite"/>
+                      </p:stCondLst>
+                      <p:childTnLst>
+                        <p:par>
+                          <p:cTn id="26" fill="hold">
+                            <p:stCondLst>
+                              <p:cond delay="0"/>
+                            </p:stCondLst>
+                            <p:childTnLst>
+                              <p:par>
+                                <p:cTn id="27" presetID="1" presetClass="entr" presetSubtype="0" fill="hold" grpId="0" nodeType="clickEffect">
+                                  <p:stCondLst>
+                                    <p:cond delay="0"/>
+                                  </p:stCondLst>
+                                  <p:childTnLst>
+                                    <p:set>
+                                      <p:cBhvr>
+                                        <p:cTn id="28" dur="1" fill="hold">
+                                          <p:stCondLst>
+                                            <p:cond delay="0"/>
+                                          </p:stCondLst>
+                                        </p:cTn>
+                                        <p:tgtEl>
+                                          <p:spTgt spid="3">
+                                            <p:txEl>
+                                              <p:pRg st="9" end="9"/>
+                                            </p:txEl>
+                                          </p:spTgt>
+                                        </p:tgtEl>
+                                        <p:attrNameLst>
+                                          <p:attrName>style.visibility</p:attrName>
+                                        </p:attrNameLst>
+                                      </p:cBhvr>
+                                      <p:to>
+                                        <p:strVal val="visible"/>
+                                      </p:to>
+                                    </p:set>
+                                  </p:childTnLst>
+                                </p:cTn>
+                              </p:par>
+                            </p:childTnLst>
+                          </p:cTn>
+                        </p:par>
+                      </p:childTnLst>
+                    </p:cTn>
+                  </p:par>
+                </p:childTnLst>
+              </p:cTn>
+              <p:prevCondLst>
+                <p:cond evt="onPrev" delay="0">
+                  <p:tgtEl>
+                    <p:sldTgt/>
+                  </p:tgtEl>
+                </p:cond>
+              </p:prevCondLst>
+              <p:nextCondLst>
+                <p:cond evt="onNext" delay="0">
+                  <p:tgtEl>
+                    <p:sldTgt/>
+                  </p:tgtEl>
+                </p:cond>
+              </p:nextCondLst>
+            </p:seq>
+          </p:childTnLst>
+        </p:cTn>
+      </p:par>
+    </p:tnLst>
+    <p:bldLst>
+      <p:bldP spid="3" grpId="0" build="p"/>
+    </p:bldLst>
+  </p:timing>
 </p:sld>
 </file>
 

</xml_diff>